<commit_message>
Removed more slides from intro
</commit_message>
<xml_diff>
--- a/_extras/2017-08-02-BestPractices.pptx
+++ b/_extras/2017-08-02-BestPractices.pptx
@@ -7,7 +7,7 @@
     <p:sldMasterId id="2147483650" r:id="rId3"/>
   </p:sldMasterIdLst>
   <p:notesMasterIdLst>
-    <p:notesMasterId r:id="rId25"/>
+    <p:notesMasterId r:id="rId24"/>
   </p:notesMasterIdLst>
   <p:sldIdLst>
     <p:sldId id="289" r:id="rId4"/>
@@ -15,22 +15,21 @@
     <p:sldId id="256" r:id="rId6"/>
     <p:sldId id="278" r:id="rId7"/>
     <p:sldId id="280" r:id="rId8"/>
-    <p:sldId id="284" r:id="rId9"/>
-    <p:sldId id="257" r:id="rId10"/>
-    <p:sldId id="276" r:id="rId11"/>
-    <p:sldId id="258" r:id="rId12"/>
-    <p:sldId id="259" r:id="rId13"/>
-    <p:sldId id="281" r:id="rId14"/>
-    <p:sldId id="272" r:id="rId15"/>
-    <p:sldId id="290" r:id="rId16"/>
-    <p:sldId id="269" r:id="rId17"/>
-    <p:sldId id="270" r:id="rId18"/>
-    <p:sldId id="274" r:id="rId19"/>
-    <p:sldId id="267" r:id="rId20"/>
-    <p:sldId id="268" r:id="rId21"/>
-    <p:sldId id="283" r:id="rId22"/>
-    <p:sldId id="291" r:id="rId23"/>
-    <p:sldId id="292" r:id="rId24"/>
+    <p:sldId id="257" r:id="rId9"/>
+    <p:sldId id="276" r:id="rId10"/>
+    <p:sldId id="258" r:id="rId11"/>
+    <p:sldId id="259" r:id="rId12"/>
+    <p:sldId id="281" r:id="rId13"/>
+    <p:sldId id="272" r:id="rId14"/>
+    <p:sldId id="290" r:id="rId15"/>
+    <p:sldId id="269" r:id="rId16"/>
+    <p:sldId id="270" r:id="rId17"/>
+    <p:sldId id="274" r:id="rId18"/>
+    <p:sldId id="267" r:id="rId19"/>
+    <p:sldId id="268" r:id="rId20"/>
+    <p:sldId id="283" r:id="rId21"/>
+    <p:sldId id="291" r:id="rId22"/>
+    <p:sldId id="292" r:id="rId23"/>
   </p:sldIdLst>
   <p:sldSz cx="10080625" cy="7559675"/>
   <p:notesSz cx="7772400" cy="10058400"/>
@@ -1098,7 +1097,7 @@
               <a:pPr>
                 <a:defRPr/>
               </a:pPr>
-              <a:t>11</a:t>
+              <a:t>10</a:t>
             </a:fld>
             <a:endParaRPr lang="en-US"/>
           </a:p>
@@ -1306,7 +1305,7 @@
               <a:pPr>
                 <a:defRPr/>
               </a:pPr>
-              <a:t>12</a:t>
+              <a:t>11</a:t>
             </a:fld>
             <a:endParaRPr lang="en-US"/>
           </a:p>
@@ -1368,7 +1367,7 @@
               <a:pPr>
                 <a:defRPr/>
               </a:pPr>
-              <a:t>14</a:t>
+              <a:t>13</a:t>
             </a:fld>
             <a:endParaRPr lang="en-US"/>
           </a:p>
@@ -1534,7 +1533,7 @@
               <a:pPr>
                 <a:defRPr/>
               </a:pPr>
-              <a:t>15</a:t>
+              <a:t>14</a:t>
             </a:fld>
             <a:endParaRPr lang="en-US"/>
           </a:p>
@@ -1762,7 +1761,7 @@
               <a:pPr>
                 <a:defRPr/>
               </a:pPr>
-              <a:t>16</a:t>
+              <a:t>15</a:t>
             </a:fld>
             <a:endParaRPr lang="en-US"/>
           </a:p>
@@ -1824,7 +1823,7 @@
               <a:pPr>
                 <a:defRPr/>
               </a:pPr>
-              <a:t>17</a:t>
+              <a:t>16</a:t>
             </a:fld>
             <a:endParaRPr lang="en-US"/>
           </a:p>
@@ -1990,7 +1989,7 @@
               <a:pPr>
                 <a:defRPr/>
               </a:pPr>
-              <a:t>18</a:t>
+              <a:t>17</a:t>
             </a:fld>
             <a:endParaRPr lang="en-US"/>
           </a:p>
@@ -2209,7 +2208,7 @@
               <a:pPr>
                 <a:defRPr/>
               </a:pPr>
-              <a:t>20</a:t>
+              <a:t>19</a:t>
             </a:fld>
             <a:endParaRPr lang="en-US"/>
           </a:p>
@@ -3355,7 +3354,7 @@
               <a:pPr>
                 <a:defRPr/>
               </a:pPr>
-              <a:t>7</a:t>
+              <a:t>6</a:t>
             </a:fld>
             <a:endParaRPr lang="en-US"/>
           </a:p>
@@ -3787,7 +3786,7 @@
                 <a:buNone/>
                 <a:defRPr/>
               </a:pPr>
-              <a:t>7</a:t>
+              <a:t>6</a:t>
             </a:fld>
             <a:endParaRPr lang="en-US" sz="1400" smtClean="0">
               <a:latin typeface="Times New Roman" charset="0"/>
@@ -3981,7 +3980,7 @@
               <a:pPr>
                 <a:defRPr/>
               </a:pPr>
-              <a:t>8</a:t>
+              <a:t>7</a:t>
             </a:fld>
             <a:endParaRPr lang="en-US"/>
           </a:p>
@@ -4043,7 +4042,7 @@
               <a:pPr>
                 <a:defRPr/>
               </a:pPr>
-              <a:t>9</a:t>
+              <a:t>8</a:t>
             </a:fld>
             <a:endParaRPr lang="en-US"/>
           </a:p>
@@ -4209,7 +4208,7 @@
               <a:pPr>
                 <a:defRPr/>
               </a:pPr>
-              <a:t>10</a:t>
+              <a:t>9</a:t>
             </a:fld>
             <a:endParaRPr lang="en-US"/>
           </a:p>
@@ -14834,14 +14833,6 @@
 <file path=ppt/slides/slide10.xml><?xml version="1.0" encoding="utf-8"?>
 <p:sld xmlns:a="http://schemas.openxmlformats.org/drawingml/2006/main" xmlns:r="http://schemas.openxmlformats.org/officeDocument/2006/relationships" xmlns:p="http://schemas.openxmlformats.org/presentationml/2006/main">
   <p:cSld>
-    <p:bg>
-      <p:bgPr>
-        <a:solidFill>
-          <a:srgbClr val="FFFFFF"/>
-        </a:solidFill>
-        <a:effectLst/>
-      </p:bgPr>
-    </p:bg>
     <p:spTree>
       <p:nvGrpSpPr>
         <p:cNvPr id="1" name=""/>
@@ -14858,7 +14849,7 @@
       </p:grpSpPr>
       <p:sp>
         <p:nvSpPr>
-          <p:cNvPr id="8193" name="Text Box 1"/>
+          <p:cNvPr id="13313" name="Text Box 1"/>
           <p:cNvSpPr txBox="1">
             <a:spLocks noChangeArrowheads="1"/>
           </p:cNvSpPr>
@@ -14866,7 +14857,7 @@
         </p:nvSpPr>
         <p:spPr bwMode="auto">
           <a:xfrm>
-            <a:off x="989012" y="303213"/>
+            <a:off x="1411288" y="303213"/>
             <a:ext cx="8166100" cy="1258887"/>
           </a:xfrm>
           <a:prstGeom prst="rect">
@@ -15273,15 +15264,15 @@
               <a:defRPr/>
             </a:pPr>
             <a:r>
-              <a:rPr lang="en-US" sz="4400" dirty="0" smtClean="0"/>
-              <a:t>So what?</a:t>
+              <a:rPr lang="en-US" sz="4400" smtClean="0"/>
+              <a:t>Software Carpentry to the Rescue</a:t>
             </a:r>
           </a:p>
         </p:txBody>
       </p:sp>
       <p:sp>
         <p:nvSpPr>
-          <p:cNvPr id="8194" name="Text Box 2"/>
+          <p:cNvPr id="13314" name="Text Box 2"/>
           <p:cNvSpPr txBox="1">
             <a:spLocks noChangeArrowheads="1"/>
           </p:cNvSpPr>
@@ -15698,30 +15689,65 @@
               <a:defRPr/>
             </a:pPr>
             <a:r>
-              <a:rPr lang="en-US" sz="4000" dirty="0" smtClean="0">
+              <a:rPr lang="en-US" sz="4000" smtClean="0">
                 <a:cs typeface="Arial Unicode MS" charset="0"/>
               </a:rPr>
-              <a:t>Most results take longer to produce than they need to</a:t>
-            </a:r>
-          </a:p>
-          <a:p>
-            <a:pPr>
-              <a:lnSpc>
-                <a:spcPct val="200000"/>
-              </a:lnSpc>
+              <a:t>Best practices used by the best software engineers whose business is development of quality software</a:t>
+            </a:r>
+          </a:p>
+          <a:p>
+            <a:pPr lvl="1">
               <a:spcAft>
-                <a:spcPts val="1425"/>
+                <a:spcPts val="1138"/>
               </a:spcAft>
               <a:buFont typeface="Arial" charset="0"/>
               <a:buChar char="•"/>
               <a:defRPr/>
             </a:pPr>
             <a:r>
-              <a:rPr lang="en-US" sz="4000" dirty="0" smtClean="0">
-                <a:cs typeface="Arial Unicode MS" charset="0"/>
-              </a:rPr>
-              <a:t>Difficult to assess quality</a:t>
-            </a:r>
+              <a:rPr lang="en-US" sz="3600" smtClean="0"/>
+              <a:t>They don’t always have formal training</a:t>
+            </a:r>
+          </a:p>
+          <a:p>
+            <a:pPr lvl="1">
+              <a:spcAft>
+                <a:spcPts val="1138"/>
+              </a:spcAft>
+              <a:buFont typeface="Arial" charset="0"/>
+              <a:buChar char="•"/>
+              <a:defRPr/>
+            </a:pPr>
+            <a:r>
+              <a:rPr lang="en-US" sz="3600" smtClean="0"/>
+              <a:t>They don’t always follow all the practices</a:t>
+            </a:r>
+          </a:p>
+          <a:p>
+            <a:pPr lvl="1">
+              <a:spcAft>
+                <a:spcPts val="1138"/>
+              </a:spcAft>
+              <a:buFont typeface="Arial" charset="0"/>
+              <a:buChar char="•"/>
+              <a:defRPr/>
+            </a:pPr>
+            <a:r>
+              <a:rPr lang="en-US" sz="3600" smtClean="0"/>
+              <a:t>Growing evidence supported by empirical studies</a:t>
+            </a:r>
+          </a:p>
+          <a:p>
+            <a:pPr marL="969963" lvl="1">
+              <a:spcAft>
+                <a:spcPts val="1138"/>
+              </a:spcAft>
+              <a:buClrTx/>
+              <a:buFontTx/>
+              <a:buNone/>
+              <a:defRPr/>
+            </a:pPr>
+            <a:endParaRPr lang="en-US" sz="3600" smtClean="0"/>
           </a:p>
         </p:txBody>
       </p:sp>
@@ -15780,963 +15806,6 @@
       </p:grpSpPr>
       <p:sp>
         <p:nvSpPr>
-          <p:cNvPr id="13313" name="Text Box 1"/>
-          <p:cNvSpPr txBox="1">
-            <a:spLocks noChangeArrowheads="1"/>
-          </p:cNvSpPr>
-          <p:nvPr/>
-        </p:nvSpPr>
-        <p:spPr bwMode="auto">
-          <a:xfrm>
-            <a:off x="1411288" y="303213"/>
-            <a:ext cx="8166100" cy="1258887"/>
-          </a:xfrm>
-          <a:prstGeom prst="rect">
-            <a:avLst/>
-          </a:prstGeom>
-          <a:noFill/>
-          <a:ln>
-            <a:noFill/>
-          </a:ln>
-          <a:effectLst/>
-          <a:extLst>
-            <a:ext uri="{909E8E84-426E-40dd-AFC4-6F175D3DCCD1}">
-              <a14:hiddenFill xmlns="" xmlns:a14="http://schemas.microsoft.com/office/drawing/2010/main">
-                <a:solidFill>
-                  <a:srgbClr val="FFFFFF"/>
-                </a:solidFill>
-              </a14:hiddenFill>
-            </a:ext>
-            <a:ext uri="{91240B29-F687-4f45-9708-019B960494DF}">
-              <a14:hiddenLine xmlns="" xmlns:a14="http://schemas.microsoft.com/office/drawing/2010/main" w="9525" cap="flat">
-                <a:solidFill>
-                  <a:srgbClr val="3465A4"/>
-                </a:solidFill>
-                <a:round/>
-                <a:headEnd/>
-                <a:tailEnd/>
-              </a14:hiddenLine>
-            </a:ext>
-            <a:ext uri="{AF507438-7753-43e0-B8FC-AC1667EBCBE1}">
-              <a14:hiddenEffects xmlns="" xmlns:a14="http://schemas.microsoft.com/office/drawing/2010/main">
-                <a:effectLst>
-                  <a:outerShdw blurRad="63500" dist="38099" dir="2700000" algn="ctr" rotWithShape="0">
-                    <a:srgbClr val="000000">
-                      <a:alpha val="74998"/>
-                    </a:srgbClr>
-                  </a:outerShdw>
-                </a:effectLst>
-              </a14:hiddenEffects>
-            </a:ext>
-          </a:extLst>
-        </p:spPr>
-        <p:txBody>
-          <a:bodyPr lIns="100800" tIns="50400" rIns="100800" bIns="50400" anchor="ctr"/>
-          <a:lstStyle>
-            <a:lvl1pPr>
-              <a:tabLst>
-                <a:tab pos="0" algn="l"/>
-                <a:tab pos="457200" algn="l"/>
-                <a:tab pos="914400" algn="l"/>
-                <a:tab pos="1371600" algn="l"/>
-                <a:tab pos="1828800" algn="l"/>
-                <a:tab pos="2286000" algn="l"/>
-                <a:tab pos="2743200" algn="l"/>
-                <a:tab pos="3200400" algn="l"/>
-                <a:tab pos="3657600" algn="l"/>
-                <a:tab pos="4114800" algn="l"/>
-                <a:tab pos="4572000" algn="l"/>
-                <a:tab pos="5029200" algn="l"/>
-                <a:tab pos="5486400" algn="l"/>
-                <a:tab pos="5943600" algn="l"/>
-                <a:tab pos="6400800" algn="l"/>
-                <a:tab pos="6858000" algn="l"/>
-                <a:tab pos="7315200" algn="l"/>
-                <a:tab pos="7772400" algn="l"/>
-                <a:tab pos="8229600" algn="l"/>
-                <a:tab pos="8686800" algn="l"/>
-                <a:tab pos="9144000" algn="l"/>
-              </a:tabLst>
-              <a:defRPr>
-                <a:solidFill>
-                  <a:srgbClr val="000000"/>
-                </a:solidFill>
-                <a:latin typeface="Arial" charset="0"/>
-                <a:ea typeface="ＭＳ Ｐゴシック" charset="0"/>
-                <a:cs typeface="ＭＳ Ｐゴシック" charset="0"/>
-              </a:defRPr>
-            </a:lvl1pPr>
-            <a:lvl2pPr>
-              <a:tabLst>
-                <a:tab pos="0" algn="l"/>
-                <a:tab pos="457200" algn="l"/>
-                <a:tab pos="914400" algn="l"/>
-                <a:tab pos="1371600" algn="l"/>
-                <a:tab pos="1828800" algn="l"/>
-                <a:tab pos="2286000" algn="l"/>
-                <a:tab pos="2743200" algn="l"/>
-                <a:tab pos="3200400" algn="l"/>
-                <a:tab pos="3657600" algn="l"/>
-                <a:tab pos="4114800" algn="l"/>
-                <a:tab pos="4572000" algn="l"/>
-                <a:tab pos="5029200" algn="l"/>
-                <a:tab pos="5486400" algn="l"/>
-                <a:tab pos="5943600" algn="l"/>
-                <a:tab pos="6400800" algn="l"/>
-                <a:tab pos="6858000" algn="l"/>
-                <a:tab pos="7315200" algn="l"/>
-                <a:tab pos="7772400" algn="l"/>
-                <a:tab pos="8229600" algn="l"/>
-                <a:tab pos="8686800" algn="l"/>
-                <a:tab pos="9144000" algn="l"/>
-              </a:tabLst>
-              <a:defRPr>
-                <a:solidFill>
-                  <a:srgbClr val="000000"/>
-                </a:solidFill>
-                <a:latin typeface="Arial" charset="0"/>
-                <a:ea typeface="ＭＳ Ｐゴシック" charset="0"/>
-                <a:cs typeface="ＭＳ Ｐゴシック" charset="0"/>
-              </a:defRPr>
-            </a:lvl2pPr>
-            <a:lvl3pPr>
-              <a:tabLst>
-                <a:tab pos="0" algn="l"/>
-                <a:tab pos="457200" algn="l"/>
-                <a:tab pos="914400" algn="l"/>
-                <a:tab pos="1371600" algn="l"/>
-                <a:tab pos="1828800" algn="l"/>
-                <a:tab pos="2286000" algn="l"/>
-                <a:tab pos="2743200" algn="l"/>
-                <a:tab pos="3200400" algn="l"/>
-                <a:tab pos="3657600" algn="l"/>
-                <a:tab pos="4114800" algn="l"/>
-                <a:tab pos="4572000" algn="l"/>
-                <a:tab pos="5029200" algn="l"/>
-                <a:tab pos="5486400" algn="l"/>
-                <a:tab pos="5943600" algn="l"/>
-                <a:tab pos="6400800" algn="l"/>
-                <a:tab pos="6858000" algn="l"/>
-                <a:tab pos="7315200" algn="l"/>
-                <a:tab pos="7772400" algn="l"/>
-                <a:tab pos="8229600" algn="l"/>
-                <a:tab pos="8686800" algn="l"/>
-                <a:tab pos="9144000" algn="l"/>
-              </a:tabLst>
-              <a:defRPr>
-                <a:solidFill>
-                  <a:srgbClr val="000000"/>
-                </a:solidFill>
-                <a:latin typeface="Arial" charset="0"/>
-                <a:ea typeface="ＭＳ Ｐゴシック" charset="0"/>
-                <a:cs typeface="ＭＳ Ｐゴシック" charset="0"/>
-              </a:defRPr>
-            </a:lvl3pPr>
-            <a:lvl4pPr>
-              <a:tabLst>
-                <a:tab pos="0" algn="l"/>
-                <a:tab pos="457200" algn="l"/>
-                <a:tab pos="914400" algn="l"/>
-                <a:tab pos="1371600" algn="l"/>
-                <a:tab pos="1828800" algn="l"/>
-                <a:tab pos="2286000" algn="l"/>
-                <a:tab pos="2743200" algn="l"/>
-                <a:tab pos="3200400" algn="l"/>
-                <a:tab pos="3657600" algn="l"/>
-                <a:tab pos="4114800" algn="l"/>
-                <a:tab pos="4572000" algn="l"/>
-                <a:tab pos="5029200" algn="l"/>
-                <a:tab pos="5486400" algn="l"/>
-                <a:tab pos="5943600" algn="l"/>
-                <a:tab pos="6400800" algn="l"/>
-                <a:tab pos="6858000" algn="l"/>
-                <a:tab pos="7315200" algn="l"/>
-                <a:tab pos="7772400" algn="l"/>
-                <a:tab pos="8229600" algn="l"/>
-                <a:tab pos="8686800" algn="l"/>
-                <a:tab pos="9144000" algn="l"/>
-              </a:tabLst>
-              <a:defRPr>
-                <a:solidFill>
-                  <a:srgbClr val="000000"/>
-                </a:solidFill>
-                <a:latin typeface="Arial" charset="0"/>
-                <a:ea typeface="ＭＳ Ｐゴシック" charset="0"/>
-                <a:cs typeface="ＭＳ Ｐゴシック" charset="0"/>
-              </a:defRPr>
-            </a:lvl4pPr>
-            <a:lvl5pPr>
-              <a:tabLst>
-                <a:tab pos="0" algn="l"/>
-                <a:tab pos="457200" algn="l"/>
-                <a:tab pos="914400" algn="l"/>
-                <a:tab pos="1371600" algn="l"/>
-                <a:tab pos="1828800" algn="l"/>
-                <a:tab pos="2286000" algn="l"/>
-                <a:tab pos="2743200" algn="l"/>
-                <a:tab pos="3200400" algn="l"/>
-                <a:tab pos="3657600" algn="l"/>
-                <a:tab pos="4114800" algn="l"/>
-                <a:tab pos="4572000" algn="l"/>
-                <a:tab pos="5029200" algn="l"/>
-                <a:tab pos="5486400" algn="l"/>
-                <a:tab pos="5943600" algn="l"/>
-                <a:tab pos="6400800" algn="l"/>
-                <a:tab pos="6858000" algn="l"/>
-                <a:tab pos="7315200" algn="l"/>
-                <a:tab pos="7772400" algn="l"/>
-                <a:tab pos="8229600" algn="l"/>
-                <a:tab pos="8686800" algn="l"/>
-                <a:tab pos="9144000" algn="l"/>
-              </a:tabLst>
-              <a:defRPr>
-                <a:solidFill>
-                  <a:srgbClr val="000000"/>
-                </a:solidFill>
-                <a:latin typeface="Arial" charset="0"/>
-                <a:ea typeface="ＭＳ Ｐゴシック" charset="0"/>
-                <a:cs typeface="ＭＳ Ｐゴシック" charset="0"/>
-              </a:defRPr>
-            </a:lvl5pPr>
-            <a:lvl6pPr marL="2514600" indent="-228600" fontAlgn="base" hangingPunct="0">
-              <a:lnSpc>
-                <a:spcPct val="93000"/>
-              </a:lnSpc>
-              <a:spcBef>
-                <a:spcPct val="0"/>
-              </a:spcBef>
-              <a:spcAft>
-                <a:spcPct val="0"/>
-              </a:spcAft>
-              <a:buClr>
-                <a:srgbClr val="000000"/>
-              </a:buClr>
-              <a:buSzPct val="100000"/>
-              <a:buFont typeface="Times New Roman" charset="0"/>
-              <a:tabLst>
-                <a:tab pos="0" algn="l"/>
-                <a:tab pos="457200" algn="l"/>
-                <a:tab pos="914400" algn="l"/>
-                <a:tab pos="1371600" algn="l"/>
-                <a:tab pos="1828800" algn="l"/>
-                <a:tab pos="2286000" algn="l"/>
-                <a:tab pos="2743200" algn="l"/>
-                <a:tab pos="3200400" algn="l"/>
-                <a:tab pos="3657600" algn="l"/>
-                <a:tab pos="4114800" algn="l"/>
-                <a:tab pos="4572000" algn="l"/>
-                <a:tab pos="5029200" algn="l"/>
-                <a:tab pos="5486400" algn="l"/>
-                <a:tab pos="5943600" algn="l"/>
-                <a:tab pos="6400800" algn="l"/>
-                <a:tab pos="6858000" algn="l"/>
-                <a:tab pos="7315200" algn="l"/>
-                <a:tab pos="7772400" algn="l"/>
-                <a:tab pos="8229600" algn="l"/>
-                <a:tab pos="8686800" algn="l"/>
-                <a:tab pos="9144000" algn="l"/>
-              </a:tabLst>
-              <a:defRPr>
-                <a:solidFill>
-                  <a:srgbClr val="000000"/>
-                </a:solidFill>
-                <a:latin typeface="Arial" charset="0"/>
-                <a:ea typeface="ＭＳ Ｐゴシック" charset="0"/>
-                <a:cs typeface="ＭＳ Ｐゴシック" charset="0"/>
-              </a:defRPr>
-            </a:lvl6pPr>
-            <a:lvl7pPr marL="2971800" indent="-228600" fontAlgn="base" hangingPunct="0">
-              <a:lnSpc>
-                <a:spcPct val="93000"/>
-              </a:lnSpc>
-              <a:spcBef>
-                <a:spcPct val="0"/>
-              </a:spcBef>
-              <a:spcAft>
-                <a:spcPct val="0"/>
-              </a:spcAft>
-              <a:buClr>
-                <a:srgbClr val="000000"/>
-              </a:buClr>
-              <a:buSzPct val="100000"/>
-              <a:buFont typeface="Times New Roman" charset="0"/>
-              <a:tabLst>
-                <a:tab pos="0" algn="l"/>
-                <a:tab pos="457200" algn="l"/>
-                <a:tab pos="914400" algn="l"/>
-                <a:tab pos="1371600" algn="l"/>
-                <a:tab pos="1828800" algn="l"/>
-                <a:tab pos="2286000" algn="l"/>
-                <a:tab pos="2743200" algn="l"/>
-                <a:tab pos="3200400" algn="l"/>
-                <a:tab pos="3657600" algn="l"/>
-                <a:tab pos="4114800" algn="l"/>
-                <a:tab pos="4572000" algn="l"/>
-                <a:tab pos="5029200" algn="l"/>
-                <a:tab pos="5486400" algn="l"/>
-                <a:tab pos="5943600" algn="l"/>
-                <a:tab pos="6400800" algn="l"/>
-                <a:tab pos="6858000" algn="l"/>
-                <a:tab pos="7315200" algn="l"/>
-                <a:tab pos="7772400" algn="l"/>
-                <a:tab pos="8229600" algn="l"/>
-                <a:tab pos="8686800" algn="l"/>
-                <a:tab pos="9144000" algn="l"/>
-              </a:tabLst>
-              <a:defRPr>
-                <a:solidFill>
-                  <a:srgbClr val="000000"/>
-                </a:solidFill>
-                <a:latin typeface="Arial" charset="0"/>
-                <a:ea typeface="ＭＳ Ｐゴシック" charset="0"/>
-                <a:cs typeface="ＭＳ Ｐゴシック" charset="0"/>
-              </a:defRPr>
-            </a:lvl7pPr>
-            <a:lvl8pPr marL="3429000" indent="-228600" fontAlgn="base" hangingPunct="0">
-              <a:lnSpc>
-                <a:spcPct val="93000"/>
-              </a:lnSpc>
-              <a:spcBef>
-                <a:spcPct val="0"/>
-              </a:spcBef>
-              <a:spcAft>
-                <a:spcPct val="0"/>
-              </a:spcAft>
-              <a:buClr>
-                <a:srgbClr val="000000"/>
-              </a:buClr>
-              <a:buSzPct val="100000"/>
-              <a:buFont typeface="Times New Roman" charset="0"/>
-              <a:tabLst>
-                <a:tab pos="0" algn="l"/>
-                <a:tab pos="457200" algn="l"/>
-                <a:tab pos="914400" algn="l"/>
-                <a:tab pos="1371600" algn="l"/>
-                <a:tab pos="1828800" algn="l"/>
-                <a:tab pos="2286000" algn="l"/>
-                <a:tab pos="2743200" algn="l"/>
-                <a:tab pos="3200400" algn="l"/>
-                <a:tab pos="3657600" algn="l"/>
-                <a:tab pos="4114800" algn="l"/>
-                <a:tab pos="4572000" algn="l"/>
-                <a:tab pos="5029200" algn="l"/>
-                <a:tab pos="5486400" algn="l"/>
-                <a:tab pos="5943600" algn="l"/>
-                <a:tab pos="6400800" algn="l"/>
-                <a:tab pos="6858000" algn="l"/>
-                <a:tab pos="7315200" algn="l"/>
-                <a:tab pos="7772400" algn="l"/>
-                <a:tab pos="8229600" algn="l"/>
-                <a:tab pos="8686800" algn="l"/>
-                <a:tab pos="9144000" algn="l"/>
-              </a:tabLst>
-              <a:defRPr>
-                <a:solidFill>
-                  <a:srgbClr val="000000"/>
-                </a:solidFill>
-                <a:latin typeface="Arial" charset="0"/>
-                <a:ea typeface="ＭＳ Ｐゴシック" charset="0"/>
-                <a:cs typeface="ＭＳ Ｐゴシック" charset="0"/>
-              </a:defRPr>
-            </a:lvl8pPr>
-            <a:lvl9pPr marL="3886200" indent="-228600" fontAlgn="base" hangingPunct="0">
-              <a:lnSpc>
-                <a:spcPct val="93000"/>
-              </a:lnSpc>
-              <a:spcBef>
-                <a:spcPct val="0"/>
-              </a:spcBef>
-              <a:spcAft>
-                <a:spcPct val="0"/>
-              </a:spcAft>
-              <a:buClr>
-                <a:srgbClr val="000000"/>
-              </a:buClr>
-              <a:buSzPct val="100000"/>
-              <a:buFont typeface="Times New Roman" charset="0"/>
-              <a:tabLst>
-                <a:tab pos="0" algn="l"/>
-                <a:tab pos="457200" algn="l"/>
-                <a:tab pos="914400" algn="l"/>
-                <a:tab pos="1371600" algn="l"/>
-                <a:tab pos="1828800" algn="l"/>
-                <a:tab pos="2286000" algn="l"/>
-                <a:tab pos="2743200" algn="l"/>
-                <a:tab pos="3200400" algn="l"/>
-                <a:tab pos="3657600" algn="l"/>
-                <a:tab pos="4114800" algn="l"/>
-                <a:tab pos="4572000" algn="l"/>
-                <a:tab pos="5029200" algn="l"/>
-                <a:tab pos="5486400" algn="l"/>
-                <a:tab pos="5943600" algn="l"/>
-                <a:tab pos="6400800" algn="l"/>
-                <a:tab pos="6858000" algn="l"/>
-                <a:tab pos="7315200" algn="l"/>
-                <a:tab pos="7772400" algn="l"/>
-                <a:tab pos="8229600" algn="l"/>
-                <a:tab pos="8686800" algn="l"/>
-                <a:tab pos="9144000" algn="l"/>
-              </a:tabLst>
-              <a:defRPr>
-                <a:solidFill>
-                  <a:srgbClr val="000000"/>
-                </a:solidFill>
-                <a:latin typeface="Arial" charset="0"/>
-                <a:ea typeface="ＭＳ Ｐゴシック" charset="0"/>
-                <a:cs typeface="ＭＳ Ｐゴシック" charset="0"/>
-              </a:defRPr>
-            </a:lvl9pPr>
-          </a:lstStyle>
-          <a:p>
-            <a:pPr algn="ctr">
-              <a:buClrTx/>
-              <a:buFontTx/>
-              <a:buNone/>
-              <a:defRPr/>
-            </a:pPr>
-            <a:r>
-              <a:rPr lang="en-US" sz="4400" smtClean="0"/>
-              <a:t>Software Carpentry to the Rescue</a:t>
-            </a:r>
-          </a:p>
-        </p:txBody>
-      </p:sp>
-      <p:sp>
-        <p:nvSpPr>
-          <p:cNvPr id="13314" name="Text Box 2"/>
-          <p:cNvSpPr txBox="1">
-            <a:spLocks noChangeArrowheads="1"/>
-          </p:cNvSpPr>
-          <p:nvPr/>
-        </p:nvSpPr>
-        <p:spPr bwMode="auto">
-          <a:xfrm>
-            <a:off x="503238" y="1878013"/>
-            <a:ext cx="9074150" cy="4702175"/>
-          </a:xfrm>
-          <a:prstGeom prst="rect">
-            <a:avLst/>
-          </a:prstGeom>
-          <a:noFill/>
-          <a:ln>
-            <a:noFill/>
-          </a:ln>
-          <a:effectLst/>
-          <a:extLst>
-            <a:ext uri="{909E8E84-426E-40dd-AFC4-6F175D3DCCD1}">
-              <a14:hiddenFill xmlns="" xmlns:a14="http://schemas.microsoft.com/office/drawing/2010/main">
-                <a:solidFill>
-                  <a:srgbClr val="FFFFFF"/>
-                </a:solidFill>
-              </a14:hiddenFill>
-            </a:ext>
-            <a:ext uri="{91240B29-F687-4f45-9708-019B960494DF}">
-              <a14:hiddenLine xmlns="" xmlns:a14="http://schemas.microsoft.com/office/drawing/2010/main" w="9525" cap="flat">
-                <a:solidFill>
-                  <a:srgbClr val="3465A4"/>
-                </a:solidFill>
-                <a:round/>
-                <a:headEnd/>
-                <a:tailEnd/>
-              </a14:hiddenLine>
-            </a:ext>
-            <a:ext uri="{AF507438-7753-43e0-B8FC-AC1667EBCBE1}">
-              <a14:hiddenEffects xmlns="" xmlns:a14="http://schemas.microsoft.com/office/drawing/2010/main">
-                <a:effectLst>
-                  <a:outerShdw blurRad="63500" dist="38099" dir="2700000" algn="ctr" rotWithShape="0">
-                    <a:srgbClr val="000000">
-                      <a:alpha val="74998"/>
-                    </a:srgbClr>
-                  </a:outerShdw>
-                </a:effectLst>
-              </a14:hiddenEffects>
-            </a:ext>
-          </a:extLst>
-        </p:spPr>
-        <p:txBody>
-          <a:bodyPr lIns="100800" tIns="50400" rIns="100800" bIns="50400"/>
-          <a:lstStyle>
-            <a:lvl1pPr marL="568325" indent="-568325">
-              <a:tabLst>
-                <a:tab pos="568325" algn="l"/>
-                <a:tab pos="1025525" algn="l"/>
-                <a:tab pos="1482725" algn="l"/>
-                <a:tab pos="1939925" algn="l"/>
-                <a:tab pos="2397125" algn="l"/>
-                <a:tab pos="2854325" algn="l"/>
-                <a:tab pos="3311525" algn="l"/>
-                <a:tab pos="3768725" algn="l"/>
-                <a:tab pos="4225925" algn="l"/>
-                <a:tab pos="4683125" algn="l"/>
-                <a:tab pos="5140325" algn="l"/>
-                <a:tab pos="5597525" algn="l"/>
-                <a:tab pos="6054725" algn="l"/>
-                <a:tab pos="6511925" algn="l"/>
-                <a:tab pos="6969125" algn="l"/>
-                <a:tab pos="7426325" algn="l"/>
-                <a:tab pos="7883525" algn="l"/>
-                <a:tab pos="8340725" algn="l"/>
-                <a:tab pos="8797925" algn="l"/>
-                <a:tab pos="9255125" algn="l"/>
-                <a:tab pos="9712325" algn="l"/>
-              </a:tabLst>
-              <a:defRPr>
-                <a:solidFill>
-                  <a:srgbClr val="000000"/>
-                </a:solidFill>
-                <a:latin typeface="Arial" charset="0"/>
-                <a:ea typeface="ＭＳ Ｐゴシック" charset="0"/>
-                <a:cs typeface="ＭＳ Ｐゴシック" charset="0"/>
-              </a:defRPr>
-            </a:lvl1pPr>
-            <a:lvl2pPr marL="968375" indent="-568325">
-              <a:tabLst>
-                <a:tab pos="568325" algn="l"/>
-                <a:tab pos="1025525" algn="l"/>
-                <a:tab pos="1482725" algn="l"/>
-                <a:tab pos="1939925" algn="l"/>
-                <a:tab pos="2397125" algn="l"/>
-                <a:tab pos="2854325" algn="l"/>
-                <a:tab pos="3311525" algn="l"/>
-                <a:tab pos="3768725" algn="l"/>
-                <a:tab pos="4225925" algn="l"/>
-                <a:tab pos="4683125" algn="l"/>
-                <a:tab pos="5140325" algn="l"/>
-                <a:tab pos="5597525" algn="l"/>
-                <a:tab pos="6054725" algn="l"/>
-                <a:tab pos="6511925" algn="l"/>
-                <a:tab pos="6969125" algn="l"/>
-                <a:tab pos="7426325" algn="l"/>
-                <a:tab pos="7883525" algn="l"/>
-                <a:tab pos="8340725" algn="l"/>
-                <a:tab pos="8797925" algn="l"/>
-                <a:tab pos="9255125" algn="l"/>
-                <a:tab pos="9712325" algn="l"/>
-              </a:tabLst>
-              <a:defRPr>
-                <a:solidFill>
-                  <a:srgbClr val="000000"/>
-                </a:solidFill>
-                <a:latin typeface="Arial" charset="0"/>
-                <a:ea typeface="ＭＳ Ｐゴシック" charset="0"/>
-                <a:cs typeface="ＭＳ Ｐゴシック" charset="0"/>
-              </a:defRPr>
-            </a:lvl2pPr>
-            <a:lvl3pPr>
-              <a:tabLst>
-                <a:tab pos="568325" algn="l"/>
-                <a:tab pos="1025525" algn="l"/>
-                <a:tab pos="1482725" algn="l"/>
-                <a:tab pos="1939925" algn="l"/>
-                <a:tab pos="2397125" algn="l"/>
-                <a:tab pos="2854325" algn="l"/>
-                <a:tab pos="3311525" algn="l"/>
-                <a:tab pos="3768725" algn="l"/>
-                <a:tab pos="4225925" algn="l"/>
-                <a:tab pos="4683125" algn="l"/>
-                <a:tab pos="5140325" algn="l"/>
-                <a:tab pos="5597525" algn="l"/>
-                <a:tab pos="6054725" algn="l"/>
-                <a:tab pos="6511925" algn="l"/>
-                <a:tab pos="6969125" algn="l"/>
-                <a:tab pos="7426325" algn="l"/>
-                <a:tab pos="7883525" algn="l"/>
-                <a:tab pos="8340725" algn="l"/>
-                <a:tab pos="8797925" algn="l"/>
-                <a:tab pos="9255125" algn="l"/>
-                <a:tab pos="9712325" algn="l"/>
-              </a:tabLst>
-              <a:defRPr>
-                <a:solidFill>
-                  <a:srgbClr val="000000"/>
-                </a:solidFill>
-                <a:latin typeface="Arial" charset="0"/>
-                <a:ea typeface="ＭＳ Ｐゴシック" charset="0"/>
-                <a:cs typeface="ＭＳ Ｐゴシック" charset="0"/>
-              </a:defRPr>
-            </a:lvl3pPr>
-            <a:lvl4pPr>
-              <a:tabLst>
-                <a:tab pos="568325" algn="l"/>
-                <a:tab pos="1025525" algn="l"/>
-                <a:tab pos="1482725" algn="l"/>
-                <a:tab pos="1939925" algn="l"/>
-                <a:tab pos="2397125" algn="l"/>
-                <a:tab pos="2854325" algn="l"/>
-                <a:tab pos="3311525" algn="l"/>
-                <a:tab pos="3768725" algn="l"/>
-                <a:tab pos="4225925" algn="l"/>
-                <a:tab pos="4683125" algn="l"/>
-                <a:tab pos="5140325" algn="l"/>
-                <a:tab pos="5597525" algn="l"/>
-                <a:tab pos="6054725" algn="l"/>
-                <a:tab pos="6511925" algn="l"/>
-                <a:tab pos="6969125" algn="l"/>
-                <a:tab pos="7426325" algn="l"/>
-                <a:tab pos="7883525" algn="l"/>
-                <a:tab pos="8340725" algn="l"/>
-                <a:tab pos="8797925" algn="l"/>
-                <a:tab pos="9255125" algn="l"/>
-                <a:tab pos="9712325" algn="l"/>
-              </a:tabLst>
-              <a:defRPr>
-                <a:solidFill>
-                  <a:srgbClr val="000000"/>
-                </a:solidFill>
-                <a:latin typeface="Arial" charset="0"/>
-                <a:ea typeface="ＭＳ Ｐゴシック" charset="0"/>
-                <a:cs typeface="ＭＳ Ｐゴシック" charset="0"/>
-              </a:defRPr>
-            </a:lvl4pPr>
-            <a:lvl5pPr>
-              <a:tabLst>
-                <a:tab pos="568325" algn="l"/>
-                <a:tab pos="1025525" algn="l"/>
-                <a:tab pos="1482725" algn="l"/>
-                <a:tab pos="1939925" algn="l"/>
-                <a:tab pos="2397125" algn="l"/>
-                <a:tab pos="2854325" algn="l"/>
-                <a:tab pos="3311525" algn="l"/>
-                <a:tab pos="3768725" algn="l"/>
-                <a:tab pos="4225925" algn="l"/>
-                <a:tab pos="4683125" algn="l"/>
-                <a:tab pos="5140325" algn="l"/>
-                <a:tab pos="5597525" algn="l"/>
-                <a:tab pos="6054725" algn="l"/>
-                <a:tab pos="6511925" algn="l"/>
-                <a:tab pos="6969125" algn="l"/>
-                <a:tab pos="7426325" algn="l"/>
-                <a:tab pos="7883525" algn="l"/>
-                <a:tab pos="8340725" algn="l"/>
-                <a:tab pos="8797925" algn="l"/>
-                <a:tab pos="9255125" algn="l"/>
-                <a:tab pos="9712325" algn="l"/>
-              </a:tabLst>
-              <a:defRPr>
-                <a:solidFill>
-                  <a:srgbClr val="000000"/>
-                </a:solidFill>
-                <a:latin typeface="Arial" charset="0"/>
-                <a:ea typeface="ＭＳ Ｐゴシック" charset="0"/>
-                <a:cs typeface="ＭＳ Ｐゴシック" charset="0"/>
-              </a:defRPr>
-            </a:lvl5pPr>
-            <a:lvl6pPr marL="2514600" indent="-228600" fontAlgn="base" hangingPunct="0">
-              <a:lnSpc>
-                <a:spcPct val="93000"/>
-              </a:lnSpc>
-              <a:spcBef>
-                <a:spcPct val="0"/>
-              </a:spcBef>
-              <a:spcAft>
-                <a:spcPct val="0"/>
-              </a:spcAft>
-              <a:buClr>
-                <a:srgbClr val="000000"/>
-              </a:buClr>
-              <a:buSzPct val="100000"/>
-              <a:buFont typeface="Times New Roman" charset="0"/>
-              <a:tabLst>
-                <a:tab pos="568325" algn="l"/>
-                <a:tab pos="1025525" algn="l"/>
-                <a:tab pos="1482725" algn="l"/>
-                <a:tab pos="1939925" algn="l"/>
-                <a:tab pos="2397125" algn="l"/>
-                <a:tab pos="2854325" algn="l"/>
-                <a:tab pos="3311525" algn="l"/>
-                <a:tab pos="3768725" algn="l"/>
-                <a:tab pos="4225925" algn="l"/>
-                <a:tab pos="4683125" algn="l"/>
-                <a:tab pos="5140325" algn="l"/>
-                <a:tab pos="5597525" algn="l"/>
-                <a:tab pos="6054725" algn="l"/>
-                <a:tab pos="6511925" algn="l"/>
-                <a:tab pos="6969125" algn="l"/>
-                <a:tab pos="7426325" algn="l"/>
-                <a:tab pos="7883525" algn="l"/>
-                <a:tab pos="8340725" algn="l"/>
-                <a:tab pos="8797925" algn="l"/>
-                <a:tab pos="9255125" algn="l"/>
-                <a:tab pos="9712325" algn="l"/>
-              </a:tabLst>
-              <a:defRPr>
-                <a:solidFill>
-                  <a:srgbClr val="000000"/>
-                </a:solidFill>
-                <a:latin typeface="Arial" charset="0"/>
-                <a:ea typeface="ＭＳ Ｐゴシック" charset="0"/>
-                <a:cs typeface="ＭＳ Ｐゴシック" charset="0"/>
-              </a:defRPr>
-            </a:lvl6pPr>
-            <a:lvl7pPr marL="2971800" indent="-228600" fontAlgn="base" hangingPunct="0">
-              <a:lnSpc>
-                <a:spcPct val="93000"/>
-              </a:lnSpc>
-              <a:spcBef>
-                <a:spcPct val="0"/>
-              </a:spcBef>
-              <a:spcAft>
-                <a:spcPct val="0"/>
-              </a:spcAft>
-              <a:buClr>
-                <a:srgbClr val="000000"/>
-              </a:buClr>
-              <a:buSzPct val="100000"/>
-              <a:buFont typeface="Times New Roman" charset="0"/>
-              <a:tabLst>
-                <a:tab pos="568325" algn="l"/>
-                <a:tab pos="1025525" algn="l"/>
-                <a:tab pos="1482725" algn="l"/>
-                <a:tab pos="1939925" algn="l"/>
-                <a:tab pos="2397125" algn="l"/>
-                <a:tab pos="2854325" algn="l"/>
-                <a:tab pos="3311525" algn="l"/>
-                <a:tab pos="3768725" algn="l"/>
-                <a:tab pos="4225925" algn="l"/>
-                <a:tab pos="4683125" algn="l"/>
-                <a:tab pos="5140325" algn="l"/>
-                <a:tab pos="5597525" algn="l"/>
-                <a:tab pos="6054725" algn="l"/>
-                <a:tab pos="6511925" algn="l"/>
-                <a:tab pos="6969125" algn="l"/>
-                <a:tab pos="7426325" algn="l"/>
-                <a:tab pos="7883525" algn="l"/>
-                <a:tab pos="8340725" algn="l"/>
-                <a:tab pos="8797925" algn="l"/>
-                <a:tab pos="9255125" algn="l"/>
-                <a:tab pos="9712325" algn="l"/>
-              </a:tabLst>
-              <a:defRPr>
-                <a:solidFill>
-                  <a:srgbClr val="000000"/>
-                </a:solidFill>
-                <a:latin typeface="Arial" charset="0"/>
-                <a:ea typeface="ＭＳ Ｐゴシック" charset="0"/>
-                <a:cs typeface="ＭＳ Ｐゴシック" charset="0"/>
-              </a:defRPr>
-            </a:lvl7pPr>
-            <a:lvl8pPr marL="3429000" indent="-228600" fontAlgn="base" hangingPunct="0">
-              <a:lnSpc>
-                <a:spcPct val="93000"/>
-              </a:lnSpc>
-              <a:spcBef>
-                <a:spcPct val="0"/>
-              </a:spcBef>
-              <a:spcAft>
-                <a:spcPct val="0"/>
-              </a:spcAft>
-              <a:buClr>
-                <a:srgbClr val="000000"/>
-              </a:buClr>
-              <a:buSzPct val="100000"/>
-              <a:buFont typeface="Times New Roman" charset="0"/>
-              <a:tabLst>
-                <a:tab pos="568325" algn="l"/>
-                <a:tab pos="1025525" algn="l"/>
-                <a:tab pos="1482725" algn="l"/>
-                <a:tab pos="1939925" algn="l"/>
-                <a:tab pos="2397125" algn="l"/>
-                <a:tab pos="2854325" algn="l"/>
-                <a:tab pos="3311525" algn="l"/>
-                <a:tab pos="3768725" algn="l"/>
-                <a:tab pos="4225925" algn="l"/>
-                <a:tab pos="4683125" algn="l"/>
-                <a:tab pos="5140325" algn="l"/>
-                <a:tab pos="5597525" algn="l"/>
-                <a:tab pos="6054725" algn="l"/>
-                <a:tab pos="6511925" algn="l"/>
-                <a:tab pos="6969125" algn="l"/>
-                <a:tab pos="7426325" algn="l"/>
-                <a:tab pos="7883525" algn="l"/>
-                <a:tab pos="8340725" algn="l"/>
-                <a:tab pos="8797925" algn="l"/>
-                <a:tab pos="9255125" algn="l"/>
-                <a:tab pos="9712325" algn="l"/>
-              </a:tabLst>
-              <a:defRPr>
-                <a:solidFill>
-                  <a:srgbClr val="000000"/>
-                </a:solidFill>
-                <a:latin typeface="Arial" charset="0"/>
-                <a:ea typeface="ＭＳ Ｐゴシック" charset="0"/>
-                <a:cs typeface="ＭＳ Ｐゴシック" charset="0"/>
-              </a:defRPr>
-            </a:lvl8pPr>
-            <a:lvl9pPr marL="3886200" indent="-228600" fontAlgn="base" hangingPunct="0">
-              <a:lnSpc>
-                <a:spcPct val="93000"/>
-              </a:lnSpc>
-              <a:spcBef>
-                <a:spcPct val="0"/>
-              </a:spcBef>
-              <a:spcAft>
-                <a:spcPct val="0"/>
-              </a:spcAft>
-              <a:buClr>
-                <a:srgbClr val="000000"/>
-              </a:buClr>
-              <a:buSzPct val="100000"/>
-              <a:buFont typeface="Times New Roman" charset="0"/>
-              <a:tabLst>
-                <a:tab pos="568325" algn="l"/>
-                <a:tab pos="1025525" algn="l"/>
-                <a:tab pos="1482725" algn="l"/>
-                <a:tab pos="1939925" algn="l"/>
-                <a:tab pos="2397125" algn="l"/>
-                <a:tab pos="2854325" algn="l"/>
-                <a:tab pos="3311525" algn="l"/>
-                <a:tab pos="3768725" algn="l"/>
-                <a:tab pos="4225925" algn="l"/>
-                <a:tab pos="4683125" algn="l"/>
-                <a:tab pos="5140325" algn="l"/>
-                <a:tab pos="5597525" algn="l"/>
-                <a:tab pos="6054725" algn="l"/>
-                <a:tab pos="6511925" algn="l"/>
-                <a:tab pos="6969125" algn="l"/>
-                <a:tab pos="7426325" algn="l"/>
-                <a:tab pos="7883525" algn="l"/>
-                <a:tab pos="8340725" algn="l"/>
-                <a:tab pos="8797925" algn="l"/>
-                <a:tab pos="9255125" algn="l"/>
-                <a:tab pos="9712325" algn="l"/>
-              </a:tabLst>
-              <a:defRPr>
-                <a:solidFill>
-                  <a:srgbClr val="000000"/>
-                </a:solidFill>
-                <a:latin typeface="Arial" charset="0"/>
-                <a:ea typeface="ＭＳ Ｐゴシック" charset="0"/>
-                <a:cs typeface="ＭＳ Ｐゴシック" charset="0"/>
-              </a:defRPr>
-            </a:lvl9pPr>
-          </a:lstStyle>
-          <a:p>
-            <a:pPr>
-              <a:spcAft>
-                <a:spcPts val="1425"/>
-              </a:spcAft>
-              <a:buFont typeface="Arial" charset="0"/>
-              <a:buChar char="•"/>
-              <a:defRPr/>
-            </a:pPr>
-            <a:r>
-              <a:rPr lang="en-US" sz="4000" smtClean="0">
-                <a:cs typeface="Arial Unicode MS" charset="0"/>
-              </a:rPr>
-              <a:t>Best practices used by the best software engineers whose business is development of quality software</a:t>
-            </a:r>
-          </a:p>
-          <a:p>
-            <a:pPr lvl="1">
-              <a:spcAft>
-                <a:spcPts val="1138"/>
-              </a:spcAft>
-              <a:buFont typeface="Arial" charset="0"/>
-              <a:buChar char="•"/>
-              <a:defRPr/>
-            </a:pPr>
-            <a:r>
-              <a:rPr lang="en-US" sz="3600" smtClean="0"/>
-              <a:t>They don’t always have formal training</a:t>
-            </a:r>
-          </a:p>
-          <a:p>
-            <a:pPr lvl="1">
-              <a:spcAft>
-                <a:spcPts val="1138"/>
-              </a:spcAft>
-              <a:buFont typeface="Arial" charset="0"/>
-              <a:buChar char="•"/>
-              <a:defRPr/>
-            </a:pPr>
-            <a:r>
-              <a:rPr lang="en-US" sz="3600" smtClean="0"/>
-              <a:t>They don’t always follow all the practices</a:t>
-            </a:r>
-          </a:p>
-          <a:p>
-            <a:pPr lvl="1">
-              <a:spcAft>
-                <a:spcPts val="1138"/>
-              </a:spcAft>
-              <a:buFont typeface="Arial" charset="0"/>
-              <a:buChar char="•"/>
-              <a:defRPr/>
-            </a:pPr>
-            <a:r>
-              <a:rPr lang="en-US" sz="3600" smtClean="0"/>
-              <a:t>Growing evidence supported by empirical studies</a:t>
-            </a:r>
-          </a:p>
-          <a:p>
-            <a:pPr marL="969963" lvl="1">
-              <a:spcAft>
-                <a:spcPts val="1138"/>
-              </a:spcAft>
-              <a:buClrTx/>
-              <a:buFontTx/>
-              <a:buNone/>
-              <a:defRPr/>
-            </a:pPr>
-            <a:endParaRPr lang="en-US" sz="3600" smtClean="0"/>
-          </a:p>
-        </p:txBody>
-      </p:sp>
-    </p:spTree>
-  </p:cSld>
-  <p:clrMapOvr>
-    <a:masterClrMapping/>
-  </p:clrMapOvr>
-  <p:transition spd="med"/>
-  <p:timing>
-    <p:tnLst>
-      <p:par>
-        <p:cTn id="1" dur="indefinite" restart="never" nodeType="tmRoot">
-          <p:childTnLst>
-            <p:seq concurrent="1" nextAc="seek">
-              <p:cTn id="2" dur="indefinite" nodeType="mainSeq"/>
-              <p:prevCondLst>
-                <p:cond evt="onPrev" delay="0">
-                  <p:tgtEl>
-                    <p:sldTgt/>
-                  </p:tgtEl>
-                </p:cond>
-              </p:prevCondLst>
-              <p:nextCondLst>
-                <p:cond evt="onNext" delay="0">
-                  <p:tgtEl>
-                    <p:sldTgt/>
-                  </p:tgtEl>
-                </p:cond>
-              </p:nextCondLst>
-            </p:seq>
-          </p:childTnLst>
-        </p:cTn>
-      </p:par>
-    </p:tnLst>
-  </p:timing>
-</p:sld>
-</file>
-
-<file path=ppt/slides/slide12.xml><?xml version="1.0" encoding="utf-8"?>
-<p:sld xmlns:a="http://schemas.openxmlformats.org/drawingml/2006/main" xmlns:r="http://schemas.openxmlformats.org/officeDocument/2006/relationships" xmlns:p="http://schemas.openxmlformats.org/presentationml/2006/main">
-  <p:cSld>
-    <p:spTree>
-      <p:nvGrpSpPr>
-        <p:cNvPr id="1" name=""/>
-        <p:cNvGrpSpPr/>
-        <p:nvPr/>
-      </p:nvGrpSpPr>
-      <p:grpSpPr>
-        <a:xfrm>
-          <a:off x="0" y="0"/>
-          <a:ext cx="0" cy="0"/>
-          <a:chOff x="0" y="0"/>
-          <a:chExt cx="0" cy="0"/>
-        </a:xfrm>
-      </p:grpSpPr>
-      <p:sp>
-        <p:nvSpPr>
           <p:cNvPr id="34817" name="Title 1"/>
           <p:cNvSpPr>
             <a:spLocks noGrp="1"/>
@@ -17145,7 +16214,7 @@
 </p:sld>
 </file>
 
-<file path=ppt/slides/slide13.xml><?xml version="1.0" encoding="utf-8"?>
+<file path=ppt/slides/slide12.xml><?xml version="1.0" encoding="utf-8"?>
 <p:sld xmlns:a="http://schemas.openxmlformats.org/drawingml/2006/main" xmlns:r="http://schemas.openxmlformats.org/officeDocument/2006/relationships" xmlns:p="http://schemas.openxmlformats.org/presentationml/2006/main">
   <p:cSld>
     <p:spTree>
@@ -17618,7 +16687,7 @@
 </p:sld>
 </file>
 
-<file path=ppt/slides/slide14.xml><?xml version="1.0" encoding="utf-8"?>
+<file path=ppt/slides/slide13.xml><?xml version="1.0" encoding="utf-8"?>
 <p:sld xmlns:a="http://schemas.openxmlformats.org/drawingml/2006/main" xmlns:r="http://schemas.openxmlformats.org/officeDocument/2006/relationships" xmlns:p="http://schemas.openxmlformats.org/presentationml/2006/main">
   <p:cSld>
     <p:bg>
@@ -19204,7 +18273,7 @@
 </p:sld>
 </file>
 
-<file path=ppt/slides/slide15.xml><?xml version="1.0" encoding="utf-8"?>
+<file path=ppt/slides/slide14.xml><?xml version="1.0" encoding="utf-8"?>
 <p:sld xmlns:a="http://schemas.openxmlformats.org/drawingml/2006/main" xmlns:r="http://schemas.openxmlformats.org/officeDocument/2006/relationships" xmlns:p="http://schemas.openxmlformats.org/presentationml/2006/main">
   <p:cSld>
     <p:bg>
@@ -19808,7 +18877,7 @@
 </p:sld>
 </file>
 
-<file path=ppt/slides/slide16.xml><?xml version="1.0" encoding="utf-8"?>
+<file path=ppt/slides/slide15.xml><?xml version="1.0" encoding="utf-8"?>
 <p:sld xmlns:a="http://schemas.openxmlformats.org/drawingml/2006/main" xmlns:r="http://schemas.openxmlformats.org/officeDocument/2006/relationships" xmlns:p="http://schemas.openxmlformats.org/presentationml/2006/main">
   <p:cSld>
     <p:spTree>
@@ -19960,7 +19029,7 @@
 </p:sld>
 </file>
 
-<file path=ppt/slides/slide17.xml><?xml version="1.0" encoding="utf-8"?>
+<file path=ppt/slides/slide16.xml><?xml version="1.0" encoding="utf-8"?>
 <p:sld xmlns:a="http://schemas.openxmlformats.org/drawingml/2006/main" xmlns:r="http://schemas.openxmlformats.org/officeDocument/2006/relationships" xmlns:p="http://schemas.openxmlformats.org/presentationml/2006/main">
   <p:cSld>
     <p:bg>
@@ -20937,7 +20006,7 @@
 </p:sld>
 </file>
 
-<file path=ppt/slides/slide18.xml><?xml version="1.0" encoding="utf-8"?>
+<file path=ppt/slides/slide17.xml><?xml version="1.0" encoding="utf-8"?>
 <p:sld xmlns:a="http://schemas.openxmlformats.org/drawingml/2006/main" xmlns:r="http://schemas.openxmlformats.org/officeDocument/2006/relationships" xmlns:p="http://schemas.openxmlformats.org/presentationml/2006/main">
   <p:cSld>
     <p:bg>
@@ -21901,7 +20970,7 @@
 </p:sld>
 </file>
 
-<file path=ppt/slides/slide19.xml><?xml version="1.0" encoding="utf-8"?>
+<file path=ppt/slides/slide18.xml><?xml version="1.0" encoding="utf-8"?>
 <p:sld xmlns:a="http://schemas.openxmlformats.org/drawingml/2006/main" xmlns:r="http://schemas.openxmlformats.org/officeDocument/2006/relationships" xmlns:p="http://schemas.openxmlformats.org/presentationml/2006/main">
   <p:cSld>
     <p:spTree>
@@ -22572,6 +21641,645 @@
     <p:extLst>
       <p:ext uri="{BB962C8B-B14F-4D97-AF65-F5344CB8AC3E}">
         <p14:creationId xmlns:p14="http://schemas.microsoft.com/office/powerpoint/2010/main" val="1991673306"/>
+      </p:ext>
+    </p:extLst>
+  </p:cSld>
+  <p:clrMapOvr>
+    <a:masterClrMapping/>
+  </p:clrMapOvr>
+  <p:timing>
+    <p:tnLst>
+      <p:par>
+        <p:cTn id="1" dur="indefinite" restart="never" nodeType="tmRoot"/>
+      </p:par>
+    </p:tnLst>
+  </p:timing>
+</p:sld>
+</file>
+
+<file path=ppt/slides/slide19.xml><?xml version="1.0" encoding="utf-8"?>
+<p:sld xmlns:a="http://schemas.openxmlformats.org/drawingml/2006/main" xmlns:r="http://schemas.openxmlformats.org/officeDocument/2006/relationships" xmlns:p="http://schemas.openxmlformats.org/presentationml/2006/main">
+  <p:cSld>
+    <p:spTree>
+      <p:nvGrpSpPr>
+        <p:cNvPr id="1" name=""/>
+        <p:cNvGrpSpPr/>
+        <p:nvPr/>
+      </p:nvGrpSpPr>
+      <p:grpSpPr>
+        <a:xfrm>
+          <a:off x="0" y="0"/>
+          <a:ext cx="0" cy="0"/>
+          <a:chOff x="0" y="0"/>
+          <a:chExt cx="0" cy="0"/>
+        </a:xfrm>
+      </p:grpSpPr>
+      <p:sp>
+        <p:nvSpPr>
+          <p:cNvPr id="47105" name="Rectangle 1"/>
+          <p:cNvSpPr>
+            <a:spLocks noChangeArrowheads="1"/>
+          </p:cNvSpPr>
+          <p:nvPr/>
+        </p:nvSpPr>
+        <p:spPr bwMode="auto">
+          <a:xfrm>
+            <a:off x="392112" y="2457877"/>
+            <a:ext cx="9172896" cy="3283976"/>
+          </a:xfrm>
+          <a:prstGeom prst="rect">
+            <a:avLst/>
+          </a:prstGeom>
+          <a:noFill/>
+          <a:ln>
+            <a:noFill/>
+          </a:ln>
+          <a:extLst>
+            <a:ext uri="{909E8E84-426E-40dd-AFC4-6F175D3DCCD1}">
+              <a14:hiddenFill xmlns="" xmlns:a14="http://schemas.microsoft.com/office/drawing/2010/main">
+                <a:solidFill>
+                  <a:srgbClr val="FFFFFF"/>
+                </a:solidFill>
+              </a14:hiddenFill>
+            </a:ext>
+            <a:ext uri="{91240B29-F687-4f45-9708-019B960494DF}">
+              <a14:hiddenLine xmlns="" xmlns:a14="http://schemas.microsoft.com/office/drawing/2010/main" w="9525">
+                <a:solidFill>
+                  <a:srgbClr val="000000"/>
+                </a:solidFill>
+                <a:miter lim="800000"/>
+                <a:headEnd/>
+                <a:tailEnd/>
+              </a14:hiddenLine>
+            </a:ext>
+          </a:extLst>
+        </p:spPr>
+        <p:txBody>
+          <a:bodyPr wrap="none">
+            <a:spAutoFit/>
+          </a:bodyPr>
+          <a:lstStyle/>
+          <a:p>
+            <a:r>
+              <a:rPr lang="en-US" sz="2800" b="1" dirty="0" smtClean="0">
+                <a:solidFill>
+                  <a:srgbClr val="000000"/>
+                </a:solidFill>
+              </a:rPr>
+              <a:t>Workshop Website</a:t>
+            </a:r>
+            <a:endParaRPr lang="en-US" sz="2800" b="1" dirty="0">
+              <a:solidFill>
+                <a:srgbClr val="000000"/>
+              </a:solidFill>
+            </a:endParaRPr>
+          </a:p>
+          <a:p>
+            <a:r>
+              <a:rPr lang="en-US" sz="2800" dirty="0">
+                <a:solidFill>
+                  <a:schemeClr val="accent6"/>
+                </a:solidFill>
+              </a:rPr>
+              <a:t>http://sarahlrstevens.info/2017-08-02-chicago-frb</a:t>
+            </a:r>
+            <a:r>
+              <a:rPr lang="en-US" sz="2800" dirty="0" smtClean="0">
+                <a:solidFill>
+                  <a:schemeClr val="accent6"/>
+                </a:solidFill>
+              </a:rPr>
+              <a:t>/</a:t>
+            </a:r>
+          </a:p>
+          <a:p>
+            <a:endParaRPr lang="en-US" sz="2800" dirty="0" smtClean="0">
+              <a:solidFill>
+                <a:srgbClr val="000000"/>
+              </a:solidFill>
+            </a:endParaRPr>
+          </a:p>
+          <a:p>
+            <a:r>
+              <a:rPr lang="en-US" sz="2800" b="1" dirty="0" err="1" smtClean="0">
+                <a:solidFill>
+                  <a:srgbClr val="000000"/>
+                </a:solidFill>
+              </a:rPr>
+              <a:t>Etherpad</a:t>
+            </a:r>
+            <a:r>
+              <a:rPr lang="en-US" sz="2800" b="1" dirty="0" smtClean="0">
+                <a:solidFill>
+                  <a:srgbClr val="000000"/>
+                </a:solidFill>
+              </a:rPr>
+              <a:t> (for collaborative notes)</a:t>
+            </a:r>
+          </a:p>
+          <a:p>
+            <a:r>
+              <a:rPr lang="en-US" sz="2700" dirty="0">
+                <a:solidFill>
+                  <a:schemeClr val="accent6"/>
+                </a:solidFill>
+              </a:rPr>
+              <a:t>http://</a:t>
+            </a:r>
+            <a:r>
+              <a:rPr lang="en-US" sz="2700" dirty="0" smtClean="0">
+                <a:solidFill>
+                  <a:schemeClr val="accent6"/>
+                </a:solidFill>
+              </a:rPr>
+              <a:t>pad.software-carpentry.org/2017-08-02-chicago-frb</a:t>
+            </a:r>
+          </a:p>
+          <a:p>
+            <a:endParaRPr lang="en-US" sz="2800" dirty="0" smtClean="0">
+              <a:solidFill>
+                <a:srgbClr val="000000"/>
+              </a:solidFill>
+            </a:endParaRPr>
+          </a:p>
+          <a:p>
+            <a:r>
+              <a:rPr lang="en-US" sz="2800" b="1" dirty="0" smtClean="0">
+                <a:solidFill>
+                  <a:srgbClr val="000000"/>
+                </a:solidFill>
+              </a:rPr>
+              <a:t>Pre-Workshop Survey </a:t>
+            </a:r>
+          </a:p>
+          <a:p>
+            <a:r>
+              <a:rPr lang="en-US" sz="2800" dirty="0" smtClean="0">
+                <a:solidFill>
+                  <a:schemeClr val="accent6"/>
+                </a:solidFill>
+              </a:rPr>
+              <a:t>https</a:t>
+            </a:r>
+            <a:r>
+              <a:rPr lang="en-US" sz="2800" dirty="0">
+                <a:solidFill>
+                  <a:schemeClr val="accent6"/>
+                </a:solidFill>
+              </a:rPr>
+              <a:t>://</a:t>
+            </a:r>
+            <a:r>
+              <a:rPr lang="en-US" sz="2800" dirty="0" err="1" smtClean="0">
+                <a:solidFill>
+                  <a:schemeClr val="accent6"/>
+                </a:solidFill>
+              </a:rPr>
+              <a:t>www.surveymonkey.com</a:t>
+            </a:r>
+            <a:r>
+              <a:rPr lang="en-US" sz="2800" dirty="0" smtClean="0">
+                <a:solidFill>
+                  <a:schemeClr val="accent6"/>
+                </a:solidFill>
+              </a:rPr>
+              <a:t>/r/swc_pre_workshop_v1</a:t>
+            </a:r>
+            <a:endParaRPr lang="en-US" sz="2800" dirty="0">
+              <a:solidFill>
+                <a:schemeClr val="accent6"/>
+              </a:solidFill>
+            </a:endParaRPr>
+          </a:p>
+        </p:txBody>
+      </p:sp>
+      <p:sp>
+        <p:nvSpPr>
+          <p:cNvPr id="4" name="Text Box 1"/>
+          <p:cNvSpPr txBox="1">
+            <a:spLocks noChangeArrowheads="1"/>
+          </p:cNvSpPr>
+          <p:nvPr/>
+        </p:nvSpPr>
+        <p:spPr bwMode="auto">
+          <a:xfrm>
+            <a:off x="925512" y="303213"/>
+            <a:ext cx="8166100" cy="1258887"/>
+          </a:xfrm>
+          <a:prstGeom prst="rect">
+            <a:avLst/>
+          </a:prstGeom>
+          <a:noFill/>
+          <a:ln>
+            <a:noFill/>
+          </a:ln>
+          <a:effectLst/>
+          <a:extLst>
+            <a:ext uri="{909E8E84-426E-40dd-AFC4-6F175D3DCCD1}">
+              <a14:hiddenFill xmlns="" xmlns:a14="http://schemas.microsoft.com/office/drawing/2010/main">
+                <a:solidFill>
+                  <a:srgbClr val="FFFFFF"/>
+                </a:solidFill>
+              </a14:hiddenFill>
+            </a:ext>
+            <a:ext uri="{91240B29-F687-4f45-9708-019B960494DF}">
+              <a14:hiddenLine xmlns="" xmlns:a14="http://schemas.microsoft.com/office/drawing/2010/main" w="9525" cap="flat">
+                <a:solidFill>
+                  <a:srgbClr val="3465A4"/>
+                </a:solidFill>
+                <a:round/>
+                <a:headEnd/>
+                <a:tailEnd/>
+              </a14:hiddenLine>
+            </a:ext>
+            <a:ext uri="{AF507438-7753-43e0-B8FC-AC1667EBCBE1}">
+              <a14:hiddenEffects xmlns="" xmlns:a14="http://schemas.microsoft.com/office/drawing/2010/main">
+                <a:effectLst>
+                  <a:outerShdw blurRad="63500" dist="38099" dir="2700000" algn="ctr" rotWithShape="0">
+                    <a:srgbClr val="000000">
+                      <a:alpha val="74998"/>
+                    </a:srgbClr>
+                  </a:outerShdw>
+                </a:effectLst>
+              </a14:hiddenEffects>
+            </a:ext>
+          </a:extLst>
+        </p:spPr>
+        <p:txBody>
+          <a:bodyPr lIns="100800" tIns="50400" rIns="100800" bIns="50400" anchor="ctr"/>
+          <a:lstStyle>
+            <a:lvl1pPr>
+              <a:tabLst>
+                <a:tab pos="0" algn="l"/>
+                <a:tab pos="457200" algn="l"/>
+                <a:tab pos="914400" algn="l"/>
+                <a:tab pos="1371600" algn="l"/>
+                <a:tab pos="1828800" algn="l"/>
+                <a:tab pos="2286000" algn="l"/>
+                <a:tab pos="2743200" algn="l"/>
+                <a:tab pos="3200400" algn="l"/>
+                <a:tab pos="3657600" algn="l"/>
+                <a:tab pos="4114800" algn="l"/>
+                <a:tab pos="4572000" algn="l"/>
+                <a:tab pos="5029200" algn="l"/>
+                <a:tab pos="5486400" algn="l"/>
+                <a:tab pos="5943600" algn="l"/>
+                <a:tab pos="6400800" algn="l"/>
+                <a:tab pos="6858000" algn="l"/>
+                <a:tab pos="7315200" algn="l"/>
+                <a:tab pos="7772400" algn="l"/>
+                <a:tab pos="8229600" algn="l"/>
+                <a:tab pos="8686800" algn="l"/>
+                <a:tab pos="9144000" algn="l"/>
+              </a:tabLst>
+              <a:defRPr>
+                <a:solidFill>
+                  <a:srgbClr val="000000"/>
+                </a:solidFill>
+                <a:latin typeface="Arial" charset="0"/>
+                <a:ea typeface="ＭＳ Ｐゴシック" charset="0"/>
+                <a:cs typeface="ＭＳ Ｐゴシック" charset="0"/>
+              </a:defRPr>
+            </a:lvl1pPr>
+            <a:lvl2pPr>
+              <a:tabLst>
+                <a:tab pos="0" algn="l"/>
+                <a:tab pos="457200" algn="l"/>
+                <a:tab pos="914400" algn="l"/>
+                <a:tab pos="1371600" algn="l"/>
+                <a:tab pos="1828800" algn="l"/>
+                <a:tab pos="2286000" algn="l"/>
+                <a:tab pos="2743200" algn="l"/>
+                <a:tab pos="3200400" algn="l"/>
+                <a:tab pos="3657600" algn="l"/>
+                <a:tab pos="4114800" algn="l"/>
+                <a:tab pos="4572000" algn="l"/>
+                <a:tab pos="5029200" algn="l"/>
+                <a:tab pos="5486400" algn="l"/>
+                <a:tab pos="5943600" algn="l"/>
+                <a:tab pos="6400800" algn="l"/>
+                <a:tab pos="6858000" algn="l"/>
+                <a:tab pos="7315200" algn="l"/>
+                <a:tab pos="7772400" algn="l"/>
+                <a:tab pos="8229600" algn="l"/>
+                <a:tab pos="8686800" algn="l"/>
+                <a:tab pos="9144000" algn="l"/>
+              </a:tabLst>
+              <a:defRPr>
+                <a:solidFill>
+                  <a:srgbClr val="000000"/>
+                </a:solidFill>
+                <a:latin typeface="Arial" charset="0"/>
+                <a:ea typeface="ＭＳ Ｐゴシック" charset="0"/>
+                <a:cs typeface="ＭＳ Ｐゴシック" charset="0"/>
+              </a:defRPr>
+            </a:lvl2pPr>
+            <a:lvl3pPr>
+              <a:tabLst>
+                <a:tab pos="0" algn="l"/>
+                <a:tab pos="457200" algn="l"/>
+                <a:tab pos="914400" algn="l"/>
+                <a:tab pos="1371600" algn="l"/>
+                <a:tab pos="1828800" algn="l"/>
+                <a:tab pos="2286000" algn="l"/>
+                <a:tab pos="2743200" algn="l"/>
+                <a:tab pos="3200400" algn="l"/>
+                <a:tab pos="3657600" algn="l"/>
+                <a:tab pos="4114800" algn="l"/>
+                <a:tab pos="4572000" algn="l"/>
+                <a:tab pos="5029200" algn="l"/>
+                <a:tab pos="5486400" algn="l"/>
+                <a:tab pos="5943600" algn="l"/>
+                <a:tab pos="6400800" algn="l"/>
+                <a:tab pos="6858000" algn="l"/>
+                <a:tab pos="7315200" algn="l"/>
+                <a:tab pos="7772400" algn="l"/>
+                <a:tab pos="8229600" algn="l"/>
+                <a:tab pos="8686800" algn="l"/>
+                <a:tab pos="9144000" algn="l"/>
+              </a:tabLst>
+              <a:defRPr>
+                <a:solidFill>
+                  <a:srgbClr val="000000"/>
+                </a:solidFill>
+                <a:latin typeface="Arial" charset="0"/>
+                <a:ea typeface="ＭＳ Ｐゴシック" charset="0"/>
+                <a:cs typeface="ＭＳ Ｐゴシック" charset="0"/>
+              </a:defRPr>
+            </a:lvl3pPr>
+            <a:lvl4pPr>
+              <a:tabLst>
+                <a:tab pos="0" algn="l"/>
+                <a:tab pos="457200" algn="l"/>
+                <a:tab pos="914400" algn="l"/>
+                <a:tab pos="1371600" algn="l"/>
+                <a:tab pos="1828800" algn="l"/>
+                <a:tab pos="2286000" algn="l"/>
+                <a:tab pos="2743200" algn="l"/>
+                <a:tab pos="3200400" algn="l"/>
+                <a:tab pos="3657600" algn="l"/>
+                <a:tab pos="4114800" algn="l"/>
+                <a:tab pos="4572000" algn="l"/>
+                <a:tab pos="5029200" algn="l"/>
+                <a:tab pos="5486400" algn="l"/>
+                <a:tab pos="5943600" algn="l"/>
+                <a:tab pos="6400800" algn="l"/>
+                <a:tab pos="6858000" algn="l"/>
+                <a:tab pos="7315200" algn="l"/>
+                <a:tab pos="7772400" algn="l"/>
+                <a:tab pos="8229600" algn="l"/>
+                <a:tab pos="8686800" algn="l"/>
+                <a:tab pos="9144000" algn="l"/>
+              </a:tabLst>
+              <a:defRPr>
+                <a:solidFill>
+                  <a:srgbClr val="000000"/>
+                </a:solidFill>
+                <a:latin typeface="Arial" charset="0"/>
+                <a:ea typeface="ＭＳ Ｐゴシック" charset="0"/>
+                <a:cs typeface="ＭＳ Ｐゴシック" charset="0"/>
+              </a:defRPr>
+            </a:lvl4pPr>
+            <a:lvl5pPr>
+              <a:tabLst>
+                <a:tab pos="0" algn="l"/>
+                <a:tab pos="457200" algn="l"/>
+                <a:tab pos="914400" algn="l"/>
+                <a:tab pos="1371600" algn="l"/>
+                <a:tab pos="1828800" algn="l"/>
+                <a:tab pos="2286000" algn="l"/>
+                <a:tab pos="2743200" algn="l"/>
+                <a:tab pos="3200400" algn="l"/>
+                <a:tab pos="3657600" algn="l"/>
+                <a:tab pos="4114800" algn="l"/>
+                <a:tab pos="4572000" algn="l"/>
+                <a:tab pos="5029200" algn="l"/>
+                <a:tab pos="5486400" algn="l"/>
+                <a:tab pos="5943600" algn="l"/>
+                <a:tab pos="6400800" algn="l"/>
+                <a:tab pos="6858000" algn="l"/>
+                <a:tab pos="7315200" algn="l"/>
+                <a:tab pos="7772400" algn="l"/>
+                <a:tab pos="8229600" algn="l"/>
+                <a:tab pos="8686800" algn="l"/>
+                <a:tab pos="9144000" algn="l"/>
+              </a:tabLst>
+              <a:defRPr>
+                <a:solidFill>
+                  <a:srgbClr val="000000"/>
+                </a:solidFill>
+                <a:latin typeface="Arial" charset="0"/>
+                <a:ea typeface="ＭＳ Ｐゴシック" charset="0"/>
+                <a:cs typeface="ＭＳ Ｐゴシック" charset="0"/>
+              </a:defRPr>
+            </a:lvl5pPr>
+            <a:lvl6pPr marL="2514600" indent="-228600" fontAlgn="base" hangingPunct="0">
+              <a:lnSpc>
+                <a:spcPct val="93000"/>
+              </a:lnSpc>
+              <a:spcBef>
+                <a:spcPct val="0"/>
+              </a:spcBef>
+              <a:spcAft>
+                <a:spcPct val="0"/>
+              </a:spcAft>
+              <a:buClr>
+                <a:srgbClr val="000000"/>
+              </a:buClr>
+              <a:buSzPct val="100000"/>
+              <a:buFont typeface="Times New Roman" charset="0"/>
+              <a:tabLst>
+                <a:tab pos="0" algn="l"/>
+                <a:tab pos="457200" algn="l"/>
+                <a:tab pos="914400" algn="l"/>
+                <a:tab pos="1371600" algn="l"/>
+                <a:tab pos="1828800" algn="l"/>
+                <a:tab pos="2286000" algn="l"/>
+                <a:tab pos="2743200" algn="l"/>
+                <a:tab pos="3200400" algn="l"/>
+                <a:tab pos="3657600" algn="l"/>
+                <a:tab pos="4114800" algn="l"/>
+                <a:tab pos="4572000" algn="l"/>
+                <a:tab pos="5029200" algn="l"/>
+                <a:tab pos="5486400" algn="l"/>
+                <a:tab pos="5943600" algn="l"/>
+                <a:tab pos="6400800" algn="l"/>
+                <a:tab pos="6858000" algn="l"/>
+                <a:tab pos="7315200" algn="l"/>
+                <a:tab pos="7772400" algn="l"/>
+                <a:tab pos="8229600" algn="l"/>
+                <a:tab pos="8686800" algn="l"/>
+                <a:tab pos="9144000" algn="l"/>
+              </a:tabLst>
+              <a:defRPr>
+                <a:solidFill>
+                  <a:srgbClr val="000000"/>
+                </a:solidFill>
+                <a:latin typeface="Arial" charset="0"/>
+                <a:ea typeface="ＭＳ Ｐゴシック" charset="0"/>
+                <a:cs typeface="ＭＳ Ｐゴシック" charset="0"/>
+              </a:defRPr>
+            </a:lvl6pPr>
+            <a:lvl7pPr marL="2971800" indent="-228600" fontAlgn="base" hangingPunct="0">
+              <a:lnSpc>
+                <a:spcPct val="93000"/>
+              </a:lnSpc>
+              <a:spcBef>
+                <a:spcPct val="0"/>
+              </a:spcBef>
+              <a:spcAft>
+                <a:spcPct val="0"/>
+              </a:spcAft>
+              <a:buClr>
+                <a:srgbClr val="000000"/>
+              </a:buClr>
+              <a:buSzPct val="100000"/>
+              <a:buFont typeface="Times New Roman" charset="0"/>
+              <a:tabLst>
+                <a:tab pos="0" algn="l"/>
+                <a:tab pos="457200" algn="l"/>
+                <a:tab pos="914400" algn="l"/>
+                <a:tab pos="1371600" algn="l"/>
+                <a:tab pos="1828800" algn="l"/>
+                <a:tab pos="2286000" algn="l"/>
+                <a:tab pos="2743200" algn="l"/>
+                <a:tab pos="3200400" algn="l"/>
+                <a:tab pos="3657600" algn="l"/>
+                <a:tab pos="4114800" algn="l"/>
+                <a:tab pos="4572000" algn="l"/>
+                <a:tab pos="5029200" algn="l"/>
+                <a:tab pos="5486400" algn="l"/>
+                <a:tab pos="5943600" algn="l"/>
+                <a:tab pos="6400800" algn="l"/>
+                <a:tab pos="6858000" algn="l"/>
+                <a:tab pos="7315200" algn="l"/>
+                <a:tab pos="7772400" algn="l"/>
+                <a:tab pos="8229600" algn="l"/>
+                <a:tab pos="8686800" algn="l"/>
+                <a:tab pos="9144000" algn="l"/>
+              </a:tabLst>
+              <a:defRPr>
+                <a:solidFill>
+                  <a:srgbClr val="000000"/>
+                </a:solidFill>
+                <a:latin typeface="Arial" charset="0"/>
+                <a:ea typeface="ＭＳ Ｐゴシック" charset="0"/>
+                <a:cs typeface="ＭＳ Ｐゴシック" charset="0"/>
+              </a:defRPr>
+            </a:lvl7pPr>
+            <a:lvl8pPr marL="3429000" indent="-228600" fontAlgn="base" hangingPunct="0">
+              <a:lnSpc>
+                <a:spcPct val="93000"/>
+              </a:lnSpc>
+              <a:spcBef>
+                <a:spcPct val="0"/>
+              </a:spcBef>
+              <a:spcAft>
+                <a:spcPct val="0"/>
+              </a:spcAft>
+              <a:buClr>
+                <a:srgbClr val="000000"/>
+              </a:buClr>
+              <a:buSzPct val="100000"/>
+              <a:buFont typeface="Times New Roman" charset="0"/>
+              <a:tabLst>
+                <a:tab pos="0" algn="l"/>
+                <a:tab pos="457200" algn="l"/>
+                <a:tab pos="914400" algn="l"/>
+                <a:tab pos="1371600" algn="l"/>
+                <a:tab pos="1828800" algn="l"/>
+                <a:tab pos="2286000" algn="l"/>
+                <a:tab pos="2743200" algn="l"/>
+                <a:tab pos="3200400" algn="l"/>
+                <a:tab pos="3657600" algn="l"/>
+                <a:tab pos="4114800" algn="l"/>
+                <a:tab pos="4572000" algn="l"/>
+                <a:tab pos="5029200" algn="l"/>
+                <a:tab pos="5486400" algn="l"/>
+                <a:tab pos="5943600" algn="l"/>
+                <a:tab pos="6400800" algn="l"/>
+                <a:tab pos="6858000" algn="l"/>
+                <a:tab pos="7315200" algn="l"/>
+                <a:tab pos="7772400" algn="l"/>
+                <a:tab pos="8229600" algn="l"/>
+                <a:tab pos="8686800" algn="l"/>
+                <a:tab pos="9144000" algn="l"/>
+              </a:tabLst>
+              <a:defRPr>
+                <a:solidFill>
+                  <a:srgbClr val="000000"/>
+                </a:solidFill>
+                <a:latin typeface="Arial" charset="0"/>
+                <a:ea typeface="ＭＳ Ｐゴシック" charset="0"/>
+                <a:cs typeface="ＭＳ Ｐゴシック" charset="0"/>
+              </a:defRPr>
+            </a:lvl8pPr>
+            <a:lvl9pPr marL="3886200" indent="-228600" fontAlgn="base" hangingPunct="0">
+              <a:lnSpc>
+                <a:spcPct val="93000"/>
+              </a:lnSpc>
+              <a:spcBef>
+                <a:spcPct val="0"/>
+              </a:spcBef>
+              <a:spcAft>
+                <a:spcPct val="0"/>
+              </a:spcAft>
+              <a:buClr>
+                <a:srgbClr val="000000"/>
+              </a:buClr>
+              <a:buSzPct val="100000"/>
+              <a:buFont typeface="Times New Roman" charset="0"/>
+              <a:tabLst>
+                <a:tab pos="0" algn="l"/>
+                <a:tab pos="457200" algn="l"/>
+                <a:tab pos="914400" algn="l"/>
+                <a:tab pos="1371600" algn="l"/>
+                <a:tab pos="1828800" algn="l"/>
+                <a:tab pos="2286000" algn="l"/>
+                <a:tab pos="2743200" algn="l"/>
+                <a:tab pos="3200400" algn="l"/>
+                <a:tab pos="3657600" algn="l"/>
+                <a:tab pos="4114800" algn="l"/>
+                <a:tab pos="4572000" algn="l"/>
+                <a:tab pos="5029200" algn="l"/>
+                <a:tab pos="5486400" algn="l"/>
+                <a:tab pos="5943600" algn="l"/>
+                <a:tab pos="6400800" algn="l"/>
+                <a:tab pos="6858000" algn="l"/>
+                <a:tab pos="7315200" algn="l"/>
+                <a:tab pos="7772400" algn="l"/>
+                <a:tab pos="8229600" algn="l"/>
+                <a:tab pos="8686800" algn="l"/>
+                <a:tab pos="9144000" algn="l"/>
+              </a:tabLst>
+              <a:defRPr>
+                <a:solidFill>
+                  <a:srgbClr val="000000"/>
+                </a:solidFill>
+                <a:latin typeface="Arial" charset="0"/>
+                <a:ea typeface="ＭＳ Ｐゴシック" charset="0"/>
+                <a:cs typeface="ＭＳ Ｐゴシック" charset="0"/>
+              </a:defRPr>
+            </a:lvl9pPr>
+          </a:lstStyle>
+          <a:p>
+            <a:pPr algn="ctr">
+              <a:buClrTx/>
+              <a:buFontTx/>
+              <a:buNone/>
+              <a:defRPr/>
+            </a:pPr>
+            <a:r>
+              <a:rPr lang="en-US" sz="4400" dirty="0" smtClean="0"/>
+              <a:t>Welcome to the Workshop!</a:t>
+            </a:r>
+          </a:p>
+        </p:txBody>
+      </p:sp>
+    </p:spTree>
+    <p:extLst>
+      <p:ext uri="{BB962C8B-B14F-4D97-AF65-F5344CB8AC3E}">
+        <p14:creationId xmlns:p14="http://schemas.microsoft.com/office/powerpoint/2010/main" val="172946089"/>
       </p:ext>
     </p:extLst>
   </p:cSld>
@@ -23263,645 +22971,6 @@
 </file>
 
 <file path=ppt/slides/slide20.xml><?xml version="1.0" encoding="utf-8"?>
-<p:sld xmlns:a="http://schemas.openxmlformats.org/drawingml/2006/main" xmlns:r="http://schemas.openxmlformats.org/officeDocument/2006/relationships" xmlns:p="http://schemas.openxmlformats.org/presentationml/2006/main">
-  <p:cSld>
-    <p:spTree>
-      <p:nvGrpSpPr>
-        <p:cNvPr id="1" name=""/>
-        <p:cNvGrpSpPr/>
-        <p:nvPr/>
-      </p:nvGrpSpPr>
-      <p:grpSpPr>
-        <a:xfrm>
-          <a:off x="0" y="0"/>
-          <a:ext cx="0" cy="0"/>
-          <a:chOff x="0" y="0"/>
-          <a:chExt cx="0" cy="0"/>
-        </a:xfrm>
-      </p:grpSpPr>
-      <p:sp>
-        <p:nvSpPr>
-          <p:cNvPr id="47105" name="Rectangle 1"/>
-          <p:cNvSpPr>
-            <a:spLocks noChangeArrowheads="1"/>
-          </p:cNvSpPr>
-          <p:nvPr/>
-        </p:nvSpPr>
-        <p:spPr bwMode="auto">
-          <a:xfrm>
-            <a:off x="392112" y="2457877"/>
-            <a:ext cx="9172896" cy="3283976"/>
-          </a:xfrm>
-          <a:prstGeom prst="rect">
-            <a:avLst/>
-          </a:prstGeom>
-          <a:noFill/>
-          <a:ln>
-            <a:noFill/>
-          </a:ln>
-          <a:extLst>
-            <a:ext uri="{909E8E84-426E-40dd-AFC4-6F175D3DCCD1}">
-              <a14:hiddenFill xmlns="" xmlns:a14="http://schemas.microsoft.com/office/drawing/2010/main">
-                <a:solidFill>
-                  <a:srgbClr val="FFFFFF"/>
-                </a:solidFill>
-              </a14:hiddenFill>
-            </a:ext>
-            <a:ext uri="{91240B29-F687-4f45-9708-019B960494DF}">
-              <a14:hiddenLine xmlns="" xmlns:a14="http://schemas.microsoft.com/office/drawing/2010/main" w="9525">
-                <a:solidFill>
-                  <a:srgbClr val="000000"/>
-                </a:solidFill>
-                <a:miter lim="800000"/>
-                <a:headEnd/>
-                <a:tailEnd/>
-              </a14:hiddenLine>
-            </a:ext>
-          </a:extLst>
-        </p:spPr>
-        <p:txBody>
-          <a:bodyPr wrap="none">
-            <a:spAutoFit/>
-          </a:bodyPr>
-          <a:lstStyle/>
-          <a:p>
-            <a:r>
-              <a:rPr lang="en-US" sz="2800" b="1" dirty="0" smtClean="0">
-                <a:solidFill>
-                  <a:srgbClr val="000000"/>
-                </a:solidFill>
-              </a:rPr>
-              <a:t>Workshop Website</a:t>
-            </a:r>
-            <a:endParaRPr lang="en-US" sz="2800" b="1" dirty="0">
-              <a:solidFill>
-                <a:srgbClr val="000000"/>
-              </a:solidFill>
-            </a:endParaRPr>
-          </a:p>
-          <a:p>
-            <a:r>
-              <a:rPr lang="en-US" sz="2800" dirty="0">
-                <a:solidFill>
-                  <a:schemeClr val="accent6"/>
-                </a:solidFill>
-              </a:rPr>
-              <a:t>http://sarahlrstevens.info/2017-08-02-chicago-frb</a:t>
-            </a:r>
-            <a:r>
-              <a:rPr lang="en-US" sz="2800" dirty="0" smtClean="0">
-                <a:solidFill>
-                  <a:schemeClr val="accent6"/>
-                </a:solidFill>
-              </a:rPr>
-              <a:t>/</a:t>
-            </a:r>
-          </a:p>
-          <a:p>
-            <a:endParaRPr lang="en-US" sz="2800" dirty="0" smtClean="0">
-              <a:solidFill>
-                <a:srgbClr val="000000"/>
-              </a:solidFill>
-            </a:endParaRPr>
-          </a:p>
-          <a:p>
-            <a:r>
-              <a:rPr lang="en-US" sz="2800" b="1" dirty="0" err="1" smtClean="0">
-                <a:solidFill>
-                  <a:srgbClr val="000000"/>
-                </a:solidFill>
-              </a:rPr>
-              <a:t>Etherpad</a:t>
-            </a:r>
-            <a:r>
-              <a:rPr lang="en-US" sz="2800" b="1" dirty="0" smtClean="0">
-                <a:solidFill>
-                  <a:srgbClr val="000000"/>
-                </a:solidFill>
-              </a:rPr>
-              <a:t> (for collaborative notes)</a:t>
-            </a:r>
-          </a:p>
-          <a:p>
-            <a:r>
-              <a:rPr lang="en-US" sz="2700" dirty="0">
-                <a:solidFill>
-                  <a:schemeClr val="accent6"/>
-                </a:solidFill>
-              </a:rPr>
-              <a:t>http://</a:t>
-            </a:r>
-            <a:r>
-              <a:rPr lang="en-US" sz="2700" dirty="0" smtClean="0">
-                <a:solidFill>
-                  <a:schemeClr val="accent6"/>
-                </a:solidFill>
-              </a:rPr>
-              <a:t>pad.software-carpentry.org/2017-08-02-chicago-frb</a:t>
-            </a:r>
-          </a:p>
-          <a:p>
-            <a:endParaRPr lang="en-US" sz="2800" dirty="0" smtClean="0">
-              <a:solidFill>
-                <a:srgbClr val="000000"/>
-              </a:solidFill>
-            </a:endParaRPr>
-          </a:p>
-          <a:p>
-            <a:r>
-              <a:rPr lang="en-US" sz="2800" b="1" dirty="0" smtClean="0">
-                <a:solidFill>
-                  <a:srgbClr val="000000"/>
-                </a:solidFill>
-              </a:rPr>
-              <a:t>Pre-Workshop Survey </a:t>
-            </a:r>
-          </a:p>
-          <a:p>
-            <a:r>
-              <a:rPr lang="en-US" sz="2800" dirty="0" smtClean="0">
-                <a:solidFill>
-                  <a:schemeClr val="accent6"/>
-                </a:solidFill>
-              </a:rPr>
-              <a:t>https</a:t>
-            </a:r>
-            <a:r>
-              <a:rPr lang="en-US" sz="2800" dirty="0">
-                <a:solidFill>
-                  <a:schemeClr val="accent6"/>
-                </a:solidFill>
-              </a:rPr>
-              <a:t>://</a:t>
-            </a:r>
-            <a:r>
-              <a:rPr lang="en-US" sz="2800" dirty="0" err="1" smtClean="0">
-                <a:solidFill>
-                  <a:schemeClr val="accent6"/>
-                </a:solidFill>
-              </a:rPr>
-              <a:t>www.surveymonkey.com</a:t>
-            </a:r>
-            <a:r>
-              <a:rPr lang="en-US" sz="2800" dirty="0" smtClean="0">
-                <a:solidFill>
-                  <a:schemeClr val="accent6"/>
-                </a:solidFill>
-              </a:rPr>
-              <a:t>/r/swc_pre_workshop_v1</a:t>
-            </a:r>
-            <a:endParaRPr lang="en-US" sz="2800" dirty="0">
-              <a:solidFill>
-                <a:schemeClr val="accent6"/>
-              </a:solidFill>
-            </a:endParaRPr>
-          </a:p>
-        </p:txBody>
-      </p:sp>
-      <p:sp>
-        <p:nvSpPr>
-          <p:cNvPr id="4" name="Text Box 1"/>
-          <p:cNvSpPr txBox="1">
-            <a:spLocks noChangeArrowheads="1"/>
-          </p:cNvSpPr>
-          <p:nvPr/>
-        </p:nvSpPr>
-        <p:spPr bwMode="auto">
-          <a:xfrm>
-            <a:off x="925512" y="303213"/>
-            <a:ext cx="8166100" cy="1258887"/>
-          </a:xfrm>
-          <a:prstGeom prst="rect">
-            <a:avLst/>
-          </a:prstGeom>
-          <a:noFill/>
-          <a:ln>
-            <a:noFill/>
-          </a:ln>
-          <a:effectLst/>
-          <a:extLst>
-            <a:ext uri="{909E8E84-426E-40dd-AFC4-6F175D3DCCD1}">
-              <a14:hiddenFill xmlns="" xmlns:a14="http://schemas.microsoft.com/office/drawing/2010/main">
-                <a:solidFill>
-                  <a:srgbClr val="FFFFFF"/>
-                </a:solidFill>
-              </a14:hiddenFill>
-            </a:ext>
-            <a:ext uri="{91240B29-F687-4f45-9708-019B960494DF}">
-              <a14:hiddenLine xmlns="" xmlns:a14="http://schemas.microsoft.com/office/drawing/2010/main" w="9525" cap="flat">
-                <a:solidFill>
-                  <a:srgbClr val="3465A4"/>
-                </a:solidFill>
-                <a:round/>
-                <a:headEnd/>
-                <a:tailEnd/>
-              </a14:hiddenLine>
-            </a:ext>
-            <a:ext uri="{AF507438-7753-43e0-B8FC-AC1667EBCBE1}">
-              <a14:hiddenEffects xmlns="" xmlns:a14="http://schemas.microsoft.com/office/drawing/2010/main">
-                <a:effectLst>
-                  <a:outerShdw blurRad="63500" dist="38099" dir="2700000" algn="ctr" rotWithShape="0">
-                    <a:srgbClr val="000000">
-                      <a:alpha val="74998"/>
-                    </a:srgbClr>
-                  </a:outerShdw>
-                </a:effectLst>
-              </a14:hiddenEffects>
-            </a:ext>
-          </a:extLst>
-        </p:spPr>
-        <p:txBody>
-          <a:bodyPr lIns="100800" tIns="50400" rIns="100800" bIns="50400" anchor="ctr"/>
-          <a:lstStyle>
-            <a:lvl1pPr>
-              <a:tabLst>
-                <a:tab pos="0" algn="l"/>
-                <a:tab pos="457200" algn="l"/>
-                <a:tab pos="914400" algn="l"/>
-                <a:tab pos="1371600" algn="l"/>
-                <a:tab pos="1828800" algn="l"/>
-                <a:tab pos="2286000" algn="l"/>
-                <a:tab pos="2743200" algn="l"/>
-                <a:tab pos="3200400" algn="l"/>
-                <a:tab pos="3657600" algn="l"/>
-                <a:tab pos="4114800" algn="l"/>
-                <a:tab pos="4572000" algn="l"/>
-                <a:tab pos="5029200" algn="l"/>
-                <a:tab pos="5486400" algn="l"/>
-                <a:tab pos="5943600" algn="l"/>
-                <a:tab pos="6400800" algn="l"/>
-                <a:tab pos="6858000" algn="l"/>
-                <a:tab pos="7315200" algn="l"/>
-                <a:tab pos="7772400" algn="l"/>
-                <a:tab pos="8229600" algn="l"/>
-                <a:tab pos="8686800" algn="l"/>
-                <a:tab pos="9144000" algn="l"/>
-              </a:tabLst>
-              <a:defRPr>
-                <a:solidFill>
-                  <a:srgbClr val="000000"/>
-                </a:solidFill>
-                <a:latin typeface="Arial" charset="0"/>
-                <a:ea typeface="ＭＳ Ｐゴシック" charset="0"/>
-                <a:cs typeface="ＭＳ Ｐゴシック" charset="0"/>
-              </a:defRPr>
-            </a:lvl1pPr>
-            <a:lvl2pPr>
-              <a:tabLst>
-                <a:tab pos="0" algn="l"/>
-                <a:tab pos="457200" algn="l"/>
-                <a:tab pos="914400" algn="l"/>
-                <a:tab pos="1371600" algn="l"/>
-                <a:tab pos="1828800" algn="l"/>
-                <a:tab pos="2286000" algn="l"/>
-                <a:tab pos="2743200" algn="l"/>
-                <a:tab pos="3200400" algn="l"/>
-                <a:tab pos="3657600" algn="l"/>
-                <a:tab pos="4114800" algn="l"/>
-                <a:tab pos="4572000" algn="l"/>
-                <a:tab pos="5029200" algn="l"/>
-                <a:tab pos="5486400" algn="l"/>
-                <a:tab pos="5943600" algn="l"/>
-                <a:tab pos="6400800" algn="l"/>
-                <a:tab pos="6858000" algn="l"/>
-                <a:tab pos="7315200" algn="l"/>
-                <a:tab pos="7772400" algn="l"/>
-                <a:tab pos="8229600" algn="l"/>
-                <a:tab pos="8686800" algn="l"/>
-                <a:tab pos="9144000" algn="l"/>
-              </a:tabLst>
-              <a:defRPr>
-                <a:solidFill>
-                  <a:srgbClr val="000000"/>
-                </a:solidFill>
-                <a:latin typeface="Arial" charset="0"/>
-                <a:ea typeface="ＭＳ Ｐゴシック" charset="0"/>
-                <a:cs typeface="ＭＳ Ｐゴシック" charset="0"/>
-              </a:defRPr>
-            </a:lvl2pPr>
-            <a:lvl3pPr>
-              <a:tabLst>
-                <a:tab pos="0" algn="l"/>
-                <a:tab pos="457200" algn="l"/>
-                <a:tab pos="914400" algn="l"/>
-                <a:tab pos="1371600" algn="l"/>
-                <a:tab pos="1828800" algn="l"/>
-                <a:tab pos="2286000" algn="l"/>
-                <a:tab pos="2743200" algn="l"/>
-                <a:tab pos="3200400" algn="l"/>
-                <a:tab pos="3657600" algn="l"/>
-                <a:tab pos="4114800" algn="l"/>
-                <a:tab pos="4572000" algn="l"/>
-                <a:tab pos="5029200" algn="l"/>
-                <a:tab pos="5486400" algn="l"/>
-                <a:tab pos="5943600" algn="l"/>
-                <a:tab pos="6400800" algn="l"/>
-                <a:tab pos="6858000" algn="l"/>
-                <a:tab pos="7315200" algn="l"/>
-                <a:tab pos="7772400" algn="l"/>
-                <a:tab pos="8229600" algn="l"/>
-                <a:tab pos="8686800" algn="l"/>
-                <a:tab pos="9144000" algn="l"/>
-              </a:tabLst>
-              <a:defRPr>
-                <a:solidFill>
-                  <a:srgbClr val="000000"/>
-                </a:solidFill>
-                <a:latin typeface="Arial" charset="0"/>
-                <a:ea typeface="ＭＳ Ｐゴシック" charset="0"/>
-                <a:cs typeface="ＭＳ Ｐゴシック" charset="0"/>
-              </a:defRPr>
-            </a:lvl3pPr>
-            <a:lvl4pPr>
-              <a:tabLst>
-                <a:tab pos="0" algn="l"/>
-                <a:tab pos="457200" algn="l"/>
-                <a:tab pos="914400" algn="l"/>
-                <a:tab pos="1371600" algn="l"/>
-                <a:tab pos="1828800" algn="l"/>
-                <a:tab pos="2286000" algn="l"/>
-                <a:tab pos="2743200" algn="l"/>
-                <a:tab pos="3200400" algn="l"/>
-                <a:tab pos="3657600" algn="l"/>
-                <a:tab pos="4114800" algn="l"/>
-                <a:tab pos="4572000" algn="l"/>
-                <a:tab pos="5029200" algn="l"/>
-                <a:tab pos="5486400" algn="l"/>
-                <a:tab pos="5943600" algn="l"/>
-                <a:tab pos="6400800" algn="l"/>
-                <a:tab pos="6858000" algn="l"/>
-                <a:tab pos="7315200" algn="l"/>
-                <a:tab pos="7772400" algn="l"/>
-                <a:tab pos="8229600" algn="l"/>
-                <a:tab pos="8686800" algn="l"/>
-                <a:tab pos="9144000" algn="l"/>
-              </a:tabLst>
-              <a:defRPr>
-                <a:solidFill>
-                  <a:srgbClr val="000000"/>
-                </a:solidFill>
-                <a:latin typeface="Arial" charset="0"/>
-                <a:ea typeface="ＭＳ Ｐゴシック" charset="0"/>
-                <a:cs typeface="ＭＳ Ｐゴシック" charset="0"/>
-              </a:defRPr>
-            </a:lvl4pPr>
-            <a:lvl5pPr>
-              <a:tabLst>
-                <a:tab pos="0" algn="l"/>
-                <a:tab pos="457200" algn="l"/>
-                <a:tab pos="914400" algn="l"/>
-                <a:tab pos="1371600" algn="l"/>
-                <a:tab pos="1828800" algn="l"/>
-                <a:tab pos="2286000" algn="l"/>
-                <a:tab pos="2743200" algn="l"/>
-                <a:tab pos="3200400" algn="l"/>
-                <a:tab pos="3657600" algn="l"/>
-                <a:tab pos="4114800" algn="l"/>
-                <a:tab pos="4572000" algn="l"/>
-                <a:tab pos="5029200" algn="l"/>
-                <a:tab pos="5486400" algn="l"/>
-                <a:tab pos="5943600" algn="l"/>
-                <a:tab pos="6400800" algn="l"/>
-                <a:tab pos="6858000" algn="l"/>
-                <a:tab pos="7315200" algn="l"/>
-                <a:tab pos="7772400" algn="l"/>
-                <a:tab pos="8229600" algn="l"/>
-                <a:tab pos="8686800" algn="l"/>
-                <a:tab pos="9144000" algn="l"/>
-              </a:tabLst>
-              <a:defRPr>
-                <a:solidFill>
-                  <a:srgbClr val="000000"/>
-                </a:solidFill>
-                <a:latin typeface="Arial" charset="0"/>
-                <a:ea typeface="ＭＳ Ｐゴシック" charset="0"/>
-                <a:cs typeface="ＭＳ Ｐゴシック" charset="0"/>
-              </a:defRPr>
-            </a:lvl5pPr>
-            <a:lvl6pPr marL="2514600" indent="-228600" fontAlgn="base" hangingPunct="0">
-              <a:lnSpc>
-                <a:spcPct val="93000"/>
-              </a:lnSpc>
-              <a:spcBef>
-                <a:spcPct val="0"/>
-              </a:spcBef>
-              <a:spcAft>
-                <a:spcPct val="0"/>
-              </a:spcAft>
-              <a:buClr>
-                <a:srgbClr val="000000"/>
-              </a:buClr>
-              <a:buSzPct val="100000"/>
-              <a:buFont typeface="Times New Roman" charset="0"/>
-              <a:tabLst>
-                <a:tab pos="0" algn="l"/>
-                <a:tab pos="457200" algn="l"/>
-                <a:tab pos="914400" algn="l"/>
-                <a:tab pos="1371600" algn="l"/>
-                <a:tab pos="1828800" algn="l"/>
-                <a:tab pos="2286000" algn="l"/>
-                <a:tab pos="2743200" algn="l"/>
-                <a:tab pos="3200400" algn="l"/>
-                <a:tab pos="3657600" algn="l"/>
-                <a:tab pos="4114800" algn="l"/>
-                <a:tab pos="4572000" algn="l"/>
-                <a:tab pos="5029200" algn="l"/>
-                <a:tab pos="5486400" algn="l"/>
-                <a:tab pos="5943600" algn="l"/>
-                <a:tab pos="6400800" algn="l"/>
-                <a:tab pos="6858000" algn="l"/>
-                <a:tab pos="7315200" algn="l"/>
-                <a:tab pos="7772400" algn="l"/>
-                <a:tab pos="8229600" algn="l"/>
-                <a:tab pos="8686800" algn="l"/>
-                <a:tab pos="9144000" algn="l"/>
-              </a:tabLst>
-              <a:defRPr>
-                <a:solidFill>
-                  <a:srgbClr val="000000"/>
-                </a:solidFill>
-                <a:latin typeface="Arial" charset="0"/>
-                <a:ea typeface="ＭＳ Ｐゴシック" charset="0"/>
-                <a:cs typeface="ＭＳ Ｐゴシック" charset="0"/>
-              </a:defRPr>
-            </a:lvl6pPr>
-            <a:lvl7pPr marL="2971800" indent="-228600" fontAlgn="base" hangingPunct="0">
-              <a:lnSpc>
-                <a:spcPct val="93000"/>
-              </a:lnSpc>
-              <a:spcBef>
-                <a:spcPct val="0"/>
-              </a:spcBef>
-              <a:spcAft>
-                <a:spcPct val="0"/>
-              </a:spcAft>
-              <a:buClr>
-                <a:srgbClr val="000000"/>
-              </a:buClr>
-              <a:buSzPct val="100000"/>
-              <a:buFont typeface="Times New Roman" charset="0"/>
-              <a:tabLst>
-                <a:tab pos="0" algn="l"/>
-                <a:tab pos="457200" algn="l"/>
-                <a:tab pos="914400" algn="l"/>
-                <a:tab pos="1371600" algn="l"/>
-                <a:tab pos="1828800" algn="l"/>
-                <a:tab pos="2286000" algn="l"/>
-                <a:tab pos="2743200" algn="l"/>
-                <a:tab pos="3200400" algn="l"/>
-                <a:tab pos="3657600" algn="l"/>
-                <a:tab pos="4114800" algn="l"/>
-                <a:tab pos="4572000" algn="l"/>
-                <a:tab pos="5029200" algn="l"/>
-                <a:tab pos="5486400" algn="l"/>
-                <a:tab pos="5943600" algn="l"/>
-                <a:tab pos="6400800" algn="l"/>
-                <a:tab pos="6858000" algn="l"/>
-                <a:tab pos="7315200" algn="l"/>
-                <a:tab pos="7772400" algn="l"/>
-                <a:tab pos="8229600" algn="l"/>
-                <a:tab pos="8686800" algn="l"/>
-                <a:tab pos="9144000" algn="l"/>
-              </a:tabLst>
-              <a:defRPr>
-                <a:solidFill>
-                  <a:srgbClr val="000000"/>
-                </a:solidFill>
-                <a:latin typeface="Arial" charset="0"/>
-                <a:ea typeface="ＭＳ Ｐゴシック" charset="0"/>
-                <a:cs typeface="ＭＳ Ｐゴシック" charset="0"/>
-              </a:defRPr>
-            </a:lvl7pPr>
-            <a:lvl8pPr marL="3429000" indent="-228600" fontAlgn="base" hangingPunct="0">
-              <a:lnSpc>
-                <a:spcPct val="93000"/>
-              </a:lnSpc>
-              <a:spcBef>
-                <a:spcPct val="0"/>
-              </a:spcBef>
-              <a:spcAft>
-                <a:spcPct val="0"/>
-              </a:spcAft>
-              <a:buClr>
-                <a:srgbClr val="000000"/>
-              </a:buClr>
-              <a:buSzPct val="100000"/>
-              <a:buFont typeface="Times New Roman" charset="0"/>
-              <a:tabLst>
-                <a:tab pos="0" algn="l"/>
-                <a:tab pos="457200" algn="l"/>
-                <a:tab pos="914400" algn="l"/>
-                <a:tab pos="1371600" algn="l"/>
-                <a:tab pos="1828800" algn="l"/>
-                <a:tab pos="2286000" algn="l"/>
-                <a:tab pos="2743200" algn="l"/>
-                <a:tab pos="3200400" algn="l"/>
-                <a:tab pos="3657600" algn="l"/>
-                <a:tab pos="4114800" algn="l"/>
-                <a:tab pos="4572000" algn="l"/>
-                <a:tab pos="5029200" algn="l"/>
-                <a:tab pos="5486400" algn="l"/>
-                <a:tab pos="5943600" algn="l"/>
-                <a:tab pos="6400800" algn="l"/>
-                <a:tab pos="6858000" algn="l"/>
-                <a:tab pos="7315200" algn="l"/>
-                <a:tab pos="7772400" algn="l"/>
-                <a:tab pos="8229600" algn="l"/>
-                <a:tab pos="8686800" algn="l"/>
-                <a:tab pos="9144000" algn="l"/>
-              </a:tabLst>
-              <a:defRPr>
-                <a:solidFill>
-                  <a:srgbClr val="000000"/>
-                </a:solidFill>
-                <a:latin typeface="Arial" charset="0"/>
-                <a:ea typeface="ＭＳ Ｐゴシック" charset="0"/>
-                <a:cs typeface="ＭＳ Ｐゴシック" charset="0"/>
-              </a:defRPr>
-            </a:lvl8pPr>
-            <a:lvl9pPr marL="3886200" indent="-228600" fontAlgn="base" hangingPunct="0">
-              <a:lnSpc>
-                <a:spcPct val="93000"/>
-              </a:lnSpc>
-              <a:spcBef>
-                <a:spcPct val="0"/>
-              </a:spcBef>
-              <a:spcAft>
-                <a:spcPct val="0"/>
-              </a:spcAft>
-              <a:buClr>
-                <a:srgbClr val="000000"/>
-              </a:buClr>
-              <a:buSzPct val="100000"/>
-              <a:buFont typeface="Times New Roman" charset="0"/>
-              <a:tabLst>
-                <a:tab pos="0" algn="l"/>
-                <a:tab pos="457200" algn="l"/>
-                <a:tab pos="914400" algn="l"/>
-                <a:tab pos="1371600" algn="l"/>
-                <a:tab pos="1828800" algn="l"/>
-                <a:tab pos="2286000" algn="l"/>
-                <a:tab pos="2743200" algn="l"/>
-                <a:tab pos="3200400" algn="l"/>
-                <a:tab pos="3657600" algn="l"/>
-                <a:tab pos="4114800" algn="l"/>
-                <a:tab pos="4572000" algn="l"/>
-                <a:tab pos="5029200" algn="l"/>
-                <a:tab pos="5486400" algn="l"/>
-                <a:tab pos="5943600" algn="l"/>
-                <a:tab pos="6400800" algn="l"/>
-                <a:tab pos="6858000" algn="l"/>
-                <a:tab pos="7315200" algn="l"/>
-                <a:tab pos="7772400" algn="l"/>
-                <a:tab pos="8229600" algn="l"/>
-                <a:tab pos="8686800" algn="l"/>
-                <a:tab pos="9144000" algn="l"/>
-              </a:tabLst>
-              <a:defRPr>
-                <a:solidFill>
-                  <a:srgbClr val="000000"/>
-                </a:solidFill>
-                <a:latin typeface="Arial" charset="0"/>
-                <a:ea typeface="ＭＳ Ｐゴシック" charset="0"/>
-                <a:cs typeface="ＭＳ Ｐゴシック" charset="0"/>
-              </a:defRPr>
-            </a:lvl9pPr>
-          </a:lstStyle>
-          <a:p>
-            <a:pPr algn="ctr">
-              <a:buClrTx/>
-              <a:buFontTx/>
-              <a:buNone/>
-              <a:defRPr/>
-            </a:pPr>
-            <a:r>
-              <a:rPr lang="en-US" sz="4400" dirty="0" smtClean="0"/>
-              <a:t>Welcome to the Workshop!</a:t>
-            </a:r>
-          </a:p>
-        </p:txBody>
-      </p:sp>
-    </p:spTree>
-    <p:extLst>
-      <p:ext uri="{BB962C8B-B14F-4D97-AF65-F5344CB8AC3E}">
-        <p14:creationId xmlns:p14="http://schemas.microsoft.com/office/powerpoint/2010/main" val="172946089"/>
-      </p:ext>
-    </p:extLst>
-  </p:cSld>
-  <p:clrMapOvr>
-    <a:masterClrMapping/>
-  </p:clrMapOvr>
-  <p:timing>
-    <p:tnLst>
-      <p:par>
-        <p:cTn id="1" dur="indefinite" restart="never" nodeType="tmRoot"/>
-      </p:par>
-    </p:tnLst>
-  </p:timing>
-</p:sld>
-</file>
-
-<file path=ppt/slides/slide21.xml><?xml version="1.0" encoding="utf-8"?>
 <p:sld xmlns:a="http://schemas.openxmlformats.org/drawingml/2006/main" xmlns:r="http://schemas.openxmlformats.org/officeDocument/2006/relationships" xmlns:p="http://schemas.openxmlformats.org/presentationml/2006/main">
   <p:cSld>
     <p:spTree>
@@ -27516,632 +26585,6 @@
 </file>
 
 <file path=ppt/slides/slide6.xml><?xml version="1.0" encoding="utf-8"?>
-<p:sld xmlns:a="http://schemas.openxmlformats.org/drawingml/2006/main" xmlns:r="http://schemas.openxmlformats.org/officeDocument/2006/relationships" xmlns:p="http://schemas.openxmlformats.org/presentationml/2006/main" show="0">
-  <p:cSld>
-    <p:spTree>
-      <p:nvGrpSpPr>
-        <p:cNvPr id="1" name=""/>
-        <p:cNvGrpSpPr/>
-        <p:nvPr/>
-      </p:nvGrpSpPr>
-      <p:grpSpPr>
-        <a:xfrm>
-          <a:off x="0" y="0"/>
-          <a:ext cx="0" cy="0"/>
-          <a:chOff x="0" y="0"/>
-          <a:chExt cx="0" cy="0"/>
-        </a:xfrm>
-      </p:grpSpPr>
-      <p:sp>
-        <p:nvSpPr>
-          <p:cNvPr id="3" name="Text Box 1"/>
-          <p:cNvSpPr txBox="1">
-            <a:spLocks noChangeArrowheads="1"/>
-          </p:cNvSpPr>
-          <p:nvPr/>
-        </p:nvSpPr>
-        <p:spPr bwMode="auto">
-          <a:xfrm>
-            <a:off x="925512" y="303213"/>
-            <a:ext cx="8166100" cy="1258887"/>
-          </a:xfrm>
-          <a:prstGeom prst="rect">
-            <a:avLst/>
-          </a:prstGeom>
-          <a:noFill/>
-          <a:ln>
-            <a:noFill/>
-          </a:ln>
-          <a:effectLst/>
-          <a:extLst>
-            <a:ext uri="{909E8E84-426E-40dd-AFC4-6F175D3DCCD1}">
-              <a14:hiddenFill xmlns="" xmlns:a14="http://schemas.microsoft.com/office/drawing/2010/main">
-                <a:solidFill>
-                  <a:srgbClr val="FFFFFF"/>
-                </a:solidFill>
-              </a14:hiddenFill>
-            </a:ext>
-            <a:ext uri="{91240B29-F687-4f45-9708-019B960494DF}">
-              <a14:hiddenLine xmlns="" xmlns:a14="http://schemas.microsoft.com/office/drawing/2010/main" w="9525" cap="flat">
-                <a:solidFill>
-                  <a:srgbClr val="3465A4"/>
-                </a:solidFill>
-                <a:round/>
-                <a:headEnd/>
-                <a:tailEnd/>
-              </a14:hiddenLine>
-            </a:ext>
-            <a:ext uri="{AF507438-7753-43e0-B8FC-AC1667EBCBE1}">
-              <a14:hiddenEffects xmlns="" xmlns:a14="http://schemas.microsoft.com/office/drawing/2010/main">
-                <a:effectLst>
-                  <a:outerShdw blurRad="63500" dist="38099" dir="2700000" algn="ctr" rotWithShape="0">
-                    <a:srgbClr val="000000">
-                      <a:alpha val="74998"/>
-                    </a:srgbClr>
-                  </a:outerShdw>
-                </a:effectLst>
-              </a14:hiddenEffects>
-            </a:ext>
-          </a:extLst>
-        </p:spPr>
-        <p:txBody>
-          <a:bodyPr lIns="100800" tIns="50400" rIns="100800" bIns="50400" anchor="ctr"/>
-          <a:lstStyle>
-            <a:lvl1pPr>
-              <a:tabLst>
-                <a:tab pos="0" algn="l"/>
-                <a:tab pos="457200" algn="l"/>
-                <a:tab pos="914400" algn="l"/>
-                <a:tab pos="1371600" algn="l"/>
-                <a:tab pos="1828800" algn="l"/>
-                <a:tab pos="2286000" algn="l"/>
-                <a:tab pos="2743200" algn="l"/>
-                <a:tab pos="3200400" algn="l"/>
-                <a:tab pos="3657600" algn="l"/>
-                <a:tab pos="4114800" algn="l"/>
-                <a:tab pos="4572000" algn="l"/>
-                <a:tab pos="5029200" algn="l"/>
-                <a:tab pos="5486400" algn="l"/>
-                <a:tab pos="5943600" algn="l"/>
-                <a:tab pos="6400800" algn="l"/>
-                <a:tab pos="6858000" algn="l"/>
-                <a:tab pos="7315200" algn="l"/>
-                <a:tab pos="7772400" algn="l"/>
-                <a:tab pos="8229600" algn="l"/>
-                <a:tab pos="8686800" algn="l"/>
-                <a:tab pos="9144000" algn="l"/>
-              </a:tabLst>
-              <a:defRPr>
-                <a:solidFill>
-                  <a:srgbClr val="000000"/>
-                </a:solidFill>
-                <a:latin typeface="Arial" charset="0"/>
-                <a:ea typeface="ＭＳ Ｐゴシック" charset="0"/>
-                <a:cs typeface="ＭＳ Ｐゴシック" charset="0"/>
-              </a:defRPr>
-            </a:lvl1pPr>
-            <a:lvl2pPr>
-              <a:tabLst>
-                <a:tab pos="0" algn="l"/>
-                <a:tab pos="457200" algn="l"/>
-                <a:tab pos="914400" algn="l"/>
-                <a:tab pos="1371600" algn="l"/>
-                <a:tab pos="1828800" algn="l"/>
-                <a:tab pos="2286000" algn="l"/>
-                <a:tab pos="2743200" algn="l"/>
-                <a:tab pos="3200400" algn="l"/>
-                <a:tab pos="3657600" algn="l"/>
-                <a:tab pos="4114800" algn="l"/>
-                <a:tab pos="4572000" algn="l"/>
-                <a:tab pos="5029200" algn="l"/>
-                <a:tab pos="5486400" algn="l"/>
-                <a:tab pos="5943600" algn="l"/>
-                <a:tab pos="6400800" algn="l"/>
-                <a:tab pos="6858000" algn="l"/>
-                <a:tab pos="7315200" algn="l"/>
-                <a:tab pos="7772400" algn="l"/>
-                <a:tab pos="8229600" algn="l"/>
-                <a:tab pos="8686800" algn="l"/>
-                <a:tab pos="9144000" algn="l"/>
-              </a:tabLst>
-              <a:defRPr>
-                <a:solidFill>
-                  <a:srgbClr val="000000"/>
-                </a:solidFill>
-                <a:latin typeface="Arial" charset="0"/>
-                <a:ea typeface="ＭＳ Ｐゴシック" charset="0"/>
-                <a:cs typeface="ＭＳ Ｐゴシック" charset="0"/>
-              </a:defRPr>
-            </a:lvl2pPr>
-            <a:lvl3pPr>
-              <a:tabLst>
-                <a:tab pos="0" algn="l"/>
-                <a:tab pos="457200" algn="l"/>
-                <a:tab pos="914400" algn="l"/>
-                <a:tab pos="1371600" algn="l"/>
-                <a:tab pos="1828800" algn="l"/>
-                <a:tab pos="2286000" algn="l"/>
-                <a:tab pos="2743200" algn="l"/>
-                <a:tab pos="3200400" algn="l"/>
-                <a:tab pos="3657600" algn="l"/>
-                <a:tab pos="4114800" algn="l"/>
-                <a:tab pos="4572000" algn="l"/>
-                <a:tab pos="5029200" algn="l"/>
-                <a:tab pos="5486400" algn="l"/>
-                <a:tab pos="5943600" algn="l"/>
-                <a:tab pos="6400800" algn="l"/>
-                <a:tab pos="6858000" algn="l"/>
-                <a:tab pos="7315200" algn="l"/>
-                <a:tab pos="7772400" algn="l"/>
-                <a:tab pos="8229600" algn="l"/>
-                <a:tab pos="8686800" algn="l"/>
-                <a:tab pos="9144000" algn="l"/>
-              </a:tabLst>
-              <a:defRPr>
-                <a:solidFill>
-                  <a:srgbClr val="000000"/>
-                </a:solidFill>
-                <a:latin typeface="Arial" charset="0"/>
-                <a:ea typeface="ＭＳ Ｐゴシック" charset="0"/>
-                <a:cs typeface="ＭＳ Ｐゴシック" charset="0"/>
-              </a:defRPr>
-            </a:lvl3pPr>
-            <a:lvl4pPr>
-              <a:tabLst>
-                <a:tab pos="0" algn="l"/>
-                <a:tab pos="457200" algn="l"/>
-                <a:tab pos="914400" algn="l"/>
-                <a:tab pos="1371600" algn="l"/>
-                <a:tab pos="1828800" algn="l"/>
-                <a:tab pos="2286000" algn="l"/>
-                <a:tab pos="2743200" algn="l"/>
-                <a:tab pos="3200400" algn="l"/>
-                <a:tab pos="3657600" algn="l"/>
-                <a:tab pos="4114800" algn="l"/>
-                <a:tab pos="4572000" algn="l"/>
-                <a:tab pos="5029200" algn="l"/>
-                <a:tab pos="5486400" algn="l"/>
-                <a:tab pos="5943600" algn="l"/>
-                <a:tab pos="6400800" algn="l"/>
-                <a:tab pos="6858000" algn="l"/>
-                <a:tab pos="7315200" algn="l"/>
-                <a:tab pos="7772400" algn="l"/>
-                <a:tab pos="8229600" algn="l"/>
-                <a:tab pos="8686800" algn="l"/>
-                <a:tab pos="9144000" algn="l"/>
-              </a:tabLst>
-              <a:defRPr>
-                <a:solidFill>
-                  <a:srgbClr val="000000"/>
-                </a:solidFill>
-                <a:latin typeface="Arial" charset="0"/>
-                <a:ea typeface="ＭＳ Ｐゴシック" charset="0"/>
-                <a:cs typeface="ＭＳ Ｐゴシック" charset="0"/>
-              </a:defRPr>
-            </a:lvl4pPr>
-            <a:lvl5pPr>
-              <a:tabLst>
-                <a:tab pos="0" algn="l"/>
-                <a:tab pos="457200" algn="l"/>
-                <a:tab pos="914400" algn="l"/>
-                <a:tab pos="1371600" algn="l"/>
-                <a:tab pos="1828800" algn="l"/>
-                <a:tab pos="2286000" algn="l"/>
-                <a:tab pos="2743200" algn="l"/>
-                <a:tab pos="3200400" algn="l"/>
-                <a:tab pos="3657600" algn="l"/>
-                <a:tab pos="4114800" algn="l"/>
-                <a:tab pos="4572000" algn="l"/>
-                <a:tab pos="5029200" algn="l"/>
-                <a:tab pos="5486400" algn="l"/>
-                <a:tab pos="5943600" algn="l"/>
-                <a:tab pos="6400800" algn="l"/>
-                <a:tab pos="6858000" algn="l"/>
-                <a:tab pos="7315200" algn="l"/>
-                <a:tab pos="7772400" algn="l"/>
-                <a:tab pos="8229600" algn="l"/>
-                <a:tab pos="8686800" algn="l"/>
-                <a:tab pos="9144000" algn="l"/>
-              </a:tabLst>
-              <a:defRPr>
-                <a:solidFill>
-                  <a:srgbClr val="000000"/>
-                </a:solidFill>
-                <a:latin typeface="Arial" charset="0"/>
-                <a:ea typeface="ＭＳ Ｐゴシック" charset="0"/>
-                <a:cs typeface="ＭＳ Ｐゴシック" charset="0"/>
-              </a:defRPr>
-            </a:lvl5pPr>
-            <a:lvl6pPr marL="2514600" indent="-228600" fontAlgn="base" hangingPunct="0">
-              <a:lnSpc>
-                <a:spcPct val="93000"/>
-              </a:lnSpc>
-              <a:spcBef>
-                <a:spcPct val="0"/>
-              </a:spcBef>
-              <a:spcAft>
-                <a:spcPct val="0"/>
-              </a:spcAft>
-              <a:buClr>
-                <a:srgbClr val="000000"/>
-              </a:buClr>
-              <a:buSzPct val="100000"/>
-              <a:buFont typeface="Times New Roman" charset="0"/>
-              <a:tabLst>
-                <a:tab pos="0" algn="l"/>
-                <a:tab pos="457200" algn="l"/>
-                <a:tab pos="914400" algn="l"/>
-                <a:tab pos="1371600" algn="l"/>
-                <a:tab pos="1828800" algn="l"/>
-                <a:tab pos="2286000" algn="l"/>
-                <a:tab pos="2743200" algn="l"/>
-                <a:tab pos="3200400" algn="l"/>
-                <a:tab pos="3657600" algn="l"/>
-                <a:tab pos="4114800" algn="l"/>
-                <a:tab pos="4572000" algn="l"/>
-                <a:tab pos="5029200" algn="l"/>
-                <a:tab pos="5486400" algn="l"/>
-                <a:tab pos="5943600" algn="l"/>
-                <a:tab pos="6400800" algn="l"/>
-                <a:tab pos="6858000" algn="l"/>
-                <a:tab pos="7315200" algn="l"/>
-                <a:tab pos="7772400" algn="l"/>
-                <a:tab pos="8229600" algn="l"/>
-                <a:tab pos="8686800" algn="l"/>
-                <a:tab pos="9144000" algn="l"/>
-              </a:tabLst>
-              <a:defRPr>
-                <a:solidFill>
-                  <a:srgbClr val="000000"/>
-                </a:solidFill>
-                <a:latin typeface="Arial" charset="0"/>
-                <a:ea typeface="ＭＳ Ｐゴシック" charset="0"/>
-                <a:cs typeface="ＭＳ Ｐゴシック" charset="0"/>
-              </a:defRPr>
-            </a:lvl6pPr>
-            <a:lvl7pPr marL="2971800" indent="-228600" fontAlgn="base" hangingPunct="0">
-              <a:lnSpc>
-                <a:spcPct val="93000"/>
-              </a:lnSpc>
-              <a:spcBef>
-                <a:spcPct val="0"/>
-              </a:spcBef>
-              <a:spcAft>
-                <a:spcPct val="0"/>
-              </a:spcAft>
-              <a:buClr>
-                <a:srgbClr val="000000"/>
-              </a:buClr>
-              <a:buSzPct val="100000"/>
-              <a:buFont typeface="Times New Roman" charset="0"/>
-              <a:tabLst>
-                <a:tab pos="0" algn="l"/>
-                <a:tab pos="457200" algn="l"/>
-                <a:tab pos="914400" algn="l"/>
-                <a:tab pos="1371600" algn="l"/>
-                <a:tab pos="1828800" algn="l"/>
-                <a:tab pos="2286000" algn="l"/>
-                <a:tab pos="2743200" algn="l"/>
-                <a:tab pos="3200400" algn="l"/>
-                <a:tab pos="3657600" algn="l"/>
-                <a:tab pos="4114800" algn="l"/>
-                <a:tab pos="4572000" algn="l"/>
-                <a:tab pos="5029200" algn="l"/>
-                <a:tab pos="5486400" algn="l"/>
-                <a:tab pos="5943600" algn="l"/>
-                <a:tab pos="6400800" algn="l"/>
-                <a:tab pos="6858000" algn="l"/>
-                <a:tab pos="7315200" algn="l"/>
-                <a:tab pos="7772400" algn="l"/>
-                <a:tab pos="8229600" algn="l"/>
-                <a:tab pos="8686800" algn="l"/>
-                <a:tab pos="9144000" algn="l"/>
-              </a:tabLst>
-              <a:defRPr>
-                <a:solidFill>
-                  <a:srgbClr val="000000"/>
-                </a:solidFill>
-                <a:latin typeface="Arial" charset="0"/>
-                <a:ea typeface="ＭＳ Ｐゴシック" charset="0"/>
-                <a:cs typeface="ＭＳ Ｐゴシック" charset="0"/>
-              </a:defRPr>
-            </a:lvl7pPr>
-            <a:lvl8pPr marL="3429000" indent="-228600" fontAlgn="base" hangingPunct="0">
-              <a:lnSpc>
-                <a:spcPct val="93000"/>
-              </a:lnSpc>
-              <a:spcBef>
-                <a:spcPct val="0"/>
-              </a:spcBef>
-              <a:spcAft>
-                <a:spcPct val="0"/>
-              </a:spcAft>
-              <a:buClr>
-                <a:srgbClr val="000000"/>
-              </a:buClr>
-              <a:buSzPct val="100000"/>
-              <a:buFont typeface="Times New Roman" charset="0"/>
-              <a:tabLst>
-                <a:tab pos="0" algn="l"/>
-                <a:tab pos="457200" algn="l"/>
-                <a:tab pos="914400" algn="l"/>
-                <a:tab pos="1371600" algn="l"/>
-                <a:tab pos="1828800" algn="l"/>
-                <a:tab pos="2286000" algn="l"/>
-                <a:tab pos="2743200" algn="l"/>
-                <a:tab pos="3200400" algn="l"/>
-                <a:tab pos="3657600" algn="l"/>
-                <a:tab pos="4114800" algn="l"/>
-                <a:tab pos="4572000" algn="l"/>
-                <a:tab pos="5029200" algn="l"/>
-                <a:tab pos="5486400" algn="l"/>
-                <a:tab pos="5943600" algn="l"/>
-                <a:tab pos="6400800" algn="l"/>
-                <a:tab pos="6858000" algn="l"/>
-                <a:tab pos="7315200" algn="l"/>
-                <a:tab pos="7772400" algn="l"/>
-                <a:tab pos="8229600" algn="l"/>
-                <a:tab pos="8686800" algn="l"/>
-                <a:tab pos="9144000" algn="l"/>
-              </a:tabLst>
-              <a:defRPr>
-                <a:solidFill>
-                  <a:srgbClr val="000000"/>
-                </a:solidFill>
-                <a:latin typeface="Arial" charset="0"/>
-                <a:ea typeface="ＭＳ Ｐゴシック" charset="0"/>
-                <a:cs typeface="ＭＳ Ｐゴシック" charset="0"/>
-              </a:defRPr>
-            </a:lvl8pPr>
-            <a:lvl9pPr marL="3886200" indent="-228600" fontAlgn="base" hangingPunct="0">
-              <a:lnSpc>
-                <a:spcPct val="93000"/>
-              </a:lnSpc>
-              <a:spcBef>
-                <a:spcPct val="0"/>
-              </a:spcBef>
-              <a:spcAft>
-                <a:spcPct val="0"/>
-              </a:spcAft>
-              <a:buClr>
-                <a:srgbClr val="000000"/>
-              </a:buClr>
-              <a:buSzPct val="100000"/>
-              <a:buFont typeface="Times New Roman" charset="0"/>
-              <a:tabLst>
-                <a:tab pos="0" algn="l"/>
-                <a:tab pos="457200" algn="l"/>
-                <a:tab pos="914400" algn="l"/>
-                <a:tab pos="1371600" algn="l"/>
-                <a:tab pos="1828800" algn="l"/>
-                <a:tab pos="2286000" algn="l"/>
-                <a:tab pos="2743200" algn="l"/>
-                <a:tab pos="3200400" algn="l"/>
-                <a:tab pos="3657600" algn="l"/>
-                <a:tab pos="4114800" algn="l"/>
-                <a:tab pos="4572000" algn="l"/>
-                <a:tab pos="5029200" algn="l"/>
-                <a:tab pos="5486400" algn="l"/>
-                <a:tab pos="5943600" algn="l"/>
-                <a:tab pos="6400800" algn="l"/>
-                <a:tab pos="6858000" algn="l"/>
-                <a:tab pos="7315200" algn="l"/>
-                <a:tab pos="7772400" algn="l"/>
-                <a:tab pos="8229600" algn="l"/>
-                <a:tab pos="8686800" algn="l"/>
-                <a:tab pos="9144000" algn="l"/>
-              </a:tabLst>
-              <a:defRPr>
-                <a:solidFill>
-                  <a:srgbClr val="000000"/>
-                </a:solidFill>
-                <a:latin typeface="Arial" charset="0"/>
-                <a:ea typeface="ＭＳ Ｐゴシック" charset="0"/>
-                <a:cs typeface="ＭＳ Ｐゴシック" charset="0"/>
-              </a:defRPr>
-            </a:lvl9pPr>
-          </a:lstStyle>
-          <a:p>
-            <a:pPr algn="ctr">
-              <a:buClrTx/>
-              <a:buFontTx/>
-              <a:buNone/>
-              <a:defRPr/>
-            </a:pPr>
-            <a:r>
-              <a:rPr lang="en-US" sz="4400" dirty="0" smtClean="0"/>
-              <a:t>Workshop Logistics:</a:t>
-            </a:r>
-          </a:p>
-          <a:p>
-            <a:pPr algn="ctr">
-              <a:buClrTx/>
-              <a:buFontTx/>
-              <a:buNone/>
-              <a:defRPr/>
-            </a:pPr>
-            <a:r>
-              <a:rPr lang="en-US" sz="4400" dirty="0" smtClean="0"/>
-              <a:t>Where Stuff Is</a:t>
-            </a:r>
-          </a:p>
-        </p:txBody>
-      </p:sp>
-      <p:sp>
-        <p:nvSpPr>
-          <p:cNvPr id="4" name="Rectangle 1"/>
-          <p:cNvSpPr>
-            <a:spLocks noChangeArrowheads="1"/>
-          </p:cNvSpPr>
-          <p:nvPr/>
-        </p:nvSpPr>
-        <p:spPr bwMode="auto">
-          <a:xfrm>
-            <a:off x="392112" y="2179637"/>
-            <a:ext cx="9448800" cy="4104611"/>
-          </a:xfrm>
-          <a:prstGeom prst="rect">
-            <a:avLst/>
-          </a:prstGeom>
-          <a:noFill/>
-          <a:ln>
-            <a:noFill/>
-          </a:ln>
-          <a:extLst>
-            <a:ext uri="{909E8E84-426E-40dd-AFC4-6F175D3DCCD1}">
-              <a14:hiddenFill xmlns="" xmlns:a14="http://schemas.microsoft.com/office/drawing/2010/main">
-                <a:solidFill>
-                  <a:srgbClr val="FFFFFF"/>
-                </a:solidFill>
-              </a14:hiddenFill>
-            </a:ext>
-            <a:ext uri="{91240B29-F687-4f45-9708-019B960494DF}">
-              <a14:hiddenLine xmlns="" xmlns:a14="http://schemas.microsoft.com/office/drawing/2010/main" w="9525">
-                <a:solidFill>
-                  <a:srgbClr val="000000"/>
-                </a:solidFill>
-                <a:miter lim="800000"/>
-                <a:headEnd/>
-                <a:tailEnd/>
-              </a14:hiddenLine>
-            </a:ext>
-          </a:extLst>
-        </p:spPr>
-        <p:txBody>
-          <a:bodyPr wrap="square">
-            <a:spAutoFit/>
-          </a:bodyPr>
-          <a:lstStyle/>
-          <a:p>
-            <a:r>
-              <a:rPr lang="en-US" sz="2800" b="1" dirty="0" smtClean="0">
-                <a:solidFill>
-                  <a:schemeClr val="tx1"/>
-                </a:solidFill>
-              </a:rPr>
-              <a:t>Restrooms</a:t>
-            </a:r>
-            <a:endParaRPr lang="en-US" sz="2800" b="1" dirty="0">
-              <a:solidFill>
-                <a:schemeClr val="tx1"/>
-              </a:solidFill>
-            </a:endParaRPr>
-          </a:p>
-          <a:p>
-            <a:r>
-              <a:rPr lang="en-US" sz="2800" dirty="0" smtClean="0">
-                <a:solidFill>
-                  <a:srgbClr val="000000"/>
-                </a:solidFill>
-              </a:rPr>
-              <a:t>Across the hall</a:t>
-            </a:r>
-          </a:p>
-          <a:p>
-            <a:endParaRPr lang="en-US" sz="2800" dirty="0" smtClean="0">
-              <a:solidFill>
-                <a:srgbClr val="000000"/>
-              </a:solidFill>
-            </a:endParaRPr>
-          </a:p>
-          <a:p>
-            <a:r>
-              <a:rPr lang="en-US" sz="2800" b="1" dirty="0" smtClean="0">
-                <a:solidFill>
-                  <a:srgbClr val="000000"/>
-                </a:solidFill>
-              </a:rPr>
-              <a:t>Beverages</a:t>
-            </a:r>
-          </a:p>
-          <a:p>
-            <a:r>
-              <a:rPr lang="en-US" sz="2800" dirty="0" smtClean="0">
-                <a:solidFill>
-                  <a:srgbClr val="000000"/>
-                </a:solidFill>
-              </a:rPr>
-              <a:t>Drinking fountain: across the hall</a:t>
-            </a:r>
-          </a:p>
-          <a:p>
-            <a:r>
-              <a:rPr lang="en-US" sz="2800" dirty="0" smtClean="0">
-                <a:solidFill>
-                  <a:srgbClr val="000000"/>
-                </a:solidFill>
-              </a:rPr>
-              <a:t>Coffee/tea: front left corner of room, all day</a:t>
-            </a:r>
-          </a:p>
-          <a:p>
-            <a:endParaRPr lang="en-US" sz="2800" dirty="0">
-              <a:solidFill>
-                <a:srgbClr val="000000"/>
-              </a:solidFill>
-            </a:endParaRPr>
-          </a:p>
-          <a:p>
-            <a:r>
-              <a:rPr lang="en-US" sz="2800" b="1" dirty="0" smtClean="0">
-                <a:solidFill>
-                  <a:srgbClr val="000000"/>
-                </a:solidFill>
-              </a:rPr>
-              <a:t>Lunch</a:t>
-            </a:r>
-          </a:p>
-          <a:p>
-            <a:r>
-              <a:rPr lang="en-US" sz="2800" dirty="0" smtClean="0">
-                <a:solidFill>
-                  <a:srgbClr val="000000"/>
-                </a:solidFill>
-              </a:rPr>
-              <a:t>On your own.</a:t>
-            </a:r>
-          </a:p>
-          <a:p>
-            <a:r>
-              <a:rPr lang="en-US" sz="2800" dirty="0" smtClean="0">
-                <a:solidFill>
-                  <a:srgbClr val="000000"/>
-                </a:solidFill>
-              </a:rPr>
-              <a:t>Need a fridge? Let us know.</a:t>
-            </a:r>
-          </a:p>
-        </p:txBody>
-      </p:sp>
-    </p:spTree>
-    <p:extLst>
-      <p:ext uri="{BB962C8B-B14F-4D97-AF65-F5344CB8AC3E}">
-        <p14:creationId xmlns:p14="http://schemas.microsoft.com/office/powerpoint/2010/main" val="1979743713"/>
-      </p:ext>
-    </p:extLst>
-  </p:cSld>
-  <p:clrMapOvr>
-    <a:masterClrMapping/>
-  </p:clrMapOvr>
-  <mc:AlternateContent xmlns:mc="http://schemas.openxmlformats.org/markup-compatibility/2006">
-    <mc:Choice xmlns:p14="http://schemas.microsoft.com/office/powerpoint/2010/main" Requires="p14">
-      <p:transition spd="slow" p14:dur="2000"/>
-    </mc:Choice>
-    <mc:Fallback>
-      <p:transition spd="slow"/>
-    </mc:Fallback>
-  </mc:AlternateContent>
-  <p:timing>
-    <p:tnLst>
-      <p:par>
-        <p:cTn id="1" dur="indefinite" restart="never" nodeType="tmRoot"/>
-      </p:par>
-    </p:tnLst>
-  </p:timing>
-</p:sld>
-</file>
-
-<file path=ppt/slides/slide7.xml><?xml version="1.0" encoding="utf-8"?>
 <p:sld xmlns:a="http://schemas.openxmlformats.org/drawingml/2006/main" xmlns:r="http://schemas.openxmlformats.org/officeDocument/2006/relationships" xmlns:p="http://schemas.openxmlformats.org/presentationml/2006/main" showMasterSp="0">
   <p:cSld>
     <p:bg>
@@ -29210,7 +27653,7 @@
 </p:sld>
 </file>
 
-<file path=ppt/slides/slide8.xml><?xml version="1.0" encoding="utf-8"?>
+<file path=ppt/slides/slide7.xml><?xml version="1.0" encoding="utf-8"?>
 <p:sld xmlns:a="http://schemas.openxmlformats.org/drawingml/2006/main" xmlns:r="http://schemas.openxmlformats.org/officeDocument/2006/relationships" xmlns:p="http://schemas.openxmlformats.org/presentationml/2006/main">
   <p:cSld>
     <p:spTree>
@@ -29506,7 +27949,7 @@
 </p:sld>
 </file>
 
-<file path=ppt/slides/slide9.xml><?xml version="1.0" encoding="utf-8"?>
+<file path=ppt/slides/slide8.xml><?xml version="1.0" encoding="utf-8"?>
 <p:sld xmlns:a="http://schemas.openxmlformats.org/drawingml/2006/main" xmlns:r="http://schemas.openxmlformats.org/officeDocument/2006/relationships" xmlns:p="http://schemas.openxmlformats.org/presentationml/2006/main">
   <p:cSld>
     <p:bg>
@@ -30405,6 +28848,936 @@
             <a:r>
               <a:rPr lang="en-US" sz="3600" dirty="0" smtClean="0"/>
               <a:t>Few have ever been taught how</a:t>
+            </a:r>
+          </a:p>
+        </p:txBody>
+      </p:sp>
+    </p:spTree>
+  </p:cSld>
+  <p:clrMapOvr>
+    <a:masterClrMapping/>
+  </p:clrMapOvr>
+  <p:transition spd="med"/>
+  <p:timing>
+    <p:tnLst>
+      <p:par>
+        <p:cTn id="1" dur="indefinite" restart="never" nodeType="tmRoot">
+          <p:childTnLst>
+            <p:seq concurrent="1" nextAc="seek">
+              <p:cTn id="2" dur="indefinite" nodeType="mainSeq"/>
+              <p:prevCondLst>
+                <p:cond evt="onPrev" delay="0">
+                  <p:tgtEl>
+                    <p:sldTgt/>
+                  </p:tgtEl>
+                </p:cond>
+              </p:prevCondLst>
+              <p:nextCondLst>
+                <p:cond evt="onNext" delay="0">
+                  <p:tgtEl>
+                    <p:sldTgt/>
+                  </p:tgtEl>
+                </p:cond>
+              </p:nextCondLst>
+            </p:seq>
+          </p:childTnLst>
+        </p:cTn>
+      </p:par>
+    </p:tnLst>
+  </p:timing>
+</p:sld>
+</file>
+
+<file path=ppt/slides/slide9.xml><?xml version="1.0" encoding="utf-8"?>
+<p:sld xmlns:a="http://schemas.openxmlformats.org/drawingml/2006/main" xmlns:r="http://schemas.openxmlformats.org/officeDocument/2006/relationships" xmlns:p="http://schemas.openxmlformats.org/presentationml/2006/main">
+  <p:cSld>
+    <p:bg>
+      <p:bgPr>
+        <a:solidFill>
+          <a:srgbClr val="FFFFFF"/>
+        </a:solidFill>
+        <a:effectLst/>
+      </p:bgPr>
+    </p:bg>
+    <p:spTree>
+      <p:nvGrpSpPr>
+        <p:cNvPr id="1" name=""/>
+        <p:cNvGrpSpPr/>
+        <p:nvPr/>
+      </p:nvGrpSpPr>
+      <p:grpSpPr>
+        <a:xfrm>
+          <a:off x="0" y="0"/>
+          <a:ext cx="0" cy="0"/>
+          <a:chOff x="0" y="0"/>
+          <a:chExt cx="0" cy="0"/>
+        </a:xfrm>
+      </p:grpSpPr>
+      <p:sp>
+        <p:nvSpPr>
+          <p:cNvPr id="8193" name="Text Box 1"/>
+          <p:cNvSpPr txBox="1">
+            <a:spLocks noChangeArrowheads="1"/>
+          </p:cNvSpPr>
+          <p:nvPr/>
+        </p:nvSpPr>
+        <p:spPr bwMode="auto">
+          <a:xfrm>
+            <a:off x="989012" y="303213"/>
+            <a:ext cx="8166100" cy="1258887"/>
+          </a:xfrm>
+          <a:prstGeom prst="rect">
+            <a:avLst/>
+          </a:prstGeom>
+          <a:noFill/>
+          <a:ln>
+            <a:noFill/>
+          </a:ln>
+          <a:effectLst/>
+          <a:extLst>
+            <a:ext uri="{909E8E84-426E-40dd-AFC4-6F175D3DCCD1}">
+              <a14:hiddenFill xmlns="" xmlns:a14="http://schemas.microsoft.com/office/drawing/2010/main">
+                <a:solidFill>
+                  <a:srgbClr val="FFFFFF"/>
+                </a:solidFill>
+              </a14:hiddenFill>
+            </a:ext>
+            <a:ext uri="{91240B29-F687-4f45-9708-019B960494DF}">
+              <a14:hiddenLine xmlns="" xmlns:a14="http://schemas.microsoft.com/office/drawing/2010/main" w="9525" cap="flat">
+                <a:solidFill>
+                  <a:srgbClr val="3465A4"/>
+                </a:solidFill>
+                <a:round/>
+                <a:headEnd/>
+                <a:tailEnd/>
+              </a14:hiddenLine>
+            </a:ext>
+            <a:ext uri="{AF507438-7753-43e0-B8FC-AC1667EBCBE1}">
+              <a14:hiddenEffects xmlns="" xmlns:a14="http://schemas.microsoft.com/office/drawing/2010/main">
+                <a:effectLst>
+                  <a:outerShdw blurRad="63500" dist="38099" dir="2700000" algn="ctr" rotWithShape="0">
+                    <a:srgbClr val="000000">
+                      <a:alpha val="74998"/>
+                    </a:srgbClr>
+                  </a:outerShdw>
+                </a:effectLst>
+              </a14:hiddenEffects>
+            </a:ext>
+          </a:extLst>
+        </p:spPr>
+        <p:txBody>
+          <a:bodyPr lIns="100800" tIns="50400" rIns="100800" bIns="50400" anchor="ctr"/>
+          <a:lstStyle>
+            <a:lvl1pPr>
+              <a:tabLst>
+                <a:tab pos="0" algn="l"/>
+                <a:tab pos="457200" algn="l"/>
+                <a:tab pos="914400" algn="l"/>
+                <a:tab pos="1371600" algn="l"/>
+                <a:tab pos="1828800" algn="l"/>
+                <a:tab pos="2286000" algn="l"/>
+                <a:tab pos="2743200" algn="l"/>
+                <a:tab pos="3200400" algn="l"/>
+                <a:tab pos="3657600" algn="l"/>
+                <a:tab pos="4114800" algn="l"/>
+                <a:tab pos="4572000" algn="l"/>
+                <a:tab pos="5029200" algn="l"/>
+                <a:tab pos="5486400" algn="l"/>
+                <a:tab pos="5943600" algn="l"/>
+                <a:tab pos="6400800" algn="l"/>
+                <a:tab pos="6858000" algn="l"/>
+                <a:tab pos="7315200" algn="l"/>
+                <a:tab pos="7772400" algn="l"/>
+                <a:tab pos="8229600" algn="l"/>
+                <a:tab pos="8686800" algn="l"/>
+                <a:tab pos="9144000" algn="l"/>
+              </a:tabLst>
+              <a:defRPr>
+                <a:solidFill>
+                  <a:srgbClr val="000000"/>
+                </a:solidFill>
+                <a:latin typeface="Arial" charset="0"/>
+                <a:ea typeface="ＭＳ Ｐゴシック" charset="0"/>
+                <a:cs typeface="ＭＳ Ｐゴシック" charset="0"/>
+              </a:defRPr>
+            </a:lvl1pPr>
+            <a:lvl2pPr>
+              <a:tabLst>
+                <a:tab pos="0" algn="l"/>
+                <a:tab pos="457200" algn="l"/>
+                <a:tab pos="914400" algn="l"/>
+                <a:tab pos="1371600" algn="l"/>
+                <a:tab pos="1828800" algn="l"/>
+                <a:tab pos="2286000" algn="l"/>
+                <a:tab pos="2743200" algn="l"/>
+                <a:tab pos="3200400" algn="l"/>
+                <a:tab pos="3657600" algn="l"/>
+                <a:tab pos="4114800" algn="l"/>
+                <a:tab pos="4572000" algn="l"/>
+                <a:tab pos="5029200" algn="l"/>
+                <a:tab pos="5486400" algn="l"/>
+                <a:tab pos="5943600" algn="l"/>
+                <a:tab pos="6400800" algn="l"/>
+                <a:tab pos="6858000" algn="l"/>
+                <a:tab pos="7315200" algn="l"/>
+                <a:tab pos="7772400" algn="l"/>
+                <a:tab pos="8229600" algn="l"/>
+                <a:tab pos="8686800" algn="l"/>
+                <a:tab pos="9144000" algn="l"/>
+              </a:tabLst>
+              <a:defRPr>
+                <a:solidFill>
+                  <a:srgbClr val="000000"/>
+                </a:solidFill>
+                <a:latin typeface="Arial" charset="0"/>
+                <a:ea typeface="ＭＳ Ｐゴシック" charset="0"/>
+                <a:cs typeface="ＭＳ Ｐゴシック" charset="0"/>
+              </a:defRPr>
+            </a:lvl2pPr>
+            <a:lvl3pPr>
+              <a:tabLst>
+                <a:tab pos="0" algn="l"/>
+                <a:tab pos="457200" algn="l"/>
+                <a:tab pos="914400" algn="l"/>
+                <a:tab pos="1371600" algn="l"/>
+                <a:tab pos="1828800" algn="l"/>
+                <a:tab pos="2286000" algn="l"/>
+                <a:tab pos="2743200" algn="l"/>
+                <a:tab pos="3200400" algn="l"/>
+                <a:tab pos="3657600" algn="l"/>
+                <a:tab pos="4114800" algn="l"/>
+                <a:tab pos="4572000" algn="l"/>
+                <a:tab pos="5029200" algn="l"/>
+                <a:tab pos="5486400" algn="l"/>
+                <a:tab pos="5943600" algn="l"/>
+                <a:tab pos="6400800" algn="l"/>
+                <a:tab pos="6858000" algn="l"/>
+                <a:tab pos="7315200" algn="l"/>
+                <a:tab pos="7772400" algn="l"/>
+                <a:tab pos="8229600" algn="l"/>
+                <a:tab pos="8686800" algn="l"/>
+                <a:tab pos="9144000" algn="l"/>
+              </a:tabLst>
+              <a:defRPr>
+                <a:solidFill>
+                  <a:srgbClr val="000000"/>
+                </a:solidFill>
+                <a:latin typeface="Arial" charset="0"/>
+                <a:ea typeface="ＭＳ Ｐゴシック" charset="0"/>
+                <a:cs typeface="ＭＳ Ｐゴシック" charset="0"/>
+              </a:defRPr>
+            </a:lvl3pPr>
+            <a:lvl4pPr>
+              <a:tabLst>
+                <a:tab pos="0" algn="l"/>
+                <a:tab pos="457200" algn="l"/>
+                <a:tab pos="914400" algn="l"/>
+                <a:tab pos="1371600" algn="l"/>
+                <a:tab pos="1828800" algn="l"/>
+                <a:tab pos="2286000" algn="l"/>
+                <a:tab pos="2743200" algn="l"/>
+                <a:tab pos="3200400" algn="l"/>
+                <a:tab pos="3657600" algn="l"/>
+                <a:tab pos="4114800" algn="l"/>
+                <a:tab pos="4572000" algn="l"/>
+                <a:tab pos="5029200" algn="l"/>
+                <a:tab pos="5486400" algn="l"/>
+                <a:tab pos="5943600" algn="l"/>
+                <a:tab pos="6400800" algn="l"/>
+                <a:tab pos="6858000" algn="l"/>
+                <a:tab pos="7315200" algn="l"/>
+                <a:tab pos="7772400" algn="l"/>
+                <a:tab pos="8229600" algn="l"/>
+                <a:tab pos="8686800" algn="l"/>
+                <a:tab pos="9144000" algn="l"/>
+              </a:tabLst>
+              <a:defRPr>
+                <a:solidFill>
+                  <a:srgbClr val="000000"/>
+                </a:solidFill>
+                <a:latin typeface="Arial" charset="0"/>
+                <a:ea typeface="ＭＳ Ｐゴシック" charset="0"/>
+                <a:cs typeface="ＭＳ Ｐゴシック" charset="0"/>
+              </a:defRPr>
+            </a:lvl4pPr>
+            <a:lvl5pPr>
+              <a:tabLst>
+                <a:tab pos="0" algn="l"/>
+                <a:tab pos="457200" algn="l"/>
+                <a:tab pos="914400" algn="l"/>
+                <a:tab pos="1371600" algn="l"/>
+                <a:tab pos="1828800" algn="l"/>
+                <a:tab pos="2286000" algn="l"/>
+                <a:tab pos="2743200" algn="l"/>
+                <a:tab pos="3200400" algn="l"/>
+                <a:tab pos="3657600" algn="l"/>
+                <a:tab pos="4114800" algn="l"/>
+                <a:tab pos="4572000" algn="l"/>
+                <a:tab pos="5029200" algn="l"/>
+                <a:tab pos="5486400" algn="l"/>
+                <a:tab pos="5943600" algn="l"/>
+                <a:tab pos="6400800" algn="l"/>
+                <a:tab pos="6858000" algn="l"/>
+                <a:tab pos="7315200" algn="l"/>
+                <a:tab pos="7772400" algn="l"/>
+                <a:tab pos="8229600" algn="l"/>
+                <a:tab pos="8686800" algn="l"/>
+                <a:tab pos="9144000" algn="l"/>
+              </a:tabLst>
+              <a:defRPr>
+                <a:solidFill>
+                  <a:srgbClr val="000000"/>
+                </a:solidFill>
+                <a:latin typeface="Arial" charset="0"/>
+                <a:ea typeface="ＭＳ Ｐゴシック" charset="0"/>
+                <a:cs typeface="ＭＳ Ｐゴシック" charset="0"/>
+              </a:defRPr>
+            </a:lvl5pPr>
+            <a:lvl6pPr marL="2514600" indent="-228600" fontAlgn="base" hangingPunct="0">
+              <a:lnSpc>
+                <a:spcPct val="93000"/>
+              </a:lnSpc>
+              <a:spcBef>
+                <a:spcPct val="0"/>
+              </a:spcBef>
+              <a:spcAft>
+                <a:spcPct val="0"/>
+              </a:spcAft>
+              <a:buClr>
+                <a:srgbClr val="000000"/>
+              </a:buClr>
+              <a:buSzPct val="100000"/>
+              <a:buFont typeface="Times New Roman" charset="0"/>
+              <a:tabLst>
+                <a:tab pos="0" algn="l"/>
+                <a:tab pos="457200" algn="l"/>
+                <a:tab pos="914400" algn="l"/>
+                <a:tab pos="1371600" algn="l"/>
+                <a:tab pos="1828800" algn="l"/>
+                <a:tab pos="2286000" algn="l"/>
+                <a:tab pos="2743200" algn="l"/>
+                <a:tab pos="3200400" algn="l"/>
+                <a:tab pos="3657600" algn="l"/>
+                <a:tab pos="4114800" algn="l"/>
+                <a:tab pos="4572000" algn="l"/>
+                <a:tab pos="5029200" algn="l"/>
+                <a:tab pos="5486400" algn="l"/>
+                <a:tab pos="5943600" algn="l"/>
+                <a:tab pos="6400800" algn="l"/>
+                <a:tab pos="6858000" algn="l"/>
+                <a:tab pos="7315200" algn="l"/>
+                <a:tab pos="7772400" algn="l"/>
+                <a:tab pos="8229600" algn="l"/>
+                <a:tab pos="8686800" algn="l"/>
+                <a:tab pos="9144000" algn="l"/>
+              </a:tabLst>
+              <a:defRPr>
+                <a:solidFill>
+                  <a:srgbClr val="000000"/>
+                </a:solidFill>
+                <a:latin typeface="Arial" charset="0"/>
+                <a:ea typeface="ＭＳ Ｐゴシック" charset="0"/>
+                <a:cs typeface="ＭＳ Ｐゴシック" charset="0"/>
+              </a:defRPr>
+            </a:lvl6pPr>
+            <a:lvl7pPr marL="2971800" indent="-228600" fontAlgn="base" hangingPunct="0">
+              <a:lnSpc>
+                <a:spcPct val="93000"/>
+              </a:lnSpc>
+              <a:spcBef>
+                <a:spcPct val="0"/>
+              </a:spcBef>
+              <a:spcAft>
+                <a:spcPct val="0"/>
+              </a:spcAft>
+              <a:buClr>
+                <a:srgbClr val="000000"/>
+              </a:buClr>
+              <a:buSzPct val="100000"/>
+              <a:buFont typeface="Times New Roman" charset="0"/>
+              <a:tabLst>
+                <a:tab pos="0" algn="l"/>
+                <a:tab pos="457200" algn="l"/>
+                <a:tab pos="914400" algn="l"/>
+                <a:tab pos="1371600" algn="l"/>
+                <a:tab pos="1828800" algn="l"/>
+                <a:tab pos="2286000" algn="l"/>
+                <a:tab pos="2743200" algn="l"/>
+                <a:tab pos="3200400" algn="l"/>
+                <a:tab pos="3657600" algn="l"/>
+                <a:tab pos="4114800" algn="l"/>
+                <a:tab pos="4572000" algn="l"/>
+                <a:tab pos="5029200" algn="l"/>
+                <a:tab pos="5486400" algn="l"/>
+                <a:tab pos="5943600" algn="l"/>
+                <a:tab pos="6400800" algn="l"/>
+                <a:tab pos="6858000" algn="l"/>
+                <a:tab pos="7315200" algn="l"/>
+                <a:tab pos="7772400" algn="l"/>
+                <a:tab pos="8229600" algn="l"/>
+                <a:tab pos="8686800" algn="l"/>
+                <a:tab pos="9144000" algn="l"/>
+              </a:tabLst>
+              <a:defRPr>
+                <a:solidFill>
+                  <a:srgbClr val="000000"/>
+                </a:solidFill>
+                <a:latin typeface="Arial" charset="0"/>
+                <a:ea typeface="ＭＳ Ｐゴシック" charset="0"/>
+                <a:cs typeface="ＭＳ Ｐゴシック" charset="0"/>
+              </a:defRPr>
+            </a:lvl7pPr>
+            <a:lvl8pPr marL="3429000" indent="-228600" fontAlgn="base" hangingPunct="0">
+              <a:lnSpc>
+                <a:spcPct val="93000"/>
+              </a:lnSpc>
+              <a:spcBef>
+                <a:spcPct val="0"/>
+              </a:spcBef>
+              <a:spcAft>
+                <a:spcPct val="0"/>
+              </a:spcAft>
+              <a:buClr>
+                <a:srgbClr val="000000"/>
+              </a:buClr>
+              <a:buSzPct val="100000"/>
+              <a:buFont typeface="Times New Roman" charset="0"/>
+              <a:tabLst>
+                <a:tab pos="0" algn="l"/>
+                <a:tab pos="457200" algn="l"/>
+                <a:tab pos="914400" algn="l"/>
+                <a:tab pos="1371600" algn="l"/>
+                <a:tab pos="1828800" algn="l"/>
+                <a:tab pos="2286000" algn="l"/>
+                <a:tab pos="2743200" algn="l"/>
+                <a:tab pos="3200400" algn="l"/>
+                <a:tab pos="3657600" algn="l"/>
+                <a:tab pos="4114800" algn="l"/>
+                <a:tab pos="4572000" algn="l"/>
+                <a:tab pos="5029200" algn="l"/>
+                <a:tab pos="5486400" algn="l"/>
+                <a:tab pos="5943600" algn="l"/>
+                <a:tab pos="6400800" algn="l"/>
+                <a:tab pos="6858000" algn="l"/>
+                <a:tab pos="7315200" algn="l"/>
+                <a:tab pos="7772400" algn="l"/>
+                <a:tab pos="8229600" algn="l"/>
+                <a:tab pos="8686800" algn="l"/>
+                <a:tab pos="9144000" algn="l"/>
+              </a:tabLst>
+              <a:defRPr>
+                <a:solidFill>
+                  <a:srgbClr val="000000"/>
+                </a:solidFill>
+                <a:latin typeface="Arial" charset="0"/>
+                <a:ea typeface="ＭＳ Ｐゴシック" charset="0"/>
+                <a:cs typeface="ＭＳ Ｐゴシック" charset="0"/>
+              </a:defRPr>
+            </a:lvl8pPr>
+            <a:lvl9pPr marL="3886200" indent="-228600" fontAlgn="base" hangingPunct="0">
+              <a:lnSpc>
+                <a:spcPct val="93000"/>
+              </a:lnSpc>
+              <a:spcBef>
+                <a:spcPct val="0"/>
+              </a:spcBef>
+              <a:spcAft>
+                <a:spcPct val="0"/>
+              </a:spcAft>
+              <a:buClr>
+                <a:srgbClr val="000000"/>
+              </a:buClr>
+              <a:buSzPct val="100000"/>
+              <a:buFont typeface="Times New Roman" charset="0"/>
+              <a:tabLst>
+                <a:tab pos="0" algn="l"/>
+                <a:tab pos="457200" algn="l"/>
+                <a:tab pos="914400" algn="l"/>
+                <a:tab pos="1371600" algn="l"/>
+                <a:tab pos="1828800" algn="l"/>
+                <a:tab pos="2286000" algn="l"/>
+                <a:tab pos="2743200" algn="l"/>
+                <a:tab pos="3200400" algn="l"/>
+                <a:tab pos="3657600" algn="l"/>
+                <a:tab pos="4114800" algn="l"/>
+                <a:tab pos="4572000" algn="l"/>
+                <a:tab pos="5029200" algn="l"/>
+                <a:tab pos="5486400" algn="l"/>
+                <a:tab pos="5943600" algn="l"/>
+                <a:tab pos="6400800" algn="l"/>
+                <a:tab pos="6858000" algn="l"/>
+                <a:tab pos="7315200" algn="l"/>
+                <a:tab pos="7772400" algn="l"/>
+                <a:tab pos="8229600" algn="l"/>
+                <a:tab pos="8686800" algn="l"/>
+                <a:tab pos="9144000" algn="l"/>
+              </a:tabLst>
+              <a:defRPr>
+                <a:solidFill>
+                  <a:srgbClr val="000000"/>
+                </a:solidFill>
+                <a:latin typeface="Arial" charset="0"/>
+                <a:ea typeface="ＭＳ Ｐゴシック" charset="0"/>
+                <a:cs typeface="ＭＳ Ｐゴシック" charset="0"/>
+              </a:defRPr>
+            </a:lvl9pPr>
+          </a:lstStyle>
+          <a:p>
+            <a:pPr algn="ctr">
+              <a:buClrTx/>
+              <a:buFontTx/>
+              <a:buNone/>
+              <a:defRPr/>
+            </a:pPr>
+            <a:r>
+              <a:rPr lang="en-US" sz="4400" dirty="0" smtClean="0"/>
+              <a:t>So what?</a:t>
+            </a:r>
+          </a:p>
+        </p:txBody>
+      </p:sp>
+      <p:sp>
+        <p:nvSpPr>
+          <p:cNvPr id="8194" name="Text Box 2"/>
+          <p:cNvSpPr txBox="1">
+            <a:spLocks noChangeArrowheads="1"/>
+          </p:cNvSpPr>
+          <p:nvPr/>
+        </p:nvSpPr>
+        <p:spPr bwMode="auto">
+          <a:xfrm>
+            <a:off x="503238" y="1878013"/>
+            <a:ext cx="9074150" cy="4702175"/>
+          </a:xfrm>
+          <a:prstGeom prst="rect">
+            <a:avLst/>
+          </a:prstGeom>
+          <a:noFill/>
+          <a:ln>
+            <a:noFill/>
+          </a:ln>
+          <a:effectLst/>
+          <a:extLst>
+            <a:ext uri="{909E8E84-426E-40dd-AFC4-6F175D3DCCD1}">
+              <a14:hiddenFill xmlns="" xmlns:a14="http://schemas.microsoft.com/office/drawing/2010/main">
+                <a:solidFill>
+                  <a:srgbClr val="FFFFFF"/>
+                </a:solidFill>
+              </a14:hiddenFill>
+            </a:ext>
+            <a:ext uri="{91240B29-F687-4f45-9708-019B960494DF}">
+              <a14:hiddenLine xmlns="" xmlns:a14="http://schemas.microsoft.com/office/drawing/2010/main" w="9525" cap="flat">
+                <a:solidFill>
+                  <a:srgbClr val="3465A4"/>
+                </a:solidFill>
+                <a:round/>
+                <a:headEnd/>
+                <a:tailEnd/>
+              </a14:hiddenLine>
+            </a:ext>
+            <a:ext uri="{AF507438-7753-43e0-B8FC-AC1667EBCBE1}">
+              <a14:hiddenEffects xmlns="" xmlns:a14="http://schemas.microsoft.com/office/drawing/2010/main">
+                <a:effectLst>
+                  <a:outerShdw blurRad="63500" dist="38099" dir="2700000" algn="ctr" rotWithShape="0">
+                    <a:srgbClr val="000000">
+                      <a:alpha val="74998"/>
+                    </a:srgbClr>
+                  </a:outerShdw>
+                </a:effectLst>
+              </a14:hiddenEffects>
+            </a:ext>
+          </a:extLst>
+        </p:spPr>
+        <p:txBody>
+          <a:bodyPr lIns="100800" tIns="50400" rIns="100800" bIns="50400"/>
+          <a:lstStyle>
+            <a:lvl1pPr marL="568325" indent="-568325">
+              <a:tabLst>
+                <a:tab pos="568325" algn="l"/>
+                <a:tab pos="1025525" algn="l"/>
+                <a:tab pos="1482725" algn="l"/>
+                <a:tab pos="1939925" algn="l"/>
+                <a:tab pos="2397125" algn="l"/>
+                <a:tab pos="2854325" algn="l"/>
+                <a:tab pos="3311525" algn="l"/>
+                <a:tab pos="3768725" algn="l"/>
+                <a:tab pos="4225925" algn="l"/>
+                <a:tab pos="4683125" algn="l"/>
+                <a:tab pos="5140325" algn="l"/>
+                <a:tab pos="5597525" algn="l"/>
+                <a:tab pos="6054725" algn="l"/>
+                <a:tab pos="6511925" algn="l"/>
+                <a:tab pos="6969125" algn="l"/>
+                <a:tab pos="7426325" algn="l"/>
+                <a:tab pos="7883525" algn="l"/>
+                <a:tab pos="8340725" algn="l"/>
+                <a:tab pos="8797925" algn="l"/>
+                <a:tab pos="9255125" algn="l"/>
+                <a:tab pos="9712325" algn="l"/>
+              </a:tabLst>
+              <a:defRPr>
+                <a:solidFill>
+                  <a:srgbClr val="000000"/>
+                </a:solidFill>
+                <a:latin typeface="Arial" charset="0"/>
+                <a:ea typeface="ＭＳ Ｐゴシック" charset="0"/>
+                <a:cs typeface="ＭＳ Ｐゴシック" charset="0"/>
+              </a:defRPr>
+            </a:lvl1pPr>
+            <a:lvl2pPr marL="968375" indent="-568325">
+              <a:tabLst>
+                <a:tab pos="568325" algn="l"/>
+                <a:tab pos="1025525" algn="l"/>
+                <a:tab pos="1482725" algn="l"/>
+                <a:tab pos="1939925" algn="l"/>
+                <a:tab pos="2397125" algn="l"/>
+                <a:tab pos="2854325" algn="l"/>
+                <a:tab pos="3311525" algn="l"/>
+                <a:tab pos="3768725" algn="l"/>
+                <a:tab pos="4225925" algn="l"/>
+                <a:tab pos="4683125" algn="l"/>
+                <a:tab pos="5140325" algn="l"/>
+                <a:tab pos="5597525" algn="l"/>
+                <a:tab pos="6054725" algn="l"/>
+                <a:tab pos="6511925" algn="l"/>
+                <a:tab pos="6969125" algn="l"/>
+                <a:tab pos="7426325" algn="l"/>
+                <a:tab pos="7883525" algn="l"/>
+                <a:tab pos="8340725" algn="l"/>
+                <a:tab pos="8797925" algn="l"/>
+                <a:tab pos="9255125" algn="l"/>
+                <a:tab pos="9712325" algn="l"/>
+              </a:tabLst>
+              <a:defRPr>
+                <a:solidFill>
+                  <a:srgbClr val="000000"/>
+                </a:solidFill>
+                <a:latin typeface="Arial" charset="0"/>
+                <a:ea typeface="ＭＳ Ｐゴシック" charset="0"/>
+                <a:cs typeface="ＭＳ Ｐゴシック" charset="0"/>
+              </a:defRPr>
+            </a:lvl2pPr>
+            <a:lvl3pPr>
+              <a:tabLst>
+                <a:tab pos="568325" algn="l"/>
+                <a:tab pos="1025525" algn="l"/>
+                <a:tab pos="1482725" algn="l"/>
+                <a:tab pos="1939925" algn="l"/>
+                <a:tab pos="2397125" algn="l"/>
+                <a:tab pos="2854325" algn="l"/>
+                <a:tab pos="3311525" algn="l"/>
+                <a:tab pos="3768725" algn="l"/>
+                <a:tab pos="4225925" algn="l"/>
+                <a:tab pos="4683125" algn="l"/>
+                <a:tab pos="5140325" algn="l"/>
+                <a:tab pos="5597525" algn="l"/>
+                <a:tab pos="6054725" algn="l"/>
+                <a:tab pos="6511925" algn="l"/>
+                <a:tab pos="6969125" algn="l"/>
+                <a:tab pos="7426325" algn="l"/>
+                <a:tab pos="7883525" algn="l"/>
+                <a:tab pos="8340725" algn="l"/>
+                <a:tab pos="8797925" algn="l"/>
+                <a:tab pos="9255125" algn="l"/>
+                <a:tab pos="9712325" algn="l"/>
+              </a:tabLst>
+              <a:defRPr>
+                <a:solidFill>
+                  <a:srgbClr val="000000"/>
+                </a:solidFill>
+                <a:latin typeface="Arial" charset="0"/>
+                <a:ea typeface="ＭＳ Ｐゴシック" charset="0"/>
+                <a:cs typeface="ＭＳ Ｐゴシック" charset="0"/>
+              </a:defRPr>
+            </a:lvl3pPr>
+            <a:lvl4pPr>
+              <a:tabLst>
+                <a:tab pos="568325" algn="l"/>
+                <a:tab pos="1025525" algn="l"/>
+                <a:tab pos="1482725" algn="l"/>
+                <a:tab pos="1939925" algn="l"/>
+                <a:tab pos="2397125" algn="l"/>
+                <a:tab pos="2854325" algn="l"/>
+                <a:tab pos="3311525" algn="l"/>
+                <a:tab pos="3768725" algn="l"/>
+                <a:tab pos="4225925" algn="l"/>
+                <a:tab pos="4683125" algn="l"/>
+                <a:tab pos="5140325" algn="l"/>
+                <a:tab pos="5597525" algn="l"/>
+                <a:tab pos="6054725" algn="l"/>
+                <a:tab pos="6511925" algn="l"/>
+                <a:tab pos="6969125" algn="l"/>
+                <a:tab pos="7426325" algn="l"/>
+                <a:tab pos="7883525" algn="l"/>
+                <a:tab pos="8340725" algn="l"/>
+                <a:tab pos="8797925" algn="l"/>
+                <a:tab pos="9255125" algn="l"/>
+                <a:tab pos="9712325" algn="l"/>
+              </a:tabLst>
+              <a:defRPr>
+                <a:solidFill>
+                  <a:srgbClr val="000000"/>
+                </a:solidFill>
+                <a:latin typeface="Arial" charset="0"/>
+                <a:ea typeface="ＭＳ Ｐゴシック" charset="0"/>
+                <a:cs typeface="ＭＳ Ｐゴシック" charset="0"/>
+              </a:defRPr>
+            </a:lvl4pPr>
+            <a:lvl5pPr>
+              <a:tabLst>
+                <a:tab pos="568325" algn="l"/>
+                <a:tab pos="1025525" algn="l"/>
+                <a:tab pos="1482725" algn="l"/>
+                <a:tab pos="1939925" algn="l"/>
+                <a:tab pos="2397125" algn="l"/>
+                <a:tab pos="2854325" algn="l"/>
+                <a:tab pos="3311525" algn="l"/>
+                <a:tab pos="3768725" algn="l"/>
+                <a:tab pos="4225925" algn="l"/>
+                <a:tab pos="4683125" algn="l"/>
+                <a:tab pos="5140325" algn="l"/>
+                <a:tab pos="5597525" algn="l"/>
+                <a:tab pos="6054725" algn="l"/>
+                <a:tab pos="6511925" algn="l"/>
+                <a:tab pos="6969125" algn="l"/>
+                <a:tab pos="7426325" algn="l"/>
+                <a:tab pos="7883525" algn="l"/>
+                <a:tab pos="8340725" algn="l"/>
+                <a:tab pos="8797925" algn="l"/>
+                <a:tab pos="9255125" algn="l"/>
+                <a:tab pos="9712325" algn="l"/>
+              </a:tabLst>
+              <a:defRPr>
+                <a:solidFill>
+                  <a:srgbClr val="000000"/>
+                </a:solidFill>
+                <a:latin typeface="Arial" charset="0"/>
+                <a:ea typeface="ＭＳ Ｐゴシック" charset="0"/>
+                <a:cs typeface="ＭＳ Ｐゴシック" charset="0"/>
+              </a:defRPr>
+            </a:lvl5pPr>
+            <a:lvl6pPr marL="2514600" indent="-228600" fontAlgn="base" hangingPunct="0">
+              <a:lnSpc>
+                <a:spcPct val="93000"/>
+              </a:lnSpc>
+              <a:spcBef>
+                <a:spcPct val="0"/>
+              </a:spcBef>
+              <a:spcAft>
+                <a:spcPct val="0"/>
+              </a:spcAft>
+              <a:buClr>
+                <a:srgbClr val="000000"/>
+              </a:buClr>
+              <a:buSzPct val="100000"/>
+              <a:buFont typeface="Times New Roman" charset="0"/>
+              <a:tabLst>
+                <a:tab pos="568325" algn="l"/>
+                <a:tab pos="1025525" algn="l"/>
+                <a:tab pos="1482725" algn="l"/>
+                <a:tab pos="1939925" algn="l"/>
+                <a:tab pos="2397125" algn="l"/>
+                <a:tab pos="2854325" algn="l"/>
+                <a:tab pos="3311525" algn="l"/>
+                <a:tab pos="3768725" algn="l"/>
+                <a:tab pos="4225925" algn="l"/>
+                <a:tab pos="4683125" algn="l"/>
+                <a:tab pos="5140325" algn="l"/>
+                <a:tab pos="5597525" algn="l"/>
+                <a:tab pos="6054725" algn="l"/>
+                <a:tab pos="6511925" algn="l"/>
+                <a:tab pos="6969125" algn="l"/>
+                <a:tab pos="7426325" algn="l"/>
+                <a:tab pos="7883525" algn="l"/>
+                <a:tab pos="8340725" algn="l"/>
+                <a:tab pos="8797925" algn="l"/>
+                <a:tab pos="9255125" algn="l"/>
+                <a:tab pos="9712325" algn="l"/>
+              </a:tabLst>
+              <a:defRPr>
+                <a:solidFill>
+                  <a:srgbClr val="000000"/>
+                </a:solidFill>
+                <a:latin typeface="Arial" charset="0"/>
+                <a:ea typeface="ＭＳ Ｐゴシック" charset="0"/>
+                <a:cs typeface="ＭＳ Ｐゴシック" charset="0"/>
+              </a:defRPr>
+            </a:lvl6pPr>
+            <a:lvl7pPr marL="2971800" indent="-228600" fontAlgn="base" hangingPunct="0">
+              <a:lnSpc>
+                <a:spcPct val="93000"/>
+              </a:lnSpc>
+              <a:spcBef>
+                <a:spcPct val="0"/>
+              </a:spcBef>
+              <a:spcAft>
+                <a:spcPct val="0"/>
+              </a:spcAft>
+              <a:buClr>
+                <a:srgbClr val="000000"/>
+              </a:buClr>
+              <a:buSzPct val="100000"/>
+              <a:buFont typeface="Times New Roman" charset="0"/>
+              <a:tabLst>
+                <a:tab pos="568325" algn="l"/>
+                <a:tab pos="1025525" algn="l"/>
+                <a:tab pos="1482725" algn="l"/>
+                <a:tab pos="1939925" algn="l"/>
+                <a:tab pos="2397125" algn="l"/>
+                <a:tab pos="2854325" algn="l"/>
+                <a:tab pos="3311525" algn="l"/>
+                <a:tab pos="3768725" algn="l"/>
+                <a:tab pos="4225925" algn="l"/>
+                <a:tab pos="4683125" algn="l"/>
+                <a:tab pos="5140325" algn="l"/>
+                <a:tab pos="5597525" algn="l"/>
+                <a:tab pos="6054725" algn="l"/>
+                <a:tab pos="6511925" algn="l"/>
+                <a:tab pos="6969125" algn="l"/>
+                <a:tab pos="7426325" algn="l"/>
+                <a:tab pos="7883525" algn="l"/>
+                <a:tab pos="8340725" algn="l"/>
+                <a:tab pos="8797925" algn="l"/>
+                <a:tab pos="9255125" algn="l"/>
+                <a:tab pos="9712325" algn="l"/>
+              </a:tabLst>
+              <a:defRPr>
+                <a:solidFill>
+                  <a:srgbClr val="000000"/>
+                </a:solidFill>
+                <a:latin typeface="Arial" charset="0"/>
+                <a:ea typeface="ＭＳ Ｐゴシック" charset="0"/>
+                <a:cs typeface="ＭＳ Ｐゴシック" charset="0"/>
+              </a:defRPr>
+            </a:lvl7pPr>
+            <a:lvl8pPr marL="3429000" indent="-228600" fontAlgn="base" hangingPunct="0">
+              <a:lnSpc>
+                <a:spcPct val="93000"/>
+              </a:lnSpc>
+              <a:spcBef>
+                <a:spcPct val="0"/>
+              </a:spcBef>
+              <a:spcAft>
+                <a:spcPct val="0"/>
+              </a:spcAft>
+              <a:buClr>
+                <a:srgbClr val="000000"/>
+              </a:buClr>
+              <a:buSzPct val="100000"/>
+              <a:buFont typeface="Times New Roman" charset="0"/>
+              <a:tabLst>
+                <a:tab pos="568325" algn="l"/>
+                <a:tab pos="1025525" algn="l"/>
+                <a:tab pos="1482725" algn="l"/>
+                <a:tab pos="1939925" algn="l"/>
+                <a:tab pos="2397125" algn="l"/>
+                <a:tab pos="2854325" algn="l"/>
+                <a:tab pos="3311525" algn="l"/>
+                <a:tab pos="3768725" algn="l"/>
+                <a:tab pos="4225925" algn="l"/>
+                <a:tab pos="4683125" algn="l"/>
+                <a:tab pos="5140325" algn="l"/>
+                <a:tab pos="5597525" algn="l"/>
+                <a:tab pos="6054725" algn="l"/>
+                <a:tab pos="6511925" algn="l"/>
+                <a:tab pos="6969125" algn="l"/>
+                <a:tab pos="7426325" algn="l"/>
+                <a:tab pos="7883525" algn="l"/>
+                <a:tab pos="8340725" algn="l"/>
+                <a:tab pos="8797925" algn="l"/>
+                <a:tab pos="9255125" algn="l"/>
+                <a:tab pos="9712325" algn="l"/>
+              </a:tabLst>
+              <a:defRPr>
+                <a:solidFill>
+                  <a:srgbClr val="000000"/>
+                </a:solidFill>
+                <a:latin typeface="Arial" charset="0"/>
+                <a:ea typeface="ＭＳ Ｐゴシック" charset="0"/>
+                <a:cs typeface="ＭＳ Ｐゴシック" charset="0"/>
+              </a:defRPr>
+            </a:lvl8pPr>
+            <a:lvl9pPr marL="3886200" indent="-228600" fontAlgn="base" hangingPunct="0">
+              <a:lnSpc>
+                <a:spcPct val="93000"/>
+              </a:lnSpc>
+              <a:spcBef>
+                <a:spcPct val="0"/>
+              </a:spcBef>
+              <a:spcAft>
+                <a:spcPct val="0"/>
+              </a:spcAft>
+              <a:buClr>
+                <a:srgbClr val="000000"/>
+              </a:buClr>
+              <a:buSzPct val="100000"/>
+              <a:buFont typeface="Times New Roman" charset="0"/>
+              <a:tabLst>
+                <a:tab pos="568325" algn="l"/>
+                <a:tab pos="1025525" algn="l"/>
+                <a:tab pos="1482725" algn="l"/>
+                <a:tab pos="1939925" algn="l"/>
+                <a:tab pos="2397125" algn="l"/>
+                <a:tab pos="2854325" algn="l"/>
+                <a:tab pos="3311525" algn="l"/>
+                <a:tab pos="3768725" algn="l"/>
+                <a:tab pos="4225925" algn="l"/>
+                <a:tab pos="4683125" algn="l"/>
+                <a:tab pos="5140325" algn="l"/>
+                <a:tab pos="5597525" algn="l"/>
+                <a:tab pos="6054725" algn="l"/>
+                <a:tab pos="6511925" algn="l"/>
+                <a:tab pos="6969125" algn="l"/>
+                <a:tab pos="7426325" algn="l"/>
+                <a:tab pos="7883525" algn="l"/>
+                <a:tab pos="8340725" algn="l"/>
+                <a:tab pos="8797925" algn="l"/>
+                <a:tab pos="9255125" algn="l"/>
+                <a:tab pos="9712325" algn="l"/>
+              </a:tabLst>
+              <a:defRPr>
+                <a:solidFill>
+                  <a:srgbClr val="000000"/>
+                </a:solidFill>
+                <a:latin typeface="Arial" charset="0"/>
+                <a:ea typeface="ＭＳ Ｐゴシック" charset="0"/>
+                <a:cs typeface="ＭＳ Ｐゴシック" charset="0"/>
+              </a:defRPr>
+            </a:lvl9pPr>
+          </a:lstStyle>
+          <a:p>
+            <a:pPr>
+              <a:spcAft>
+                <a:spcPts val="1425"/>
+              </a:spcAft>
+              <a:buFont typeface="Arial" charset="0"/>
+              <a:buChar char="•"/>
+              <a:defRPr/>
+            </a:pPr>
+            <a:r>
+              <a:rPr lang="en-US" sz="4000" dirty="0" smtClean="0">
+                <a:cs typeface="Arial Unicode MS" charset="0"/>
+              </a:rPr>
+              <a:t>Most results take longer to produce than they need to</a:t>
+            </a:r>
+          </a:p>
+          <a:p>
+            <a:pPr>
+              <a:lnSpc>
+                <a:spcPct val="200000"/>
+              </a:lnSpc>
+              <a:spcAft>
+                <a:spcPts val="1425"/>
+              </a:spcAft>
+              <a:buFont typeface="Arial" charset="0"/>
+              <a:buChar char="•"/>
+              <a:defRPr/>
+            </a:pPr>
+            <a:r>
+              <a:rPr lang="en-US" sz="4000" dirty="0" smtClean="0">
+                <a:cs typeface="Arial Unicode MS" charset="0"/>
+              </a:rPr>
+              <a:t>Difficult to assess quality</a:t>
             </a:r>
           </a:p>
         </p:txBody>

</xml_diff>

<commit_message>
Removed some hidden slides for intro talk
</commit_message>
<xml_diff>
--- a/_extras/2017-08-02-BestPractices.pptx
+++ b/_extras/2017-08-02-BestPractices.pptx
@@ -7,29 +7,28 @@
     <p:sldMasterId id="2147483650" r:id="rId3"/>
   </p:sldMasterIdLst>
   <p:notesMasterIdLst>
-    <p:notesMasterId r:id="rId24"/>
+    <p:notesMasterId r:id="rId23"/>
   </p:notesMasterIdLst>
   <p:sldIdLst>
     <p:sldId id="289" r:id="rId4"/>
-    <p:sldId id="288" r:id="rId5"/>
-    <p:sldId id="256" r:id="rId6"/>
-    <p:sldId id="278" r:id="rId7"/>
-    <p:sldId id="280" r:id="rId8"/>
-    <p:sldId id="257" r:id="rId9"/>
-    <p:sldId id="276" r:id="rId10"/>
-    <p:sldId id="258" r:id="rId11"/>
-    <p:sldId id="259" r:id="rId12"/>
-    <p:sldId id="281" r:id="rId13"/>
-    <p:sldId id="272" r:id="rId14"/>
-    <p:sldId id="290" r:id="rId15"/>
-    <p:sldId id="269" r:id="rId16"/>
-    <p:sldId id="270" r:id="rId17"/>
-    <p:sldId id="274" r:id="rId18"/>
-    <p:sldId id="267" r:id="rId19"/>
-    <p:sldId id="268" r:id="rId20"/>
-    <p:sldId id="283" r:id="rId21"/>
-    <p:sldId id="291" r:id="rId22"/>
-    <p:sldId id="292" r:id="rId23"/>
+    <p:sldId id="256" r:id="rId5"/>
+    <p:sldId id="278" r:id="rId6"/>
+    <p:sldId id="280" r:id="rId7"/>
+    <p:sldId id="257" r:id="rId8"/>
+    <p:sldId id="276" r:id="rId9"/>
+    <p:sldId id="258" r:id="rId10"/>
+    <p:sldId id="259" r:id="rId11"/>
+    <p:sldId id="281" r:id="rId12"/>
+    <p:sldId id="272" r:id="rId13"/>
+    <p:sldId id="290" r:id="rId14"/>
+    <p:sldId id="269" r:id="rId15"/>
+    <p:sldId id="270" r:id="rId16"/>
+    <p:sldId id="274" r:id="rId17"/>
+    <p:sldId id="267" r:id="rId18"/>
+    <p:sldId id="268" r:id="rId19"/>
+    <p:sldId id="283" r:id="rId20"/>
+    <p:sldId id="291" r:id="rId21"/>
+    <p:sldId id="292" r:id="rId22"/>
   </p:sldIdLst>
   <p:sldSz cx="10080625" cy="7559675"/>
   <p:notesSz cx="7772400" cy="10058400"/>
@@ -1052,172 +1051,6 @@
 <file path=ppt/notesSlides/notesSlide10.xml><?xml version="1.0" encoding="utf-8"?>
 <p:notes xmlns:a="http://schemas.openxmlformats.org/drawingml/2006/main" xmlns:r="http://schemas.openxmlformats.org/officeDocument/2006/relationships" xmlns:p="http://schemas.openxmlformats.org/presentationml/2006/main">
   <p:cSld>
-    <p:bg>
-      <p:bgPr>
-        <a:solidFill>
-          <a:srgbClr val="FFFFFF"/>
-        </a:solidFill>
-        <a:effectLst/>
-      </p:bgPr>
-    </p:bg>
-    <p:spTree>
-      <p:nvGrpSpPr>
-        <p:cNvPr id="1" name=""/>
-        <p:cNvGrpSpPr/>
-        <p:nvPr/>
-      </p:nvGrpSpPr>
-      <p:grpSpPr>
-        <a:xfrm>
-          <a:off x="0" y="0"/>
-          <a:ext cx="0" cy="0"/>
-          <a:chOff x="0" y="0"/>
-          <a:chExt cx="0" cy="0"/>
-        </a:xfrm>
-      </p:grpSpPr>
-      <p:sp>
-        <p:nvSpPr>
-          <p:cNvPr id="4" name="Rectangle 8"/>
-          <p:cNvSpPr>
-            <a:spLocks noGrp="1" noChangeArrowheads="1"/>
-          </p:cNvSpPr>
-          <p:nvPr>
-            <p:ph type="sldNum" sz="quarter"/>
-          </p:nvPr>
-        </p:nvSpPr>
-        <p:spPr/>
-        <p:txBody>
-          <a:bodyPr/>
-          <a:lstStyle/>
-          <a:p>
-            <a:pPr>
-              <a:defRPr/>
-            </a:pPr>
-            <a:fld id="{60224D4E-3AFC-6840-9EAA-0034BE615DFC}" type="slidenum">
-              <a:rPr lang="en-US"/>
-              <a:pPr>
-                <a:defRPr/>
-              </a:pPr>
-              <a:t>10</a:t>
-            </a:fld>
-            <a:endParaRPr lang="en-US"/>
-          </a:p>
-        </p:txBody>
-      </p:sp>
-      <p:sp>
-        <p:nvSpPr>
-          <p:cNvPr id="28673" name="Text Box 1"/>
-          <p:cNvSpPr txBox="1">
-            <a:spLocks noGrp="1" noRot="1" noChangeAspect="1" noChangeArrowheads="1"/>
-          </p:cNvSpPr>
-          <p:nvPr>
-            <p:ph type="sldImg"/>
-          </p:nvPr>
-        </p:nvSpPr>
-        <p:spPr>
-          <a:xfrm>
-            <a:off x="1371600" y="763588"/>
-            <a:ext cx="5027613" cy="3770312"/>
-          </a:xfrm>
-          <a:solidFill>
-            <a:srgbClr val="FFFFFF"/>
-          </a:solidFill>
-          <a:ln>
-            <a:solidFill>
-              <a:srgbClr val="000000"/>
-            </a:solidFill>
-            <a:miter lim="800000"/>
-            <a:headEnd/>
-            <a:tailEnd/>
-          </a:ln>
-          <a:extLst>
-            <a:ext uri="{AF507438-7753-43e0-B8FC-AC1667EBCBE1}">
-              <a14:hiddenEffects xmlns="" xmlns:a14="http://schemas.microsoft.com/office/drawing/2010/main">
-                <a:effectLst>
-                  <a:outerShdw blurRad="63500" dist="38099" dir="2700000" algn="ctr" rotWithShape="0">
-                    <a:srgbClr val="000000">
-                      <a:alpha val="74998"/>
-                    </a:srgbClr>
-                  </a:outerShdw>
-                </a:effectLst>
-              </a14:hiddenEffects>
-            </a:ext>
-          </a:extLst>
-        </p:spPr>
-      </p:sp>
-      <p:sp>
-        <p:nvSpPr>
-          <p:cNvPr id="28674" name="Text Box 2"/>
-          <p:cNvSpPr txBox="1">
-            <a:spLocks noChangeArrowheads="1"/>
-          </p:cNvSpPr>
-          <p:nvPr/>
-        </p:nvSpPr>
-        <p:spPr bwMode="auto">
-          <a:xfrm>
-            <a:off x="777875" y="4776788"/>
-            <a:ext cx="6216650" cy="4524375"/>
-          </a:xfrm>
-          <a:prstGeom prst="rect">
-            <a:avLst/>
-          </a:prstGeom>
-          <a:noFill/>
-          <a:ln>
-            <a:noFill/>
-          </a:ln>
-          <a:effectLst/>
-          <a:extLst>
-            <a:ext uri="{909E8E84-426E-40dd-AFC4-6F175D3DCCD1}">
-              <a14:hiddenFill xmlns="" xmlns:a14="http://schemas.microsoft.com/office/drawing/2010/main">
-                <a:solidFill>
-                  <a:srgbClr val="FFFFFF"/>
-                </a:solidFill>
-              </a14:hiddenFill>
-            </a:ext>
-            <a:ext uri="{91240B29-F687-4f45-9708-019B960494DF}">
-              <a14:hiddenLine xmlns="" xmlns:a14="http://schemas.microsoft.com/office/drawing/2010/main" w="9525" cap="flat">
-                <a:solidFill>
-                  <a:srgbClr val="3465A4"/>
-                </a:solidFill>
-                <a:round/>
-                <a:headEnd/>
-                <a:tailEnd/>
-              </a14:hiddenLine>
-            </a:ext>
-            <a:ext uri="{AF507438-7753-43e0-B8FC-AC1667EBCBE1}">
-              <a14:hiddenEffects xmlns="" xmlns:a14="http://schemas.microsoft.com/office/drawing/2010/main">
-                <a:effectLst>
-                  <a:outerShdw blurRad="63500" dist="38099" dir="2700000" algn="ctr" rotWithShape="0">
-                    <a:srgbClr val="000000">
-                      <a:alpha val="74998"/>
-                    </a:srgbClr>
-                  </a:outerShdw>
-                </a:effectLst>
-              </a14:hiddenEffects>
-            </a:ext>
-          </a:extLst>
-        </p:spPr>
-        <p:txBody>
-          <a:bodyPr wrap="none" anchor="ctr"/>
-          <a:lstStyle/>
-          <a:p>
-            <a:pPr>
-              <a:defRPr/>
-            </a:pPr>
-            <a:endParaRPr lang="en-US"/>
-          </a:p>
-        </p:txBody>
-      </p:sp>
-    </p:spTree>
-  </p:cSld>
-  <p:clrMapOvr>
-    <a:masterClrMapping/>
-  </p:clrMapOvr>
-</p:notes>
-</file>
-
-<file path=ppt/notesSlides/notesSlide11.xml><?xml version="1.0" encoding="utf-8"?>
-<p:notes xmlns:a="http://schemas.openxmlformats.org/drawingml/2006/main" xmlns:r="http://schemas.openxmlformats.org/officeDocument/2006/relationships" xmlns:p="http://schemas.openxmlformats.org/presentationml/2006/main">
-  <p:cSld>
     <p:spTree>
       <p:nvGrpSpPr>
         <p:cNvPr id="1" name=""/>
@@ -1305,7 +1138,7 @@
               <a:pPr>
                 <a:defRPr/>
               </a:pPr>
-              <a:t>11</a:t>
+              <a:t>10</a:t>
             </a:fld>
             <a:endParaRPr lang="en-US"/>
           </a:p>
@@ -1319,7 +1152,7 @@
 </p:notes>
 </file>
 
-<file path=ppt/notesSlides/notesSlide12.xml><?xml version="1.0" encoding="utf-8"?>
+<file path=ppt/notesSlides/notesSlide11.xml><?xml version="1.0" encoding="utf-8"?>
 <p:notes xmlns:a="http://schemas.openxmlformats.org/drawingml/2006/main" xmlns:r="http://schemas.openxmlformats.org/officeDocument/2006/relationships" xmlns:p="http://schemas.openxmlformats.org/presentationml/2006/main">
   <p:cSld>
     <p:bg>
@@ -1367,7 +1200,7 @@
               <a:pPr>
                 <a:defRPr/>
               </a:pPr>
-              <a:t>13</a:t>
+              <a:t>12</a:t>
             </a:fld>
             <a:endParaRPr lang="en-US"/>
           </a:p>
@@ -1485,7 +1318,7 @@
 </p:notes>
 </file>
 
-<file path=ppt/notesSlides/notesSlide13.xml><?xml version="1.0" encoding="utf-8"?>
+<file path=ppt/notesSlides/notesSlide12.xml><?xml version="1.0" encoding="utf-8"?>
 <p:notes xmlns:a="http://schemas.openxmlformats.org/drawingml/2006/main" xmlns:r="http://schemas.openxmlformats.org/officeDocument/2006/relationships" xmlns:p="http://schemas.openxmlformats.org/presentationml/2006/main">
   <p:cSld>
     <p:bg>
@@ -1533,7 +1366,7 @@
               <a:pPr>
                 <a:defRPr/>
               </a:pPr>
-              <a:t>14</a:t>
+              <a:t>13</a:t>
             </a:fld>
             <a:endParaRPr lang="en-US"/>
           </a:p>
@@ -1651,7 +1484,7 @@
 </p:notes>
 </file>
 
-<file path=ppt/notesSlides/notesSlide14.xml><?xml version="1.0" encoding="utf-8"?>
+<file path=ppt/notesSlides/notesSlide13.xml><?xml version="1.0" encoding="utf-8"?>
 <p:notes xmlns:a="http://schemas.openxmlformats.org/drawingml/2006/main" xmlns:r="http://schemas.openxmlformats.org/officeDocument/2006/relationships" xmlns:p="http://schemas.openxmlformats.org/presentationml/2006/main">
   <p:cSld>
     <p:spTree>
@@ -1761,7 +1594,7 @@
               <a:pPr>
                 <a:defRPr/>
               </a:pPr>
-              <a:t>15</a:t>
+              <a:t>14</a:t>
             </a:fld>
             <a:endParaRPr lang="en-US"/>
           </a:p>
@@ -1775,7 +1608,7 @@
 </p:notes>
 </file>
 
-<file path=ppt/notesSlides/notesSlide15.xml><?xml version="1.0" encoding="utf-8"?>
+<file path=ppt/notesSlides/notesSlide14.xml><?xml version="1.0" encoding="utf-8"?>
 <p:notes xmlns:a="http://schemas.openxmlformats.org/drawingml/2006/main" xmlns:r="http://schemas.openxmlformats.org/officeDocument/2006/relationships" xmlns:p="http://schemas.openxmlformats.org/presentationml/2006/main">
   <p:cSld>
     <p:bg>
@@ -1823,7 +1656,7 @@
               <a:pPr>
                 <a:defRPr/>
               </a:pPr>
-              <a:t>16</a:t>
+              <a:t>15</a:t>
             </a:fld>
             <a:endParaRPr lang="en-US"/>
           </a:p>
@@ -1941,7 +1774,7 @@
 </p:notes>
 </file>
 
-<file path=ppt/notesSlides/notesSlide16.xml><?xml version="1.0" encoding="utf-8"?>
+<file path=ppt/notesSlides/notesSlide15.xml><?xml version="1.0" encoding="utf-8"?>
 <p:notes xmlns:a="http://schemas.openxmlformats.org/drawingml/2006/main" xmlns:r="http://schemas.openxmlformats.org/officeDocument/2006/relationships" xmlns:p="http://schemas.openxmlformats.org/presentationml/2006/main">
   <p:cSld>
     <p:bg>
@@ -1989,7 +1822,7 @@
               <a:pPr>
                 <a:defRPr/>
               </a:pPr>
-              <a:t>17</a:t>
+              <a:t>16</a:t>
             </a:fld>
             <a:endParaRPr lang="en-US"/>
           </a:p>
@@ -2131,7 +1964,7 @@
 </p:notes>
 </file>
 
-<file path=ppt/notesSlides/notesSlide17.xml><?xml version="1.0" encoding="utf-8"?>
+<file path=ppt/notesSlides/notesSlide16.xml><?xml version="1.0" encoding="utf-8"?>
 <p:notes xmlns:a="http://schemas.openxmlformats.org/drawingml/2006/main" xmlns:r="http://schemas.openxmlformats.org/officeDocument/2006/relationships" xmlns:p="http://schemas.openxmlformats.org/presentationml/2006/main">
   <p:cSld>
     <p:spTree>
@@ -2208,7 +2041,7 @@
               <a:pPr>
                 <a:defRPr/>
               </a:pPr>
-              <a:t>19</a:t>
+              <a:t>18</a:t>
             </a:fld>
             <a:endParaRPr lang="en-US"/>
           </a:p>
@@ -2228,97 +2061,6 @@
 </file>
 
 <file path=ppt/notesSlides/notesSlide2.xml><?xml version="1.0" encoding="utf-8"?>
-<p:notes xmlns:a="http://schemas.openxmlformats.org/drawingml/2006/main" xmlns:r="http://schemas.openxmlformats.org/officeDocument/2006/relationships" xmlns:p="http://schemas.openxmlformats.org/presentationml/2006/main">
-  <p:cSld>
-    <p:spTree>
-      <p:nvGrpSpPr>
-        <p:cNvPr id="1" name=""/>
-        <p:cNvGrpSpPr/>
-        <p:nvPr/>
-      </p:nvGrpSpPr>
-      <p:grpSpPr>
-        <a:xfrm>
-          <a:off x="0" y="0"/>
-          <a:ext cx="0" cy="0"/>
-          <a:chOff x="0" y="0"/>
-          <a:chExt cx="0" cy="0"/>
-        </a:xfrm>
-      </p:grpSpPr>
-      <p:sp>
-        <p:nvSpPr>
-          <p:cNvPr id="2" name="Slide Image Placeholder 1"/>
-          <p:cNvSpPr>
-            <a:spLocks noGrp="1" noRot="1" noChangeAspect="1"/>
-          </p:cNvSpPr>
-          <p:nvPr>
-            <p:ph type="sldImg"/>
-          </p:nvPr>
-        </p:nvSpPr>
-        <p:spPr/>
-      </p:sp>
-      <p:sp>
-        <p:nvSpPr>
-          <p:cNvPr id="3" name="Notes Placeholder 2"/>
-          <p:cNvSpPr>
-            <a:spLocks noGrp="1"/>
-          </p:cNvSpPr>
-          <p:nvPr>
-            <p:ph type="body" idx="1"/>
-          </p:nvPr>
-        </p:nvSpPr>
-        <p:spPr/>
-        <p:txBody>
-          <a:bodyPr/>
-          <a:lstStyle/>
-          <a:p>
-            <a:pPr>
-              <a:defRPr/>
-            </a:pPr>
-            <a:r>
-              <a:rPr lang="en-US" dirty="0" smtClean="0"/>
-              <a:t>SHOW SCHEDULE AND ETHERPAD, Introductions to neighbors.</a:t>
-            </a:r>
-          </a:p>
-        </p:txBody>
-      </p:sp>
-      <p:sp>
-        <p:nvSpPr>
-          <p:cNvPr id="4" name="Slide Number Placeholder 3"/>
-          <p:cNvSpPr>
-            <a:spLocks noGrp="1"/>
-          </p:cNvSpPr>
-          <p:nvPr>
-            <p:ph type="sldNum" sz="quarter"/>
-          </p:nvPr>
-        </p:nvSpPr>
-        <p:spPr/>
-        <p:txBody>
-          <a:bodyPr/>
-          <a:lstStyle/>
-          <a:p>
-            <a:pPr>
-              <a:defRPr/>
-            </a:pPr>
-            <a:fld id="{F8C84AC7-1F2A-CA47-827C-16FF0F08368C}" type="slidenum">
-              <a:rPr lang="en-US" smtClean="0"/>
-              <a:pPr>
-                <a:defRPr/>
-              </a:pPr>
-              <a:t>2</a:t>
-            </a:fld>
-            <a:endParaRPr lang="en-US"/>
-          </a:p>
-        </p:txBody>
-      </p:sp>
-    </p:spTree>
-  </p:cSld>
-  <p:clrMapOvr>
-    <a:masterClrMapping/>
-  </p:clrMapOvr>
-</p:notes>
-</file>
-
-<file path=ppt/notesSlides/notesSlide3.xml><?xml version="1.0" encoding="utf-8"?>
 <p:notes xmlns:a="http://schemas.openxmlformats.org/drawingml/2006/main" xmlns:r="http://schemas.openxmlformats.org/officeDocument/2006/relationships" xmlns:p="http://schemas.openxmlformats.org/presentationml/2006/main">
   <p:cSld>
     <p:bg>
@@ -2366,7 +2108,7 @@
               <a:pPr>
                 <a:defRPr/>
               </a:pPr>
-              <a:t>3</a:t>
+              <a:t>2</a:t>
             </a:fld>
             <a:endParaRPr lang="en-US"/>
           </a:p>
@@ -2798,7 +2540,7 @@
                 <a:buNone/>
                 <a:defRPr/>
               </a:pPr>
-              <a:t>3</a:t>
+              <a:t>2</a:t>
             </a:fld>
             <a:endParaRPr lang="en-US" sz="1400" smtClean="0">
               <a:latin typeface="Times New Roman" charset="0"/>
@@ -2944,7 +2686,7 @@
 </p:notes>
 </file>
 
-<file path=ppt/notesSlides/notesSlide4.xml><?xml version="1.0" encoding="utf-8"?>
+<file path=ppt/notesSlides/notesSlide3.xml><?xml version="1.0" encoding="utf-8"?>
 <p:notes xmlns:a="http://schemas.openxmlformats.org/drawingml/2006/main" xmlns:r="http://schemas.openxmlformats.org/officeDocument/2006/relationships" xmlns:p="http://schemas.openxmlformats.org/presentationml/2006/main">
   <p:cSld>
     <p:bg>
@@ -2992,7 +2734,7 @@
               <a:pPr>
                 <a:defRPr/>
               </a:pPr>
-              <a:t>4</a:t>
+              <a:t>3</a:t>
             </a:fld>
             <a:endParaRPr lang="en-US"/>
           </a:p>
@@ -3110,7 +2852,7 @@
 </p:notes>
 </file>
 
-<file path=ppt/notesSlides/notesSlide5.xml><?xml version="1.0" encoding="utf-8"?>
+<file path=ppt/notesSlides/notesSlide4.xml><?xml version="1.0" encoding="utf-8"?>
 <p:notes xmlns:a="http://schemas.openxmlformats.org/drawingml/2006/main" xmlns:r="http://schemas.openxmlformats.org/officeDocument/2006/relationships" xmlns:p="http://schemas.openxmlformats.org/presentationml/2006/main">
   <p:cSld>
     <p:bg>
@@ -3158,7 +2900,7 @@
               <a:pPr>
                 <a:defRPr/>
               </a:pPr>
-              <a:t>5</a:t>
+              <a:t>4</a:t>
             </a:fld>
             <a:endParaRPr lang="en-US"/>
           </a:p>
@@ -3306,7 +3048,7 @@
 </p:notes>
 </file>
 
-<file path=ppt/notesSlides/notesSlide6.xml><?xml version="1.0" encoding="utf-8"?>
+<file path=ppt/notesSlides/notesSlide5.xml><?xml version="1.0" encoding="utf-8"?>
 <p:notes xmlns:a="http://schemas.openxmlformats.org/drawingml/2006/main" xmlns:r="http://schemas.openxmlformats.org/officeDocument/2006/relationships" xmlns:p="http://schemas.openxmlformats.org/presentationml/2006/main">
   <p:cSld>
     <p:bg>
@@ -3354,7 +3096,7 @@
               <a:pPr>
                 <a:defRPr/>
               </a:pPr>
-              <a:t>6</a:t>
+              <a:t>5</a:t>
             </a:fld>
             <a:endParaRPr lang="en-US"/>
           </a:p>
@@ -3786,7 +3528,7 @@
                 <a:buNone/>
                 <a:defRPr/>
               </a:pPr>
-              <a:t>6</a:t>
+              <a:t>5</a:t>
             </a:fld>
             <a:endParaRPr lang="en-US" sz="1400" smtClean="0">
               <a:latin typeface="Times New Roman" charset="0"/>
@@ -3906,7 +3648,7 @@
 </p:notes>
 </file>
 
-<file path=ppt/notesSlides/notesSlide7.xml><?xml version="1.0" encoding="utf-8"?>
+<file path=ppt/notesSlides/notesSlide6.xml><?xml version="1.0" encoding="utf-8"?>
 <p:notes xmlns:a="http://schemas.openxmlformats.org/drawingml/2006/main" xmlns:r="http://schemas.openxmlformats.org/officeDocument/2006/relationships" xmlns:p="http://schemas.openxmlformats.org/presentationml/2006/main">
   <p:cSld>
     <p:spTree>
@@ -3980,7 +3722,7 @@
               <a:pPr>
                 <a:defRPr/>
               </a:pPr>
-              <a:t>7</a:t>
+              <a:t>6</a:t>
             </a:fld>
             <a:endParaRPr lang="en-US"/>
           </a:p>
@@ -3994,7 +3736,7 @@
 </p:notes>
 </file>
 
-<file path=ppt/notesSlides/notesSlide8.xml><?xml version="1.0" encoding="utf-8"?>
+<file path=ppt/notesSlides/notesSlide7.xml><?xml version="1.0" encoding="utf-8"?>
 <p:notes xmlns:a="http://schemas.openxmlformats.org/drawingml/2006/main" xmlns:r="http://schemas.openxmlformats.org/officeDocument/2006/relationships" xmlns:p="http://schemas.openxmlformats.org/presentationml/2006/main">
   <p:cSld>
     <p:bg>
@@ -4042,7 +3784,7 @@
               <a:pPr>
                 <a:defRPr/>
               </a:pPr>
-              <a:t>8</a:t>
+              <a:t>7</a:t>
             </a:fld>
             <a:endParaRPr lang="en-US"/>
           </a:p>
@@ -4160,7 +3902,7 @@
 </p:notes>
 </file>
 
-<file path=ppt/notesSlides/notesSlide9.xml><?xml version="1.0" encoding="utf-8"?>
+<file path=ppt/notesSlides/notesSlide8.xml><?xml version="1.0" encoding="utf-8"?>
 <p:notes xmlns:a="http://schemas.openxmlformats.org/drawingml/2006/main" xmlns:r="http://schemas.openxmlformats.org/officeDocument/2006/relationships" xmlns:p="http://schemas.openxmlformats.org/presentationml/2006/main">
   <p:cSld>
     <p:bg>
@@ -4208,7 +3950,7 @@
               <a:pPr>
                 <a:defRPr/>
               </a:pPr>
-              <a:t>9</a:t>
+              <a:t>8</a:t>
             </a:fld>
             <a:endParaRPr lang="en-US"/>
           </a:p>
@@ -4258,6 +4000,172 @@
       <p:sp>
         <p:nvSpPr>
           <p:cNvPr id="23554" name="Text Box 2"/>
+          <p:cNvSpPr txBox="1">
+            <a:spLocks noChangeArrowheads="1"/>
+          </p:cNvSpPr>
+          <p:nvPr/>
+        </p:nvSpPr>
+        <p:spPr bwMode="auto">
+          <a:xfrm>
+            <a:off x="777875" y="4776788"/>
+            <a:ext cx="6216650" cy="4524375"/>
+          </a:xfrm>
+          <a:prstGeom prst="rect">
+            <a:avLst/>
+          </a:prstGeom>
+          <a:noFill/>
+          <a:ln>
+            <a:noFill/>
+          </a:ln>
+          <a:effectLst/>
+          <a:extLst>
+            <a:ext uri="{909E8E84-426E-40dd-AFC4-6F175D3DCCD1}">
+              <a14:hiddenFill xmlns="" xmlns:a14="http://schemas.microsoft.com/office/drawing/2010/main">
+                <a:solidFill>
+                  <a:srgbClr val="FFFFFF"/>
+                </a:solidFill>
+              </a14:hiddenFill>
+            </a:ext>
+            <a:ext uri="{91240B29-F687-4f45-9708-019B960494DF}">
+              <a14:hiddenLine xmlns="" xmlns:a14="http://schemas.microsoft.com/office/drawing/2010/main" w="9525" cap="flat">
+                <a:solidFill>
+                  <a:srgbClr val="3465A4"/>
+                </a:solidFill>
+                <a:round/>
+                <a:headEnd/>
+                <a:tailEnd/>
+              </a14:hiddenLine>
+            </a:ext>
+            <a:ext uri="{AF507438-7753-43e0-B8FC-AC1667EBCBE1}">
+              <a14:hiddenEffects xmlns="" xmlns:a14="http://schemas.microsoft.com/office/drawing/2010/main">
+                <a:effectLst>
+                  <a:outerShdw blurRad="63500" dist="38099" dir="2700000" algn="ctr" rotWithShape="0">
+                    <a:srgbClr val="000000">
+                      <a:alpha val="74998"/>
+                    </a:srgbClr>
+                  </a:outerShdw>
+                </a:effectLst>
+              </a14:hiddenEffects>
+            </a:ext>
+          </a:extLst>
+        </p:spPr>
+        <p:txBody>
+          <a:bodyPr wrap="none" anchor="ctr"/>
+          <a:lstStyle/>
+          <a:p>
+            <a:pPr>
+              <a:defRPr/>
+            </a:pPr>
+            <a:endParaRPr lang="en-US"/>
+          </a:p>
+        </p:txBody>
+      </p:sp>
+    </p:spTree>
+  </p:cSld>
+  <p:clrMapOvr>
+    <a:masterClrMapping/>
+  </p:clrMapOvr>
+</p:notes>
+</file>
+
+<file path=ppt/notesSlides/notesSlide9.xml><?xml version="1.0" encoding="utf-8"?>
+<p:notes xmlns:a="http://schemas.openxmlformats.org/drawingml/2006/main" xmlns:r="http://schemas.openxmlformats.org/officeDocument/2006/relationships" xmlns:p="http://schemas.openxmlformats.org/presentationml/2006/main">
+  <p:cSld>
+    <p:bg>
+      <p:bgPr>
+        <a:solidFill>
+          <a:srgbClr val="FFFFFF"/>
+        </a:solidFill>
+        <a:effectLst/>
+      </p:bgPr>
+    </p:bg>
+    <p:spTree>
+      <p:nvGrpSpPr>
+        <p:cNvPr id="1" name=""/>
+        <p:cNvGrpSpPr/>
+        <p:nvPr/>
+      </p:nvGrpSpPr>
+      <p:grpSpPr>
+        <a:xfrm>
+          <a:off x="0" y="0"/>
+          <a:ext cx="0" cy="0"/>
+          <a:chOff x="0" y="0"/>
+          <a:chExt cx="0" cy="0"/>
+        </a:xfrm>
+      </p:grpSpPr>
+      <p:sp>
+        <p:nvSpPr>
+          <p:cNvPr id="4" name="Rectangle 8"/>
+          <p:cNvSpPr>
+            <a:spLocks noGrp="1" noChangeArrowheads="1"/>
+          </p:cNvSpPr>
+          <p:nvPr>
+            <p:ph type="sldNum" sz="quarter"/>
+          </p:nvPr>
+        </p:nvSpPr>
+        <p:spPr/>
+        <p:txBody>
+          <a:bodyPr/>
+          <a:lstStyle/>
+          <a:p>
+            <a:pPr>
+              <a:defRPr/>
+            </a:pPr>
+            <a:fld id="{60224D4E-3AFC-6840-9EAA-0034BE615DFC}" type="slidenum">
+              <a:rPr lang="en-US"/>
+              <a:pPr>
+                <a:defRPr/>
+              </a:pPr>
+              <a:t>9</a:t>
+            </a:fld>
+            <a:endParaRPr lang="en-US"/>
+          </a:p>
+        </p:txBody>
+      </p:sp>
+      <p:sp>
+        <p:nvSpPr>
+          <p:cNvPr id="28673" name="Text Box 1"/>
+          <p:cNvSpPr txBox="1">
+            <a:spLocks noGrp="1" noRot="1" noChangeAspect="1" noChangeArrowheads="1"/>
+          </p:cNvSpPr>
+          <p:nvPr>
+            <p:ph type="sldImg"/>
+          </p:nvPr>
+        </p:nvSpPr>
+        <p:spPr>
+          <a:xfrm>
+            <a:off x="1371600" y="763588"/>
+            <a:ext cx="5027613" cy="3770312"/>
+          </a:xfrm>
+          <a:solidFill>
+            <a:srgbClr val="FFFFFF"/>
+          </a:solidFill>
+          <a:ln>
+            <a:solidFill>
+              <a:srgbClr val="000000"/>
+            </a:solidFill>
+            <a:miter lim="800000"/>
+            <a:headEnd/>
+            <a:tailEnd/>
+          </a:ln>
+          <a:extLst>
+            <a:ext uri="{AF507438-7753-43e0-B8FC-AC1667EBCBE1}">
+              <a14:hiddenEffects xmlns="" xmlns:a14="http://schemas.microsoft.com/office/drawing/2010/main">
+                <a:effectLst>
+                  <a:outerShdw blurRad="63500" dist="38099" dir="2700000" algn="ctr" rotWithShape="0">
+                    <a:srgbClr val="000000">
+                      <a:alpha val="74998"/>
+                    </a:srgbClr>
+                  </a:outerShdw>
+                </a:effectLst>
+              </a14:hiddenEffects>
+            </a:ext>
+          </a:extLst>
+        </p:spPr>
+      </p:sp>
+      <p:sp>
+        <p:nvSpPr>
+          <p:cNvPr id="28674" name="Text Box 2"/>
           <p:cNvSpPr txBox="1">
             <a:spLocks noChangeArrowheads="1"/>
           </p:cNvSpPr>
@@ -14849,963 +14757,6 @@
       </p:grpSpPr>
       <p:sp>
         <p:nvSpPr>
-          <p:cNvPr id="13313" name="Text Box 1"/>
-          <p:cNvSpPr txBox="1">
-            <a:spLocks noChangeArrowheads="1"/>
-          </p:cNvSpPr>
-          <p:nvPr/>
-        </p:nvSpPr>
-        <p:spPr bwMode="auto">
-          <a:xfrm>
-            <a:off x="1411288" y="303213"/>
-            <a:ext cx="8166100" cy="1258887"/>
-          </a:xfrm>
-          <a:prstGeom prst="rect">
-            <a:avLst/>
-          </a:prstGeom>
-          <a:noFill/>
-          <a:ln>
-            <a:noFill/>
-          </a:ln>
-          <a:effectLst/>
-          <a:extLst>
-            <a:ext uri="{909E8E84-426E-40dd-AFC4-6F175D3DCCD1}">
-              <a14:hiddenFill xmlns="" xmlns:a14="http://schemas.microsoft.com/office/drawing/2010/main">
-                <a:solidFill>
-                  <a:srgbClr val="FFFFFF"/>
-                </a:solidFill>
-              </a14:hiddenFill>
-            </a:ext>
-            <a:ext uri="{91240B29-F687-4f45-9708-019B960494DF}">
-              <a14:hiddenLine xmlns="" xmlns:a14="http://schemas.microsoft.com/office/drawing/2010/main" w="9525" cap="flat">
-                <a:solidFill>
-                  <a:srgbClr val="3465A4"/>
-                </a:solidFill>
-                <a:round/>
-                <a:headEnd/>
-                <a:tailEnd/>
-              </a14:hiddenLine>
-            </a:ext>
-            <a:ext uri="{AF507438-7753-43e0-B8FC-AC1667EBCBE1}">
-              <a14:hiddenEffects xmlns="" xmlns:a14="http://schemas.microsoft.com/office/drawing/2010/main">
-                <a:effectLst>
-                  <a:outerShdw blurRad="63500" dist="38099" dir="2700000" algn="ctr" rotWithShape="0">
-                    <a:srgbClr val="000000">
-                      <a:alpha val="74998"/>
-                    </a:srgbClr>
-                  </a:outerShdw>
-                </a:effectLst>
-              </a14:hiddenEffects>
-            </a:ext>
-          </a:extLst>
-        </p:spPr>
-        <p:txBody>
-          <a:bodyPr lIns="100800" tIns="50400" rIns="100800" bIns="50400" anchor="ctr"/>
-          <a:lstStyle>
-            <a:lvl1pPr>
-              <a:tabLst>
-                <a:tab pos="0" algn="l"/>
-                <a:tab pos="457200" algn="l"/>
-                <a:tab pos="914400" algn="l"/>
-                <a:tab pos="1371600" algn="l"/>
-                <a:tab pos="1828800" algn="l"/>
-                <a:tab pos="2286000" algn="l"/>
-                <a:tab pos="2743200" algn="l"/>
-                <a:tab pos="3200400" algn="l"/>
-                <a:tab pos="3657600" algn="l"/>
-                <a:tab pos="4114800" algn="l"/>
-                <a:tab pos="4572000" algn="l"/>
-                <a:tab pos="5029200" algn="l"/>
-                <a:tab pos="5486400" algn="l"/>
-                <a:tab pos="5943600" algn="l"/>
-                <a:tab pos="6400800" algn="l"/>
-                <a:tab pos="6858000" algn="l"/>
-                <a:tab pos="7315200" algn="l"/>
-                <a:tab pos="7772400" algn="l"/>
-                <a:tab pos="8229600" algn="l"/>
-                <a:tab pos="8686800" algn="l"/>
-                <a:tab pos="9144000" algn="l"/>
-              </a:tabLst>
-              <a:defRPr>
-                <a:solidFill>
-                  <a:srgbClr val="000000"/>
-                </a:solidFill>
-                <a:latin typeface="Arial" charset="0"/>
-                <a:ea typeface="ＭＳ Ｐゴシック" charset="0"/>
-                <a:cs typeface="ＭＳ Ｐゴシック" charset="0"/>
-              </a:defRPr>
-            </a:lvl1pPr>
-            <a:lvl2pPr>
-              <a:tabLst>
-                <a:tab pos="0" algn="l"/>
-                <a:tab pos="457200" algn="l"/>
-                <a:tab pos="914400" algn="l"/>
-                <a:tab pos="1371600" algn="l"/>
-                <a:tab pos="1828800" algn="l"/>
-                <a:tab pos="2286000" algn="l"/>
-                <a:tab pos="2743200" algn="l"/>
-                <a:tab pos="3200400" algn="l"/>
-                <a:tab pos="3657600" algn="l"/>
-                <a:tab pos="4114800" algn="l"/>
-                <a:tab pos="4572000" algn="l"/>
-                <a:tab pos="5029200" algn="l"/>
-                <a:tab pos="5486400" algn="l"/>
-                <a:tab pos="5943600" algn="l"/>
-                <a:tab pos="6400800" algn="l"/>
-                <a:tab pos="6858000" algn="l"/>
-                <a:tab pos="7315200" algn="l"/>
-                <a:tab pos="7772400" algn="l"/>
-                <a:tab pos="8229600" algn="l"/>
-                <a:tab pos="8686800" algn="l"/>
-                <a:tab pos="9144000" algn="l"/>
-              </a:tabLst>
-              <a:defRPr>
-                <a:solidFill>
-                  <a:srgbClr val="000000"/>
-                </a:solidFill>
-                <a:latin typeface="Arial" charset="0"/>
-                <a:ea typeface="ＭＳ Ｐゴシック" charset="0"/>
-                <a:cs typeface="ＭＳ Ｐゴシック" charset="0"/>
-              </a:defRPr>
-            </a:lvl2pPr>
-            <a:lvl3pPr>
-              <a:tabLst>
-                <a:tab pos="0" algn="l"/>
-                <a:tab pos="457200" algn="l"/>
-                <a:tab pos="914400" algn="l"/>
-                <a:tab pos="1371600" algn="l"/>
-                <a:tab pos="1828800" algn="l"/>
-                <a:tab pos="2286000" algn="l"/>
-                <a:tab pos="2743200" algn="l"/>
-                <a:tab pos="3200400" algn="l"/>
-                <a:tab pos="3657600" algn="l"/>
-                <a:tab pos="4114800" algn="l"/>
-                <a:tab pos="4572000" algn="l"/>
-                <a:tab pos="5029200" algn="l"/>
-                <a:tab pos="5486400" algn="l"/>
-                <a:tab pos="5943600" algn="l"/>
-                <a:tab pos="6400800" algn="l"/>
-                <a:tab pos="6858000" algn="l"/>
-                <a:tab pos="7315200" algn="l"/>
-                <a:tab pos="7772400" algn="l"/>
-                <a:tab pos="8229600" algn="l"/>
-                <a:tab pos="8686800" algn="l"/>
-                <a:tab pos="9144000" algn="l"/>
-              </a:tabLst>
-              <a:defRPr>
-                <a:solidFill>
-                  <a:srgbClr val="000000"/>
-                </a:solidFill>
-                <a:latin typeface="Arial" charset="0"/>
-                <a:ea typeface="ＭＳ Ｐゴシック" charset="0"/>
-                <a:cs typeface="ＭＳ Ｐゴシック" charset="0"/>
-              </a:defRPr>
-            </a:lvl3pPr>
-            <a:lvl4pPr>
-              <a:tabLst>
-                <a:tab pos="0" algn="l"/>
-                <a:tab pos="457200" algn="l"/>
-                <a:tab pos="914400" algn="l"/>
-                <a:tab pos="1371600" algn="l"/>
-                <a:tab pos="1828800" algn="l"/>
-                <a:tab pos="2286000" algn="l"/>
-                <a:tab pos="2743200" algn="l"/>
-                <a:tab pos="3200400" algn="l"/>
-                <a:tab pos="3657600" algn="l"/>
-                <a:tab pos="4114800" algn="l"/>
-                <a:tab pos="4572000" algn="l"/>
-                <a:tab pos="5029200" algn="l"/>
-                <a:tab pos="5486400" algn="l"/>
-                <a:tab pos="5943600" algn="l"/>
-                <a:tab pos="6400800" algn="l"/>
-                <a:tab pos="6858000" algn="l"/>
-                <a:tab pos="7315200" algn="l"/>
-                <a:tab pos="7772400" algn="l"/>
-                <a:tab pos="8229600" algn="l"/>
-                <a:tab pos="8686800" algn="l"/>
-                <a:tab pos="9144000" algn="l"/>
-              </a:tabLst>
-              <a:defRPr>
-                <a:solidFill>
-                  <a:srgbClr val="000000"/>
-                </a:solidFill>
-                <a:latin typeface="Arial" charset="0"/>
-                <a:ea typeface="ＭＳ Ｐゴシック" charset="0"/>
-                <a:cs typeface="ＭＳ Ｐゴシック" charset="0"/>
-              </a:defRPr>
-            </a:lvl4pPr>
-            <a:lvl5pPr>
-              <a:tabLst>
-                <a:tab pos="0" algn="l"/>
-                <a:tab pos="457200" algn="l"/>
-                <a:tab pos="914400" algn="l"/>
-                <a:tab pos="1371600" algn="l"/>
-                <a:tab pos="1828800" algn="l"/>
-                <a:tab pos="2286000" algn="l"/>
-                <a:tab pos="2743200" algn="l"/>
-                <a:tab pos="3200400" algn="l"/>
-                <a:tab pos="3657600" algn="l"/>
-                <a:tab pos="4114800" algn="l"/>
-                <a:tab pos="4572000" algn="l"/>
-                <a:tab pos="5029200" algn="l"/>
-                <a:tab pos="5486400" algn="l"/>
-                <a:tab pos="5943600" algn="l"/>
-                <a:tab pos="6400800" algn="l"/>
-                <a:tab pos="6858000" algn="l"/>
-                <a:tab pos="7315200" algn="l"/>
-                <a:tab pos="7772400" algn="l"/>
-                <a:tab pos="8229600" algn="l"/>
-                <a:tab pos="8686800" algn="l"/>
-                <a:tab pos="9144000" algn="l"/>
-              </a:tabLst>
-              <a:defRPr>
-                <a:solidFill>
-                  <a:srgbClr val="000000"/>
-                </a:solidFill>
-                <a:latin typeface="Arial" charset="0"/>
-                <a:ea typeface="ＭＳ Ｐゴシック" charset="0"/>
-                <a:cs typeface="ＭＳ Ｐゴシック" charset="0"/>
-              </a:defRPr>
-            </a:lvl5pPr>
-            <a:lvl6pPr marL="2514600" indent="-228600" fontAlgn="base" hangingPunct="0">
-              <a:lnSpc>
-                <a:spcPct val="93000"/>
-              </a:lnSpc>
-              <a:spcBef>
-                <a:spcPct val="0"/>
-              </a:spcBef>
-              <a:spcAft>
-                <a:spcPct val="0"/>
-              </a:spcAft>
-              <a:buClr>
-                <a:srgbClr val="000000"/>
-              </a:buClr>
-              <a:buSzPct val="100000"/>
-              <a:buFont typeface="Times New Roman" charset="0"/>
-              <a:tabLst>
-                <a:tab pos="0" algn="l"/>
-                <a:tab pos="457200" algn="l"/>
-                <a:tab pos="914400" algn="l"/>
-                <a:tab pos="1371600" algn="l"/>
-                <a:tab pos="1828800" algn="l"/>
-                <a:tab pos="2286000" algn="l"/>
-                <a:tab pos="2743200" algn="l"/>
-                <a:tab pos="3200400" algn="l"/>
-                <a:tab pos="3657600" algn="l"/>
-                <a:tab pos="4114800" algn="l"/>
-                <a:tab pos="4572000" algn="l"/>
-                <a:tab pos="5029200" algn="l"/>
-                <a:tab pos="5486400" algn="l"/>
-                <a:tab pos="5943600" algn="l"/>
-                <a:tab pos="6400800" algn="l"/>
-                <a:tab pos="6858000" algn="l"/>
-                <a:tab pos="7315200" algn="l"/>
-                <a:tab pos="7772400" algn="l"/>
-                <a:tab pos="8229600" algn="l"/>
-                <a:tab pos="8686800" algn="l"/>
-                <a:tab pos="9144000" algn="l"/>
-              </a:tabLst>
-              <a:defRPr>
-                <a:solidFill>
-                  <a:srgbClr val="000000"/>
-                </a:solidFill>
-                <a:latin typeface="Arial" charset="0"/>
-                <a:ea typeface="ＭＳ Ｐゴシック" charset="0"/>
-                <a:cs typeface="ＭＳ Ｐゴシック" charset="0"/>
-              </a:defRPr>
-            </a:lvl6pPr>
-            <a:lvl7pPr marL="2971800" indent="-228600" fontAlgn="base" hangingPunct="0">
-              <a:lnSpc>
-                <a:spcPct val="93000"/>
-              </a:lnSpc>
-              <a:spcBef>
-                <a:spcPct val="0"/>
-              </a:spcBef>
-              <a:spcAft>
-                <a:spcPct val="0"/>
-              </a:spcAft>
-              <a:buClr>
-                <a:srgbClr val="000000"/>
-              </a:buClr>
-              <a:buSzPct val="100000"/>
-              <a:buFont typeface="Times New Roman" charset="0"/>
-              <a:tabLst>
-                <a:tab pos="0" algn="l"/>
-                <a:tab pos="457200" algn="l"/>
-                <a:tab pos="914400" algn="l"/>
-                <a:tab pos="1371600" algn="l"/>
-                <a:tab pos="1828800" algn="l"/>
-                <a:tab pos="2286000" algn="l"/>
-                <a:tab pos="2743200" algn="l"/>
-                <a:tab pos="3200400" algn="l"/>
-                <a:tab pos="3657600" algn="l"/>
-                <a:tab pos="4114800" algn="l"/>
-                <a:tab pos="4572000" algn="l"/>
-                <a:tab pos="5029200" algn="l"/>
-                <a:tab pos="5486400" algn="l"/>
-                <a:tab pos="5943600" algn="l"/>
-                <a:tab pos="6400800" algn="l"/>
-                <a:tab pos="6858000" algn="l"/>
-                <a:tab pos="7315200" algn="l"/>
-                <a:tab pos="7772400" algn="l"/>
-                <a:tab pos="8229600" algn="l"/>
-                <a:tab pos="8686800" algn="l"/>
-                <a:tab pos="9144000" algn="l"/>
-              </a:tabLst>
-              <a:defRPr>
-                <a:solidFill>
-                  <a:srgbClr val="000000"/>
-                </a:solidFill>
-                <a:latin typeface="Arial" charset="0"/>
-                <a:ea typeface="ＭＳ Ｐゴシック" charset="0"/>
-                <a:cs typeface="ＭＳ Ｐゴシック" charset="0"/>
-              </a:defRPr>
-            </a:lvl7pPr>
-            <a:lvl8pPr marL="3429000" indent="-228600" fontAlgn="base" hangingPunct="0">
-              <a:lnSpc>
-                <a:spcPct val="93000"/>
-              </a:lnSpc>
-              <a:spcBef>
-                <a:spcPct val="0"/>
-              </a:spcBef>
-              <a:spcAft>
-                <a:spcPct val="0"/>
-              </a:spcAft>
-              <a:buClr>
-                <a:srgbClr val="000000"/>
-              </a:buClr>
-              <a:buSzPct val="100000"/>
-              <a:buFont typeface="Times New Roman" charset="0"/>
-              <a:tabLst>
-                <a:tab pos="0" algn="l"/>
-                <a:tab pos="457200" algn="l"/>
-                <a:tab pos="914400" algn="l"/>
-                <a:tab pos="1371600" algn="l"/>
-                <a:tab pos="1828800" algn="l"/>
-                <a:tab pos="2286000" algn="l"/>
-                <a:tab pos="2743200" algn="l"/>
-                <a:tab pos="3200400" algn="l"/>
-                <a:tab pos="3657600" algn="l"/>
-                <a:tab pos="4114800" algn="l"/>
-                <a:tab pos="4572000" algn="l"/>
-                <a:tab pos="5029200" algn="l"/>
-                <a:tab pos="5486400" algn="l"/>
-                <a:tab pos="5943600" algn="l"/>
-                <a:tab pos="6400800" algn="l"/>
-                <a:tab pos="6858000" algn="l"/>
-                <a:tab pos="7315200" algn="l"/>
-                <a:tab pos="7772400" algn="l"/>
-                <a:tab pos="8229600" algn="l"/>
-                <a:tab pos="8686800" algn="l"/>
-                <a:tab pos="9144000" algn="l"/>
-              </a:tabLst>
-              <a:defRPr>
-                <a:solidFill>
-                  <a:srgbClr val="000000"/>
-                </a:solidFill>
-                <a:latin typeface="Arial" charset="0"/>
-                <a:ea typeface="ＭＳ Ｐゴシック" charset="0"/>
-                <a:cs typeface="ＭＳ Ｐゴシック" charset="0"/>
-              </a:defRPr>
-            </a:lvl8pPr>
-            <a:lvl9pPr marL="3886200" indent="-228600" fontAlgn="base" hangingPunct="0">
-              <a:lnSpc>
-                <a:spcPct val="93000"/>
-              </a:lnSpc>
-              <a:spcBef>
-                <a:spcPct val="0"/>
-              </a:spcBef>
-              <a:spcAft>
-                <a:spcPct val="0"/>
-              </a:spcAft>
-              <a:buClr>
-                <a:srgbClr val="000000"/>
-              </a:buClr>
-              <a:buSzPct val="100000"/>
-              <a:buFont typeface="Times New Roman" charset="0"/>
-              <a:tabLst>
-                <a:tab pos="0" algn="l"/>
-                <a:tab pos="457200" algn="l"/>
-                <a:tab pos="914400" algn="l"/>
-                <a:tab pos="1371600" algn="l"/>
-                <a:tab pos="1828800" algn="l"/>
-                <a:tab pos="2286000" algn="l"/>
-                <a:tab pos="2743200" algn="l"/>
-                <a:tab pos="3200400" algn="l"/>
-                <a:tab pos="3657600" algn="l"/>
-                <a:tab pos="4114800" algn="l"/>
-                <a:tab pos="4572000" algn="l"/>
-                <a:tab pos="5029200" algn="l"/>
-                <a:tab pos="5486400" algn="l"/>
-                <a:tab pos="5943600" algn="l"/>
-                <a:tab pos="6400800" algn="l"/>
-                <a:tab pos="6858000" algn="l"/>
-                <a:tab pos="7315200" algn="l"/>
-                <a:tab pos="7772400" algn="l"/>
-                <a:tab pos="8229600" algn="l"/>
-                <a:tab pos="8686800" algn="l"/>
-                <a:tab pos="9144000" algn="l"/>
-              </a:tabLst>
-              <a:defRPr>
-                <a:solidFill>
-                  <a:srgbClr val="000000"/>
-                </a:solidFill>
-                <a:latin typeface="Arial" charset="0"/>
-                <a:ea typeface="ＭＳ Ｐゴシック" charset="0"/>
-                <a:cs typeface="ＭＳ Ｐゴシック" charset="0"/>
-              </a:defRPr>
-            </a:lvl9pPr>
-          </a:lstStyle>
-          <a:p>
-            <a:pPr algn="ctr">
-              <a:buClrTx/>
-              <a:buFontTx/>
-              <a:buNone/>
-              <a:defRPr/>
-            </a:pPr>
-            <a:r>
-              <a:rPr lang="en-US" sz="4400" smtClean="0"/>
-              <a:t>Software Carpentry to the Rescue</a:t>
-            </a:r>
-          </a:p>
-        </p:txBody>
-      </p:sp>
-      <p:sp>
-        <p:nvSpPr>
-          <p:cNvPr id="13314" name="Text Box 2"/>
-          <p:cNvSpPr txBox="1">
-            <a:spLocks noChangeArrowheads="1"/>
-          </p:cNvSpPr>
-          <p:nvPr/>
-        </p:nvSpPr>
-        <p:spPr bwMode="auto">
-          <a:xfrm>
-            <a:off x="503238" y="1878013"/>
-            <a:ext cx="9074150" cy="4702175"/>
-          </a:xfrm>
-          <a:prstGeom prst="rect">
-            <a:avLst/>
-          </a:prstGeom>
-          <a:noFill/>
-          <a:ln>
-            <a:noFill/>
-          </a:ln>
-          <a:effectLst/>
-          <a:extLst>
-            <a:ext uri="{909E8E84-426E-40dd-AFC4-6F175D3DCCD1}">
-              <a14:hiddenFill xmlns="" xmlns:a14="http://schemas.microsoft.com/office/drawing/2010/main">
-                <a:solidFill>
-                  <a:srgbClr val="FFFFFF"/>
-                </a:solidFill>
-              </a14:hiddenFill>
-            </a:ext>
-            <a:ext uri="{91240B29-F687-4f45-9708-019B960494DF}">
-              <a14:hiddenLine xmlns="" xmlns:a14="http://schemas.microsoft.com/office/drawing/2010/main" w="9525" cap="flat">
-                <a:solidFill>
-                  <a:srgbClr val="3465A4"/>
-                </a:solidFill>
-                <a:round/>
-                <a:headEnd/>
-                <a:tailEnd/>
-              </a14:hiddenLine>
-            </a:ext>
-            <a:ext uri="{AF507438-7753-43e0-B8FC-AC1667EBCBE1}">
-              <a14:hiddenEffects xmlns="" xmlns:a14="http://schemas.microsoft.com/office/drawing/2010/main">
-                <a:effectLst>
-                  <a:outerShdw blurRad="63500" dist="38099" dir="2700000" algn="ctr" rotWithShape="0">
-                    <a:srgbClr val="000000">
-                      <a:alpha val="74998"/>
-                    </a:srgbClr>
-                  </a:outerShdw>
-                </a:effectLst>
-              </a14:hiddenEffects>
-            </a:ext>
-          </a:extLst>
-        </p:spPr>
-        <p:txBody>
-          <a:bodyPr lIns="100800" tIns="50400" rIns="100800" bIns="50400"/>
-          <a:lstStyle>
-            <a:lvl1pPr marL="568325" indent="-568325">
-              <a:tabLst>
-                <a:tab pos="568325" algn="l"/>
-                <a:tab pos="1025525" algn="l"/>
-                <a:tab pos="1482725" algn="l"/>
-                <a:tab pos="1939925" algn="l"/>
-                <a:tab pos="2397125" algn="l"/>
-                <a:tab pos="2854325" algn="l"/>
-                <a:tab pos="3311525" algn="l"/>
-                <a:tab pos="3768725" algn="l"/>
-                <a:tab pos="4225925" algn="l"/>
-                <a:tab pos="4683125" algn="l"/>
-                <a:tab pos="5140325" algn="l"/>
-                <a:tab pos="5597525" algn="l"/>
-                <a:tab pos="6054725" algn="l"/>
-                <a:tab pos="6511925" algn="l"/>
-                <a:tab pos="6969125" algn="l"/>
-                <a:tab pos="7426325" algn="l"/>
-                <a:tab pos="7883525" algn="l"/>
-                <a:tab pos="8340725" algn="l"/>
-                <a:tab pos="8797925" algn="l"/>
-                <a:tab pos="9255125" algn="l"/>
-                <a:tab pos="9712325" algn="l"/>
-              </a:tabLst>
-              <a:defRPr>
-                <a:solidFill>
-                  <a:srgbClr val="000000"/>
-                </a:solidFill>
-                <a:latin typeface="Arial" charset="0"/>
-                <a:ea typeface="ＭＳ Ｐゴシック" charset="0"/>
-                <a:cs typeface="ＭＳ Ｐゴシック" charset="0"/>
-              </a:defRPr>
-            </a:lvl1pPr>
-            <a:lvl2pPr marL="968375" indent="-568325">
-              <a:tabLst>
-                <a:tab pos="568325" algn="l"/>
-                <a:tab pos="1025525" algn="l"/>
-                <a:tab pos="1482725" algn="l"/>
-                <a:tab pos="1939925" algn="l"/>
-                <a:tab pos="2397125" algn="l"/>
-                <a:tab pos="2854325" algn="l"/>
-                <a:tab pos="3311525" algn="l"/>
-                <a:tab pos="3768725" algn="l"/>
-                <a:tab pos="4225925" algn="l"/>
-                <a:tab pos="4683125" algn="l"/>
-                <a:tab pos="5140325" algn="l"/>
-                <a:tab pos="5597525" algn="l"/>
-                <a:tab pos="6054725" algn="l"/>
-                <a:tab pos="6511925" algn="l"/>
-                <a:tab pos="6969125" algn="l"/>
-                <a:tab pos="7426325" algn="l"/>
-                <a:tab pos="7883525" algn="l"/>
-                <a:tab pos="8340725" algn="l"/>
-                <a:tab pos="8797925" algn="l"/>
-                <a:tab pos="9255125" algn="l"/>
-                <a:tab pos="9712325" algn="l"/>
-              </a:tabLst>
-              <a:defRPr>
-                <a:solidFill>
-                  <a:srgbClr val="000000"/>
-                </a:solidFill>
-                <a:latin typeface="Arial" charset="0"/>
-                <a:ea typeface="ＭＳ Ｐゴシック" charset="0"/>
-                <a:cs typeface="ＭＳ Ｐゴシック" charset="0"/>
-              </a:defRPr>
-            </a:lvl2pPr>
-            <a:lvl3pPr>
-              <a:tabLst>
-                <a:tab pos="568325" algn="l"/>
-                <a:tab pos="1025525" algn="l"/>
-                <a:tab pos="1482725" algn="l"/>
-                <a:tab pos="1939925" algn="l"/>
-                <a:tab pos="2397125" algn="l"/>
-                <a:tab pos="2854325" algn="l"/>
-                <a:tab pos="3311525" algn="l"/>
-                <a:tab pos="3768725" algn="l"/>
-                <a:tab pos="4225925" algn="l"/>
-                <a:tab pos="4683125" algn="l"/>
-                <a:tab pos="5140325" algn="l"/>
-                <a:tab pos="5597525" algn="l"/>
-                <a:tab pos="6054725" algn="l"/>
-                <a:tab pos="6511925" algn="l"/>
-                <a:tab pos="6969125" algn="l"/>
-                <a:tab pos="7426325" algn="l"/>
-                <a:tab pos="7883525" algn="l"/>
-                <a:tab pos="8340725" algn="l"/>
-                <a:tab pos="8797925" algn="l"/>
-                <a:tab pos="9255125" algn="l"/>
-                <a:tab pos="9712325" algn="l"/>
-              </a:tabLst>
-              <a:defRPr>
-                <a:solidFill>
-                  <a:srgbClr val="000000"/>
-                </a:solidFill>
-                <a:latin typeface="Arial" charset="0"/>
-                <a:ea typeface="ＭＳ Ｐゴシック" charset="0"/>
-                <a:cs typeface="ＭＳ Ｐゴシック" charset="0"/>
-              </a:defRPr>
-            </a:lvl3pPr>
-            <a:lvl4pPr>
-              <a:tabLst>
-                <a:tab pos="568325" algn="l"/>
-                <a:tab pos="1025525" algn="l"/>
-                <a:tab pos="1482725" algn="l"/>
-                <a:tab pos="1939925" algn="l"/>
-                <a:tab pos="2397125" algn="l"/>
-                <a:tab pos="2854325" algn="l"/>
-                <a:tab pos="3311525" algn="l"/>
-                <a:tab pos="3768725" algn="l"/>
-                <a:tab pos="4225925" algn="l"/>
-                <a:tab pos="4683125" algn="l"/>
-                <a:tab pos="5140325" algn="l"/>
-                <a:tab pos="5597525" algn="l"/>
-                <a:tab pos="6054725" algn="l"/>
-                <a:tab pos="6511925" algn="l"/>
-                <a:tab pos="6969125" algn="l"/>
-                <a:tab pos="7426325" algn="l"/>
-                <a:tab pos="7883525" algn="l"/>
-                <a:tab pos="8340725" algn="l"/>
-                <a:tab pos="8797925" algn="l"/>
-                <a:tab pos="9255125" algn="l"/>
-                <a:tab pos="9712325" algn="l"/>
-              </a:tabLst>
-              <a:defRPr>
-                <a:solidFill>
-                  <a:srgbClr val="000000"/>
-                </a:solidFill>
-                <a:latin typeface="Arial" charset="0"/>
-                <a:ea typeface="ＭＳ Ｐゴシック" charset="0"/>
-                <a:cs typeface="ＭＳ Ｐゴシック" charset="0"/>
-              </a:defRPr>
-            </a:lvl4pPr>
-            <a:lvl5pPr>
-              <a:tabLst>
-                <a:tab pos="568325" algn="l"/>
-                <a:tab pos="1025525" algn="l"/>
-                <a:tab pos="1482725" algn="l"/>
-                <a:tab pos="1939925" algn="l"/>
-                <a:tab pos="2397125" algn="l"/>
-                <a:tab pos="2854325" algn="l"/>
-                <a:tab pos="3311525" algn="l"/>
-                <a:tab pos="3768725" algn="l"/>
-                <a:tab pos="4225925" algn="l"/>
-                <a:tab pos="4683125" algn="l"/>
-                <a:tab pos="5140325" algn="l"/>
-                <a:tab pos="5597525" algn="l"/>
-                <a:tab pos="6054725" algn="l"/>
-                <a:tab pos="6511925" algn="l"/>
-                <a:tab pos="6969125" algn="l"/>
-                <a:tab pos="7426325" algn="l"/>
-                <a:tab pos="7883525" algn="l"/>
-                <a:tab pos="8340725" algn="l"/>
-                <a:tab pos="8797925" algn="l"/>
-                <a:tab pos="9255125" algn="l"/>
-                <a:tab pos="9712325" algn="l"/>
-              </a:tabLst>
-              <a:defRPr>
-                <a:solidFill>
-                  <a:srgbClr val="000000"/>
-                </a:solidFill>
-                <a:latin typeface="Arial" charset="0"/>
-                <a:ea typeface="ＭＳ Ｐゴシック" charset="0"/>
-                <a:cs typeface="ＭＳ Ｐゴシック" charset="0"/>
-              </a:defRPr>
-            </a:lvl5pPr>
-            <a:lvl6pPr marL="2514600" indent="-228600" fontAlgn="base" hangingPunct="0">
-              <a:lnSpc>
-                <a:spcPct val="93000"/>
-              </a:lnSpc>
-              <a:spcBef>
-                <a:spcPct val="0"/>
-              </a:spcBef>
-              <a:spcAft>
-                <a:spcPct val="0"/>
-              </a:spcAft>
-              <a:buClr>
-                <a:srgbClr val="000000"/>
-              </a:buClr>
-              <a:buSzPct val="100000"/>
-              <a:buFont typeface="Times New Roman" charset="0"/>
-              <a:tabLst>
-                <a:tab pos="568325" algn="l"/>
-                <a:tab pos="1025525" algn="l"/>
-                <a:tab pos="1482725" algn="l"/>
-                <a:tab pos="1939925" algn="l"/>
-                <a:tab pos="2397125" algn="l"/>
-                <a:tab pos="2854325" algn="l"/>
-                <a:tab pos="3311525" algn="l"/>
-                <a:tab pos="3768725" algn="l"/>
-                <a:tab pos="4225925" algn="l"/>
-                <a:tab pos="4683125" algn="l"/>
-                <a:tab pos="5140325" algn="l"/>
-                <a:tab pos="5597525" algn="l"/>
-                <a:tab pos="6054725" algn="l"/>
-                <a:tab pos="6511925" algn="l"/>
-                <a:tab pos="6969125" algn="l"/>
-                <a:tab pos="7426325" algn="l"/>
-                <a:tab pos="7883525" algn="l"/>
-                <a:tab pos="8340725" algn="l"/>
-                <a:tab pos="8797925" algn="l"/>
-                <a:tab pos="9255125" algn="l"/>
-                <a:tab pos="9712325" algn="l"/>
-              </a:tabLst>
-              <a:defRPr>
-                <a:solidFill>
-                  <a:srgbClr val="000000"/>
-                </a:solidFill>
-                <a:latin typeface="Arial" charset="0"/>
-                <a:ea typeface="ＭＳ Ｐゴシック" charset="0"/>
-                <a:cs typeface="ＭＳ Ｐゴシック" charset="0"/>
-              </a:defRPr>
-            </a:lvl6pPr>
-            <a:lvl7pPr marL="2971800" indent="-228600" fontAlgn="base" hangingPunct="0">
-              <a:lnSpc>
-                <a:spcPct val="93000"/>
-              </a:lnSpc>
-              <a:spcBef>
-                <a:spcPct val="0"/>
-              </a:spcBef>
-              <a:spcAft>
-                <a:spcPct val="0"/>
-              </a:spcAft>
-              <a:buClr>
-                <a:srgbClr val="000000"/>
-              </a:buClr>
-              <a:buSzPct val="100000"/>
-              <a:buFont typeface="Times New Roman" charset="0"/>
-              <a:tabLst>
-                <a:tab pos="568325" algn="l"/>
-                <a:tab pos="1025525" algn="l"/>
-                <a:tab pos="1482725" algn="l"/>
-                <a:tab pos="1939925" algn="l"/>
-                <a:tab pos="2397125" algn="l"/>
-                <a:tab pos="2854325" algn="l"/>
-                <a:tab pos="3311525" algn="l"/>
-                <a:tab pos="3768725" algn="l"/>
-                <a:tab pos="4225925" algn="l"/>
-                <a:tab pos="4683125" algn="l"/>
-                <a:tab pos="5140325" algn="l"/>
-                <a:tab pos="5597525" algn="l"/>
-                <a:tab pos="6054725" algn="l"/>
-                <a:tab pos="6511925" algn="l"/>
-                <a:tab pos="6969125" algn="l"/>
-                <a:tab pos="7426325" algn="l"/>
-                <a:tab pos="7883525" algn="l"/>
-                <a:tab pos="8340725" algn="l"/>
-                <a:tab pos="8797925" algn="l"/>
-                <a:tab pos="9255125" algn="l"/>
-                <a:tab pos="9712325" algn="l"/>
-              </a:tabLst>
-              <a:defRPr>
-                <a:solidFill>
-                  <a:srgbClr val="000000"/>
-                </a:solidFill>
-                <a:latin typeface="Arial" charset="0"/>
-                <a:ea typeface="ＭＳ Ｐゴシック" charset="0"/>
-                <a:cs typeface="ＭＳ Ｐゴシック" charset="0"/>
-              </a:defRPr>
-            </a:lvl7pPr>
-            <a:lvl8pPr marL="3429000" indent="-228600" fontAlgn="base" hangingPunct="0">
-              <a:lnSpc>
-                <a:spcPct val="93000"/>
-              </a:lnSpc>
-              <a:spcBef>
-                <a:spcPct val="0"/>
-              </a:spcBef>
-              <a:spcAft>
-                <a:spcPct val="0"/>
-              </a:spcAft>
-              <a:buClr>
-                <a:srgbClr val="000000"/>
-              </a:buClr>
-              <a:buSzPct val="100000"/>
-              <a:buFont typeface="Times New Roman" charset="0"/>
-              <a:tabLst>
-                <a:tab pos="568325" algn="l"/>
-                <a:tab pos="1025525" algn="l"/>
-                <a:tab pos="1482725" algn="l"/>
-                <a:tab pos="1939925" algn="l"/>
-                <a:tab pos="2397125" algn="l"/>
-                <a:tab pos="2854325" algn="l"/>
-                <a:tab pos="3311525" algn="l"/>
-                <a:tab pos="3768725" algn="l"/>
-                <a:tab pos="4225925" algn="l"/>
-                <a:tab pos="4683125" algn="l"/>
-                <a:tab pos="5140325" algn="l"/>
-                <a:tab pos="5597525" algn="l"/>
-                <a:tab pos="6054725" algn="l"/>
-                <a:tab pos="6511925" algn="l"/>
-                <a:tab pos="6969125" algn="l"/>
-                <a:tab pos="7426325" algn="l"/>
-                <a:tab pos="7883525" algn="l"/>
-                <a:tab pos="8340725" algn="l"/>
-                <a:tab pos="8797925" algn="l"/>
-                <a:tab pos="9255125" algn="l"/>
-                <a:tab pos="9712325" algn="l"/>
-              </a:tabLst>
-              <a:defRPr>
-                <a:solidFill>
-                  <a:srgbClr val="000000"/>
-                </a:solidFill>
-                <a:latin typeface="Arial" charset="0"/>
-                <a:ea typeface="ＭＳ Ｐゴシック" charset="0"/>
-                <a:cs typeface="ＭＳ Ｐゴシック" charset="0"/>
-              </a:defRPr>
-            </a:lvl8pPr>
-            <a:lvl9pPr marL="3886200" indent="-228600" fontAlgn="base" hangingPunct="0">
-              <a:lnSpc>
-                <a:spcPct val="93000"/>
-              </a:lnSpc>
-              <a:spcBef>
-                <a:spcPct val="0"/>
-              </a:spcBef>
-              <a:spcAft>
-                <a:spcPct val="0"/>
-              </a:spcAft>
-              <a:buClr>
-                <a:srgbClr val="000000"/>
-              </a:buClr>
-              <a:buSzPct val="100000"/>
-              <a:buFont typeface="Times New Roman" charset="0"/>
-              <a:tabLst>
-                <a:tab pos="568325" algn="l"/>
-                <a:tab pos="1025525" algn="l"/>
-                <a:tab pos="1482725" algn="l"/>
-                <a:tab pos="1939925" algn="l"/>
-                <a:tab pos="2397125" algn="l"/>
-                <a:tab pos="2854325" algn="l"/>
-                <a:tab pos="3311525" algn="l"/>
-                <a:tab pos="3768725" algn="l"/>
-                <a:tab pos="4225925" algn="l"/>
-                <a:tab pos="4683125" algn="l"/>
-                <a:tab pos="5140325" algn="l"/>
-                <a:tab pos="5597525" algn="l"/>
-                <a:tab pos="6054725" algn="l"/>
-                <a:tab pos="6511925" algn="l"/>
-                <a:tab pos="6969125" algn="l"/>
-                <a:tab pos="7426325" algn="l"/>
-                <a:tab pos="7883525" algn="l"/>
-                <a:tab pos="8340725" algn="l"/>
-                <a:tab pos="8797925" algn="l"/>
-                <a:tab pos="9255125" algn="l"/>
-                <a:tab pos="9712325" algn="l"/>
-              </a:tabLst>
-              <a:defRPr>
-                <a:solidFill>
-                  <a:srgbClr val="000000"/>
-                </a:solidFill>
-                <a:latin typeface="Arial" charset="0"/>
-                <a:ea typeface="ＭＳ Ｐゴシック" charset="0"/>
-                <a:cs typeface="ＭＳ Ｐゴシック" charset="0"/>
-              </a:defRPr>
-            </a:lvl9pPr>
-          </a:lstStyle>
-          <a:p>
-            <a:pPr>
-              <a:spcAft>
-                <a:spcPts val="1425"/>
-              </a:spcAft>
-              <a:buFont typeface="Arial" charset="0"/>
-              <a:buChar char="•"/>
-              <a:defRPr/>
-            </a:pPr>
-            <a:r>
-              <a:rPr lang="en-US" sz="4000" smtClean="0">
-                <a:cs typeface="Arial Unicode MS" charset="0"/>
-              </a:rPr>
-              <a:t>Best practices used by the best software engineers whose business is development of quality software</a:t>
-            </a:r>
-          </a:p>
-          <a:p>
-            <a:pPr lvl="1">
-              <a:spcAft>
-                <a:spcPts val="1138"/>
-              </a:spcAft>
-              <a:buFont typeface="Arial" charset="0"/>
-              <a:buChar char="•"/>
-              <a:defRPr/>
-            </a:pPr>
-            <a:r>
-              <a:rPr lang="en-US" sz="3600" smtClean="0"/>
-              <a:t>They don’t always have formal training</a:t>
-            </a:r>
-          </a:p>
-          <a:p>
-            <a:pPr lvl="1">
-              <a:spcAft>
-                <a:spcPts val="1138"/>
-              </a:spcAft>
-              <a:buFont typeface="Arial" charset="0"/>
-              <a:buChar char="•"/>
-              <a:defRPr/>
-            </a:pPr>
-            <a:r>
-              <a:rPr lang="en-US" sz="3600" smtClean="0"/>
-              <a:t>They don’t always follow all the practices</a:t>
-            </a:r>
-          </a:p>
-          <a:p>
-            <a:pPr lvl="1">
-              <a:spcAft>
-                <a:spcPts val="1138"/>
-              </a:spcAft>
-              <a:buFont typeface="Arial" charset="0"/>
-              <a:buChar char="•"/>
-              <a:defRPr/>
-            </a:pPr>
-            <a:r>
-              <a:rPr lang="en-US" sz="3600" smtClean="0"/>
-              <a:t>Growing evidence supported by empirical studies</a:t>
-            </a:r>
-          </a:p>
-          <a:p>
-            <a:pPr marL="969963" lvl="1">
-              <a:spcAft>
-                <a:spcPts val="1138"/>
-              </a:spcAft>
-              <a:buClrTx/>
-              <a:buFontTx/>
-              <a:buNone/>
-              <a:defRPr/>
-            </a:pPr>
-            <a:endParaRPr lang="en-US" sz="3600" smtClean="0"/>
-          </a:p>
-        </p:txBody>
-      </p:sp>
-    </p:spTree>
-  </p:cSld>
-  <p:clrMapOvr>
-    <a:masterClrMapping/>
-  </p:clrMapOvr>
-  <p:transition spd="med"/>
-  <p:timing>
-    <p:tnLst>
-      <p:par>
-        <p:cTn id="1" dur="indefinite" restart="never" nodeType="tmRoot">
-          <p:childTnLst>
-            <p:seq concurrent="1" nextAc="seek">
-              <p:cTn id="2" dur="indefinite" nodeType="mainSeq"/>
-              <p:prevCondLst>
-                <p:cond evt="onPrev" delay="0">
-                  <p:tgtEl>
-                    <p:sldTgt/>
-                  </p:tgtEl>
-                </p:cond>
-              </p:prevCondLst>
-              <p:nextCondLst>
-                <p:cond evt="onNext" delay="0">
-                  <p:tgtEl>
-                    <p:sldTgt/>
-                  </p:tgtEl>
-                </p:cond>
-              </p:nextCondLst>
-            </p:seq>
-          </p:childTnLst>
-        </p:cTn>
-      </p:par>
-    </p:tnLst>
-  </p:timing>
-</p:sld>
-</file>
-
-<file path=ppt/slides/slide11.xml><?xml version="1.0" encoding="utf-8"?>
-<p:sld xmlns:a="http://schemas.openxmlformats.org/drawingml/2006/main" xmlns:r="http://schemas.openxmlformats.org/officeDocument/2006/relationships" xmlns:p="http://schemas.openxmlformats.org/presentationml/2006/main">
-  <p:cSld>
-    <p:spTree>
-      <p:nvGrpSpPr>
-        <p:cNvPr id="1" name=""/>
-        <p:cNvGrpSpPr/>
-        <p:nvPr/>
-      </p:nvGrpSpPr>
-      <p:grpSpPr>
-        <a:xfrm>
-          <a:off x="0" y="0"/>
-          <a:ext cx="0" cy="0"/>
-          <a:chOff x="0" y="0"/>
-          <a:chExt cx="0" cy="0"/>
-        </a:xfrm>
-      </p:grpSpPr>
-      <p:sp>
-        <p:nvSpPr>
           <p:cNvPr id="34817" name="Title 1"/>
           <p:cNvSpPr>
             <a:spLocks noGrp="1"/>
@@ -16214,7 +15165,7 @@
 </p:sld>
 </file>
 
-<file path=ppt/slides/slide12.xml><?xml version="1.0" encoding="utf-8"?>
+<file path=ppt/slides/slide11.xml><?xml version="1.0" encoding="utf-8"?>
 <p:sld xmlns:a="http://schemas.openxmlformats.org/drawingml/2006/main" xmlns:r="http://schemas.openxmlformats.org/officeDocument/2006/relationships" xmlns:p="http://schemas.openxmlformats.org/presentationml/2006/main">
   <p:cSld>
     <p:spTree>
@@ -16687,7 +15638,7 @@
 </p:sld>
 </file>
 
-<file path=ppt/slides/slide13.xml><?xml version="1.0" encoding="utf-8"?>
+<file path=ppt/slides/slide12.xml><?xml version="1.0" encoding="utf-8"?>
 <p:sld xmlns:a="http://schemas.openxmlformats.org/drawingml/2006/main" xmlns:r="http://schemas.openxmlformats.org/officeDocument/2006/relationships" xmlns:p="http://schemas.openxmlformats.org/presentationml/2006/main">
   <p:cSld>
     <p:bg>
@@ -18273,7 +17224,7 @@
 </p:sld>
 </file>
 
-<file path=ppt/slides/slide14.xml><?xml version="1.0" encoding="utf-8"?>
+<file path=ppt/slides/slide13.xml><?xml version="1.0" encoding="utf-8"?>
 <p:sld xmlns:a="http://schemas.openxmlformats.org/drawingml/2006/main" xmlns:r="http://schemas.openxmlformats.org/officeDocument/2006/relationships" xmlns:p="http://schemas.openxmlformats.org/presentationml/2006/main">
   <p:cSld>
     <p:bg>
@@ -18877,7 +17828,7 @@
 </p:sld>
 </file>
 
-<file path=ppt/slides/slide15.xml><?xml version="1.0" encoding="utf-8"?>
+<file path=ppt/slides/slide14.xml><?xml version="1.0" encoding="utf-8"?>
 <p:sld xmlns:a="http://schemas.openxmlformats.org/drawingml/2006/main" xmlns:r="http://schemas.openxmlformats.org/officeDocument/2006/relationships" xmlns:p="http://schemas.openxmlformats.org/presentationml/2006/main">
   <p:cSld>
     <p:spTree>
@@ -19029,7 +17980,7 @@
 </p:sld>
 </file>
 
-<file path=ppt/slides/slide16.xml><?xml version="1.0" encoding="utf-8"?>
+<file path=ppt/slides/slide15.xml><?xml version="1.0" encoding="utf-8"?>
 <p:sld xmlns:a="http://schemas.openxmlformats.org/drawingml/2006/main" xmlns:r="http://schemas.openxmlformats.org/officeDocument/2006/relationships" xmlns:p="http://schemas.openxmlformats.org/presentationml/2006/main">
   <p:cSld>
     <p:bg>
@@ -20006,7 +18957,7 @@
 </p:sld>
 </file>
 
-<file path=ppt/slides/slide17.xml><?xml version="1.0" encoding="utf-8"?>
+<file path=ppt/slides/slide16.xml><?xml version="1.0" encoding="utf-8"?>
 <p:sld xmlns:a="http://schemas.openxmlformats.org/drawingml/2006/main" xmlns:r="http://schemas.openxmlformats.org/officeDocument/2006/relationships" xmlns:p="http://schemas.openxmlformats.org/presentationml/2006/main">
   <p:cSld>
     <p:bg>
@@ -20970,7 +19921,7 @@
 </p:sld>
 </file>
 
-<file path=ppt/slides/slide18.xml><?xml version="1.0" encoding="utf-8"?>
+<file path=ppt/slides/slide17.xml><?xml version="1.0" encoding="utf-8"?>
 <p:sld xmlns:a="http://schemas.openxmlformats.org/drawingml/2006/main" xmlns:r="http://schemas.openxmlformats.org/officeDocument/2006/relationships" xmlns:p="http://schemas.openxmlformats.org/presentationml/2006/main">
   <p:cSld>
     <p:spTree>
@@ -21657,7 +20608,7 @@
 </p:sld>
 </file>
 
-<file path=ppt/slides/slide19.xml><?xml version="1.0" encoding="utf-8"?>
+<file path=ppt/slides/slide18.xml><?xml version="1.0" encoding="utf-8"?>
 <p:sld xmlns:a="http://schemas.openxmlformats.org/drawingml/2006/main" xmlns:r="http://schemas.openxmlformats.org/officeDocument/2006/relationships" xmlns:p="http://schemas.openxmlformats.org/presentationml/2006/main">
   <p:cSld>
     <p:spTree>
@@ -22296,681 +21247,7 @@
 </p:sld>
 </file>
 
-<file path=ppt/slides/slide2.xml><?xml version="1.0" encoding="utf-8"?>
-<p:sld xmlns:a="http://schemas.openxmlformats.org/drawingml/2006/main" xmlns:r="http://schemas.openxmlformats.org/officeDocument/2006/relationships" xmlns:p="http://schemas.openxmlformats.org/presentationml/2006/main" show="0">
-  <p:cSld>
-    <p:spTree>
-      <p:nvGrpSpPr>
-        <p:cNvPr id="1" name=""/>
-        <p:cNvGrpSpPr/>
-        <p:nvPr/>
-      </p:nvGrpSpPr>
-      <p:grpSpPr>
-        <a:xfrm>
-          <a:off x="0" y="0"/>
-          <a:ext cx="0" cy="0"/>
-          <a:chOff x="0" y="0"/>
-          <a:chExt cx="0" cy="0"/>
-        </a:xfrm>
-      </p:grpSpPr>
-      <p:sp>
-        <p:nvSpPr>
-          <p:cNvPr id="47105" name="Rectangle 1"/>
-          <p:cNvSpPr>
-            <a:spLocks noChangeArrowheads="1"/>
-          </p:cNvSpPr>
-          <p:nvPr/>
-        </p:nvSpPr>
-        <p:spPr bwMode="auto">
-          <a:xfrm>
-            <a:off x="392112" y="1722437"/>
-            <a:ext cx="9574352" cy="3527248"/>
-          </a:xfrm>
-          <a:prstGeom prst="rect">
-            <a:avLst/>
-          </a:prstGeom>
-          <a:noFill/>
-          <a:ln>
-            <a:noFill/>
-          </a:ln>
-          <a:extLst>
-            <a:ext uri="{909E8E84-426E-40dd-AFC4-6F175D3DCCD1}">
-              <a14:hiddenFill xmlns="" xmlns:a14="http://schemas.microsoft.com/office/drawing/2010/main">
-                <a:solidFill>
-                  <a:srgbClr val="FFFFFF"/>
-                </a:solidFill>
-              </a14:hiddenFill>
-            </a:ext>
-            <a:ext uri="{91240B29-F687-4f45-9708-019B960494DF}">
-              <a14:hiddenLine xmlns="" xmlns:a14="http://schemas.microsoft.com/office/drawing/2010/main" w="9525">
-                <a:solidFill>
-                  <a:srgbClr val="000000"/>
-                </a:solidFill>
-                <a:miter lim="800000"/>
-                <a:headEnd/>
-                <a:tailEnd/>
-              </a14:hiddenLine>
-            </a:ext>
-          </a:extLst>
-        </p:spPr>
-        <p:txBody>
-          <a:bodyPr wrap="none">
-            <a:spAutoFit/>
-          </a:bodyPr>
-          <a:lstStyle/>
-          <a:p>
-            <a:r>
-              <a:rPr lang="en-US" sz="2400" dirty="0" smtClean="0">
-                <a:solidFill>
-                  <a:srgbClr val="000000"/>
-                </a:solidFill>
-              </a:rPr>
-              <a:t>Open </a:t>
-            </a:r>
-            <a:r>
-              <a:rPr lang="en-US" sz="2400" dirty="0" err="1" smtClean="0">
-                <a:solidFill>
-                  <a:srgbClr val="000000"/>
-                </a:solidFill>
-              </a:rPr>
-              <a:t>GitBash</a:t>
-            </a:r>
-            <a:r>
-              <a:rPr lang="en-US" sz="2400" dirty="0" smtClean="0">
-                <a:solidFill>
-                  <a:srgbClr val="000000"/>
-                </a:solidFill>
-              </a:rPr>
-              <a:t> (Windows), and type the following:</a:t>
-            </a:r>
-          </a:p>
-          <a:p>
-            <a:endParaRPr lang="en-US" sz="2400" dirty="0">
-              <a:solidFill>
-                <a:srgbClr val="000000"/>
-              </a:solidFill>
-            </a:endParaRPr>
-          </a:p>
-          <a:p>
-            <a:r>
-              <a:rPr lang="en-US" sz="2400" b="1" dirty="0" smtClean="0">
-                <a:solidFill>
-                  <a:srgbClr val="000000"/>
-                </a:solidFill>
-                <a:latin typeface="Consolas"/>
-                <a:cs typeface="Consolas"/>
-              </a:rPr>
-              <a:t>python –-version</a:t>
-            </a:r>
-          </a:p>
-          <a:p>
-            <a:r>
-              <a:rPr lang="en-US" sz="2400" dirty="0" smtClean="0">
-                <a:solidFill>
-                  <a:srgbClr val="000000"/>
-                </a:solidFill>
-              </a:rPr>
-              <a:t>Raise your hand if you DON’T have version </a:t>
-            </a:r>
-            <a:r>
-              <a:rPr lang="en-US" sz="2400" b="1" u="sng" dirty="0" smtClean="0">
-                <a:solidFill>
-                  <a:srgbClr val="000000"/>
-                </a:solidFill>
-              </a:rPr>
-              <a:t>3.5.x</a:t>
-            </a:r>
-            <a:r>
-              <a:rPr lang="en-US" sz="2400" dirty="0" smtClean="0">
-                <a:solidFill>
-                  <a:srgbClr val="000000"/>
-                </a:solidFill>
-              </a:rPr>
-              <a:t> (where x can vary).</a:t>
-            </a:r>
-          </a:p>
-          <a:p>
-            <a:endParaRPr lang="en-US" sz="2400" b="1" dirty="0" smtClean="0">
-              <a:solidFill>
-                <a:srgbClr val="000000"/>
-              </a:solidFill>
-            </a:endParaRPr>
-          </a:p>
-          <a:p>
-            <a:r>
-              <a:rPr lang="en-US" sz="2400" b="1" dirty="0">
-                <a:solidFill>
-                  <a:srgbClr val="000000"/>
-                </a:solidFill>
-                <a:latin typeface="Consolas"/>
-                <a:cs typeface="Consolas"/>
-              </a:rPr>
-              <a:t>p</a:t>
-            </a:r>
-            <a:r>
-              <a:rPr lang="en-US" sz="2400" b="1" dirty="0" smtClean="0">
-                <a:solidFill>
-                  <a:srgbClr val="000000"/>
-                </a:solidFill>
-                <a:latin typeface="Consolas"/>
-                <a:cs typeface="Consolas"/>
-              </a:rPr>
-              <a:t>ython –c “import pandas”</a:t>
-            </a:r>
-          </a:p>
-          <a:p>
-            <a:r>
-              <a:rPr lang="en-US" sz="2400" dirty="0" smtClean="0">
-                <a:solidFill>
-                  <a:srgbClr val="000000"/>
-                </a:solidFill>
-              </a:rPr>
-              <a:t>Raise your hand if you get an error.</a:t>
-            </a:r>
-          </a:p>
-          <a:p>
-            <a:endParaRPr lang="en-US" sz="2400" b="1" dirty="0">
-              <a:solidFill>
-                <a:srgbClr val="000000"/>
-              </a:solidFill>
-            </a:endParaRPr>
-          </a:p>
-          <a:p>
-            <a:r>
-              <a:rPr lang="en-US" sz="2400" b="1" dirty="0" err="1">
-                <a:solidFill>
-                  <a:srgbClr val="000000"/>
-                </a:solidFill>
-                <a:latin typeface="Consolas"/>
-                <a:cs typeface="Consolas"/>
-              </a:rPr>
-              <a:t>g</a:t>
-            </a:r>
-            <a:r>
-              <a:rPr lang="en-US" sz="2400" b="1" dirty="0" err="1" smtClean="0">
-                <a:solidFill>
-                  <a:srgbClr val="000000"/>
-                </a:solidFill>
-                <a:latin typeface="Consolas"/>
-                <a:cs typeface="Consolas"/>
-              </a:rPr>
-              <a:t>it</a:t>
-            </a:r>
-            <a:r>
-              <a:rPr lang="en-US" sz="2400" b="1" dirty="0" smtClean="0">
-                <a:solidFill>
-                  <a:srgbClr val="000000"/>
-                </a:solidFill>
-                <a:latin typeface="Consolas"/>
-                <a:cs typeface="Consolas"/>
-              </a:rPr>
-              <a:t> –-version</a:t>
-            </a:r>
-          </a:p>
-          <a:p>
-            <a:r>
-              <a:rPr lang="en-US" sz="2400" dirty="0" smtClean="0">
-                <a:solidFill>
-                  <a:srgbClr val="000000"/>
-                </a:solidFill>
-              </a:rPr>
-              <a:t>Raise your hand if you get an error.</a:t>
-            </a:r>
-          </a:p>
-        </p:txBody>
-      </p:sp>
-      <p:sp>
-        <p:nvSpPr>
-          <p:cNvPr id="4" name="Text Box 1"/>
-          <p:cNvSpPr txBox="1">
-            <a:spLocks noChangeArrowheads="1"/>
-          </p:cNvSpPr>
-          <p:nvPr/>
-        </p:nvSpPr>
-        <p:spPr bwMode="auto">
-          <a:xfrm>
-            <a:off x="925512" y="303213"/>
-            <a:ext cx="8166100" cy="1258887"/>
-          </a:xfrm>
-          <a:prstGeom prst="rect">
-            <a:avLst/>
-          </a:prstGeom>
-          <a:noFill/>
-          <a:ln>
-            <a:noFill/>
-          </a:ln>
-          <a:effectLst/>
-          <a:extLst>
-            <a:ext uri="{909E8E84-426E-40dd-AFC4-6F175D3DCCD1}">
-              <a14:hiddenFill xmlns="" xmlns:a14="http://schemas.microsoft.com/office/drawing/2010/main">
-                <a:solidFill>
-                  <a:srgbClr val="FFFFFF"/>
-                </a:solidFill>
-              </a14:hiddenFill>
-            </a:ext>
-            <a:ext uri="{91240B29-F687-4f45-9708-019B960494DF}">
-              <a14:hiddenLine xmlns="" xmlns:a14="http://schemas.microsoft.com/office/drawing/2010/main" w="9525" cap="flat">
-                <a:solidFill>
-                  <a:srgbClr val="3465A4"/>
-                </a:solidFill>
-                <a:round/>
-                <a:headEnd/>
-                <a:tailEnd/>
-              </a14:hiddenLine>
-            </a:ext>
-            <a:ext uri="{AF507438-7753-43e0-B8FC-AC1667EBCBE1}">
-              <a14:hiddenEffects xmlns="" xmlns:a14="http://schemas.microsoft.com/office/drawing/2010/main">
-                <a:effectLst>
-                  <a:outerShdw blurRad="63500" dist="38099" dir="2700000" algn="ctr" rotWithShape="0">
-                    <a:srgbClr val="000000">
-                      <a:alpha val="74998"/>
-                    </a:srgbClr>
-                  </a:outerShdw>
-                </a:effectLst>
-              </a14:hiddenEffects>
-            </a:ext>
-          </a:extLst>
-        </p:spPr>
-        <p:txBody>
-          <a:bodyPr lIns="100800" tIns="50400" rIns="100800" bIns="50400" anchor="ctr"/>
-          <a:lstStyle>
-            <a:lvl1pPr>
-              <a:tabLst>
-                <a:tab pos="0" algn="l"/>
-                <a:tab pos="457200" algn="l"/>
-                <a:tab pos="914400" algn="l"/>
-                <a:tab pos="1371600" algn="l"/>
-                <a:tab pos="1828800" algn="l"/>
-                <a:tab pos="2286000" algn="l"/>
-                <a:tab pos="2743200" algn="l"/>
-                <a:tab pos="3200400" algn="l"/>
-                <a:tab pos="3657600" algn="l"/>
-                <a:tab pos="4114800" algn="l"/>
-                <a:tab pos="4572000" algn="l"/>
-                <a:tab pos="5029200" algn="l"/>
-                <a:tab pos="5486400" algn="l"/>
-                <a:tab pos="5943600" algn="l"/>
-                <a:tab pos="6400800" algn="l"/>
-                <a:tab pos="6858000" algn="l"/>
-                <a:tab pos="7315200" algn="l"/>
-                <a:tab pos="7772400" algn="l"/>
-                <a:tab pos="8229600" algn="l"/>
-                <a:tab pos="8686800" algn="l"/>
-                <a:tab pos="9144000" algn="l"/>
-              </a:tabLst>
-              <a:defRPr>
-                <a:solidFill>
-                  <a:srgbClr val="000000"/>
-                </a:solidFill>
-                <a:latin typeface="Arial" charset="0"/>
-                <a:ea typeface="ＭＳ Ｐゴシック" charset="0"/>
-                <a:cs typeface="ＭＳ Ｐゴシック" charset="0"/>
-              </a:defRPr>
-            </a:lvl1pPr>
-            <a:lvl2pPr>
-              <a:tabLst>
-                <a:tab pos="0" algn="l"/>
-                <a:tab pos="457200" algn="l"/>
-                <a:tab pos="914400" algn="l"/>
-                <a:tab pos="1371600" algn="l"/>
-                <a:tab pos="1828800" algn="l"/>
-                <a:tab pos="2286000" algn="l"/>
-                <a:tab pos="2743200" algn="l"/>
-                <a:tab pos="3200400" algn="l"/>
-                <a:tab pos="3657600" algn="l"/>
-                <a:tab pos="4114800" algn="l"/>
-                <a:tab pos="4572000" algn="l"/>
-                <a:tab pos="5029200" algn="l"/>
-                <a:tab pos="5486400" algn="l"/>
-                <a:tab pos="5943600" algn="l"/>
-                <a:tab pos="6400800" algn="l"/>
-                <a:tab pos="6858000" algn="l"/>
-                <a:tab pos="7315200" algn="l"/>
-                <a:tab pos="7772400" algn="l"/>
-                <a:tab pos="8229600" algn="l"/>
-                <a:tab pos="8686800" algn="l"/>
-                <a:tab pos="9144000" algn="l"/>
-              </a:tabLst>
-              <a:defRPr>
-                <a:solidFill>
-                  <a:srgbClr val="000000"/>
-                </a:solidFill>
-                <a:latin typeface="Arial" charset="0"/>
-                <a:ea typeface="ＭＳ Ｐゴシック" charset="0"/>
-                <a:cs typeface="ＭＳ Ｐゴシック" charset="0"/>
-              </a:defRPr>
-            </a:lvl2pPr>
-            <a:lvl3pPr>
-              <a:tabLst>
-                <a:tab pos="0" algn="l"/>
-                <a:tab pos="457200" algn="l"/>
-                <a:tab pos="914400" algn="l"/>
-                <a:tab pos="1371600" algn="l"/>
-                <a:tab pos="1828800" algn="l"/>
-                <a:tab pos="2286000" algn="l"/>
-                <a:tab pos="2743200" algn="l"/>
-                <a:tab pos="3200400" algn="l"/>
-                <a:tab pos="3657600" algn="l"/>
-                <a:tab pos="4114800" algn="l"/>
-                <a:tab pos="4572000" algn="l"/>
-                <a:tab pos="5029200" algn="l"/>
-                <a:tab pos="5486400" algn="l"/>
-                <a:tab pos="5943600" algn="l"/>
-                <a:tab pos="6400800" algn="l"/>
-                <a:tab pos="6858000" algn="l"/>
-                <a:tab pos="7315200" algn="l"/>
-                <a:tab pos="7772400" algn="l"/>
-                <a:tab pos="8229600" algn="l"/>
-                <a:tab pos="8686800" algn="l"/>
-                <a:tab pos="9144000" algn="l"/>
-              </a:tabLst>
-              <a:defRPr>
-                <a:solidFill>
-                  <a:srgbClr val="000000"/>
-                </a:solidFill>
-                <a:latin typeface="Arial" charset="0"/>
-                <a:ea typeface="ＭＳ Ｐゴシック" charset="0"/>
-                <a:cs typeface="ＭＳ Ｐゴシック" charset="0"/>
-              </a:defRPr>
-            </a:lvl3pPr>
-            <a:lvl4pPr>
-              <a:tabLst>
-                <a:tab pos="0" algn="l"/>
-                <a:tab pos="457200" algn="l"/>
-                <a:tab pos="914400" algn="l"/>
-                <a:tab pos="1371600" algn="l"/>
-                <a:tab pos="1828800" algn="l"/>
-                <a:tab pos="2286000" algn="l"/>
-                <a:tab pos="2743200" algn="l"/>
-                <a:tab pos="3200400" algn="l"/>
-                <a:tab pos="3657600" algn="l"/>
-                <a:tab pos="4114800" algn="l"/>
-                <a:tab pos="4572000" algn="l"/>
-                <a:tab pos="5029200" algn="l"/>
-                <a:tab pos="5486400" algn="l"/>
-                <a:tab pos="5943600" algn="l"/>
-                <a:tab pos="6400800" algn="l"/>
-                <a:tab pos="6858000" algn="l"/>
-                <a:tab pos="7315200" algn="l"/>
-                <a:tab pos="7772400" algn="l"/>
-                <a:tab pos="8229600" algn="l"/>
-                <a:tab pos="8686800" algn="l"/>
-                <a:tab pos="9144000" algn="l"/>
-              </a:tabLst>
-              <a:defRPr>
-                <a:solidFill>
-                  <a:srgbClr val="000000"/>
-                </a:solidFill>
-                <a:latin typeface="Arial" charset="0"/>
-                <a:ea typeface="ＭＳ Ｐゴシック" charset="0"/>
-                <a:cs typeface="ＭＳ Ｐゴシック" charset="0"/>
-              </a:defRPr>
-            </a:lvl4pPr>
-            <a:lvl5pPr>
-              <a:tabLst>
-                <a:tab pos="0" algn="l"/>
-                <a:tab pos="457200" algn="l"/>
-                <a:tab pos="914400" algn="l"/>
-                <a:tab pos="1371600" algn="l"/>
-                <a:tab pos="1828800" algn="l"/>
-                <a:tab pos="2286000" algn="l"/>
-                <a:tab pos="2743200" algn="l"/>
-                <a:tab pos="3200400" algn="l"/>
-                <a:tab pos="3657600" algn="l"/>
-                <a:tab pos="4114800" algn="l"/>
-                <a:tab pos="4572000" algn="l"/>
-                <a:tab pos="5029200" algn="l"/>
-                <a:tab pos="5486400" algn="l"/>
-                <a:tab pos="5943600" algn="l"/>
-                <a:tab pos="6400800" algn="l"/>
-                <a:tab pos="6858000" algn="l"/>
-                <a:tab pos="7315200" algn="l"/>
-                <a:tab pos="7772400" algn="l"/>
-                <a:tab pos="8229600" algn="l"/>
-                <a:tab pos="8686800" algn="l"/>
-                <a:tab pos="9144000" algn="l"/>
-              </a:tabLst>
-              <a:defRPr>
-                <a:solidFill>
-                  <a:srgbClr val="000000"/>
-                </a:solidFill>
-                <a:latin typeface="Arial" charset="0"/>
-                <a:ea typeface="ＭＳ Ｐゴシック" charset="0"/>
-                <a:cs typeface="ＭＳ Ｐゴシック" charset="0"/>
-              </a:defRPr>
-            </a:lvl5pPr>
-            <a:lvl6pPr marL="2514600" indent="-228600" fontAlgn="base" hangingPunct="0">
-              <a:lnSpc>
-                <a:spcPct val="93000"/>
-              </a:lnSpc>
-              <a:spcBef>
-                <a:spcPct val="0"/>
-              </a:spcBef>
-              <a:spcAft>
-                <a:spcPct val="0"/>
-              </a:spcAft>
-              <a:buClr>
-                <a:srgbClr val="000000"/>
-              </a:buClr>
-              <a:buSzPct val="100000"/>
-              <a:buFont typeface="Times New Roman" charset="0"/>
-              <a:tabLst>
-                <a:tab pos="0" algn="l"/>
-                <a:tab pos="457200" algn="l"/>
-                <a:tab pos="914400" algn="l"/>
-                <a:tab pos="1371600" algn="l"/>
-                <a:tab pos="1828800" algn="l"/>
-                <a:tab pos="2286000" algn="l"/>
-                <a:tab pos="2743200" algn="l"/>
-                <a:tab pos="3200400" algn="l"/>
-                <a:tab pos="3657600" algn="l"/>
-                <a:tab pos="4114800" algn="l"/>
-                <a:tab pos="4572000" algn="l"/>
-                <a:tab pos="5029200" algn="l"/>
-                <a:tab pos="5486400" algn="l"/>
-                <a:tab pos="5943600" algn="l"/>
-                <a:tab pos="6400800" algn="l"/>
-                <a:tab pos="6858000" algn="l"/>
-                <a:tab pos="7315200" algn="l"/>
-                <a:tab pos="7772400" algn="l"/>
-                <a:tab pos="8229600" algn="l"/>
-                <a:tab pos="8686800" algn="l"/>
-                <a:tab pos="9144000" algn="l"/>
-              </a:tabLst>
-              <a:defRPr>
-                <a:solidFill>
-                  <a:srgbClr val="000000"/>
-                </a:solidFill>
-                <a:latin typeface="Arial" charset="0"/>
-                <a:ea typeface="ＭＳ Ｐゴシック" charset="0"/>
-                <a:cs typeface="ＭＳ Ｐゴシック" charset="0"/>
-              </a:defRPr>
-            </a:lvl6pPr>
-            <a:lvl7pPr marL="2971800" indent="-228600" fontAlgn="base" hangingPunct="0">
-              <a:lnSpc>
-                <a:spcPct val="93000"/>
-              </a:lnSpc>
-              <a:spcBef>
-                <a:spcPct val="0"/>
-              </a:spcBef>
-              <a:spcAft>
-                <a:spcPct val="0"/>
-              </a:spcAft>
-              <a:buClr>
-                <a:srgbClr val="000000"/>
-              </a:buClr>
-              <a:buSzPct val="100000"/>
-              <a:buFont typeface="Times New Roman" charset="0"/>
-              <a:tabLst>
-                <a:tab pos="0" algn="l"/>
-                <a:tab pos="457200" algn="l"/>
-                <a:tab pos="914400" algn="l"/>
-                <a:tab pos="1371600" algn="l"/>
-                <a:tab pos="1828800" algn="l"/>
-                <a:tab pos="2286000" algn="l"/>
-                <a:tab pos="2743200" algn="l"/>
-                <a:tab pos="3200400" algn="l"/>
-                <a:tab pos="3657600" algn="l"/>
-                <a:tab pos="4114800" algn="l"/>
-                <a:tab pos="4572000" algn="l"/>
-                <a:tab pos="5029200" algn="l"/>
-                <a:tab pos="5486400" algn="l"/>
-                <a:tab pos="5943600" algn="l"/>
-                <a:tab pos="6400800" algn="l"/>
-                <a:tab pos="6858000" algn="l"/>
-                <a:tab pos="7315200" algn="l"/>
-                <a:tab pos="7772400" algn="l"/>
-                <a:tab pos="8229600" algn="l"/>
-                <a:tab pos="8686800" algn="l"/>
-                <a:tab pos="9144000" algn="l"/>
-              </a:tabLst>
-              <a:defRPr>
-                <a:solidFill>
-                  <a:srgbClr val="000000"/>
-                </a:solidFill>
-                <a:latin typeface="Arial" charset="0"/>
-                <a:ea typeface="ＭＳ Ｐゴシック" charset="0"/>
-                <a:cs typeface="ＭＳ Ｐゴシック" charset="0"/>
-              </a:defRPr>
-            </a:lvl7pPr>
-            <a:lvl8pPr marL="3429000" indent="-228600" fontAlgn="base" hangingPunct="0">
-              <a:lnSpc>
-                <a:spcPct val="93000"/>
-              </a:lnSpc>
-              <a:spcBef>
-                <a:spcPct val="0"/>
-              </a:spcBef>
-              <a:spcAft>
-                <a:spcPct val="0"/>
-              </a:spcAft>
-              <a:buClr>
-                <a:srgbClr val="000000"/>
-              </a:buClr>
-              <a:buSzPct val="100000"/>
-              <a:buFont typeface="Times New Roman" charset="0"/>
-              <a:tabLst>
-                <a:tab pos="0" algn="l"/>
-                <a:tab pos="457200" algn="l"/>
-                <a:tab pos="914400" algn="l"/>
-                <a:tab pos="1371600" algn="l"/>
-                <a:tab pos="1828800" algn="l"/>
-                <a:tab pos="2286000" algn="l"/>
-                <a:tab pos="2743200" algn="l"/>
-                <a:tab pos="3200400" algn="l"/>
-                <a:tab pos="3657600" algn="l"/>
-                <a:tab pos="4114800" algn="l"/>
-                <a:tab pos="4572000" algn="l"/>
-                <a:tab pos="5029200" algn="l"/>
-                <a:tab pos="5486400" algn="l"/>
-                <a:tab pos="5943600" algn="l"/>
-                <a:tab pos="6400800" algn="l"/>
-                <a:tab pos="6858000" algn="l"/>
-                <a:tab pos="7315200" algn="l"/>
-                <a:tab pos="7772400" algn="l"/>
-                <a:tab pos="8229600" algn="l"/>
-                <a:tab pos="8686800" algn="l"/>
-                <a:tab pos="9144000" algn="l"/>
-              </a:tabLst>
-              <a:defRPr>
-                <a:solidFill>
-                  <a:srgbClr val="000000"/>
-                </a:solidFill>
-                <a:latin typeface="Arial" charset="0"/>
-                <a:ea typeface="ＭＳ Ｐゴシック" charset="0"/>
-                <a:cs typeface="ＭＳ Ｐゴシック" charset="0"/>
-              </a:defRPr>
-            </a:lvl8pPr>
-            <a:lvl9pPr marL="3886200" indent="-228600" fontAlgn="base" hangingPunct="0">
-              <a:lnSpc>
-                <a:spcPct val="93000"/>
-              </a:lnSpc>
-              <a:spcBef>
-                <a:spcPct val="0"/>
-              </a:spcBef>
-              <a:spcAft>
-                <a:spcPct val="0"/>
-              </a:spcAft>
-              <a:buClr>
-                <a:srgbClr val="000000"/>
-              </a:buClr>
-              <a:buSzPct val="100000"/>
-              <a:buFont typeface="Times New Roman" charset="0"/>
-              <a:tabLst>
-                <a:tab pos="0" algn="l"/>
-                <a:tab pos="457200" algn="l"/>
-                <a:tab pos="914400" algn="l"/>
-                <a:tab pos="1371600" algn="l"/>
-                <a:tab pos="1828800" algn="l"/>
-                <a:tab pos="2286000" algn="l"/>
-                <a:tab pos="2743200" algn="l"/>
-                <a:tab pos="3200400" algn="l"/>
-                <a:tab pos="3657600" algn="l"/>
-                <a:tab pos="4114800" algn="l"/>
-                <a:tab pos="4572000" algn="l"/>
-                <a:tab pos="5029200" algn="l"/>
-                <a:tab pos="5486400" algn="l"/>
-                <a:tab pos="5943600" algn="l"/>
-                <a:tab pos="6400800" algn="l"/>
-                <a:tab pos="6858000" algn="l"/>
-                <a:tab pos="7315200" algn="l"/>
-                <a:tab pos="7772400" algn="l"/>
-                <a:tab pos="8229600" algn="l"/>
-                <a:tab pos="8686800" algn="l"/>
-                <a:tab pos="9144000" algn="l"/>
-              </a:tabLst>
-              <a:defRPr>
-                <a:solidFill>
-                  <a:srgbClr val="000000"/>
-                </a:solidFill>
-                <a:latin typeface="Arial" charset="0"/>
-                <a:ea typeface="ＭＳ Ｐゴシック" charset="0"/>
-                <a:cs typeface="ＭＳ Ｐゴシック" charset="0"/>
-              </a:defRPr>
-            </a:lvl9pPr>
-          </a:lstStyle>
-          <a:p>
-            <a:pPr algn="ctr">
-              <a:buClrTx/>
-              <a:buFontTx/>
-              <a:buNone/>
-              <a:defRPr/>
-            </a:pPr>
-            <a:r>
-              <a:rPr lang="en-US" sz="4400" dirty="0" smtClean="0"/>
-              <a:t>Check your setup!</a:t>
-            </a:r>
-          </a:p>
-        </p:txBody>
-      </p:sp>
-    </p:spTree>
-    <p:extLst>
-      <p:ext uri="{BB962C8B-B14F-4D97-AF65-F5344CB8AC3E}">
-        <p14:creationId xmlns:p14="http://schemas.microsoft.com/office/powerpoint/2010/main" val="2095537408"/>
-      </p:ext>
-    </p:extLst>
-  </p:cSld>
-  <p:clrMapOvr>
-    <a:masterClrMapping/>
-  </p:clrMapOvr>
-  <mc:AlternateContent xmlns:mc="http://schemas.openxmlformats.org/markup-compatibility/2006">
-    <mc:Choice xmlns:p14="http://schemas.microsoft.com/office/powerpoint/2010/main" Requires="p14">
-      <p:transition spd="slow" p14:dur="2000"/>
-    </mc:Choice>
-    <mc:Fallback>
-      <p:transition spd="slow"/>
-    </mc:Fallback>
-  </mc:AlternateContent>
-  <p:timing>
-    <p:tnLst>
-      <p:par>
-        <p:cTn id="1" dur="indefinite" restart="never" nodeType="tmRoot"/>
-      </p:par>
-    </p:tnLst>
-  </p:timing>
-</p:sld>
-</file>
-
-<file path=ppt/slides/slide20.xml><?xml version="1.0" encoding="utf-8"?>
+<file path=ppt/slides/slide19.xml><?xml version="1.0" encoding="utf-8"?>
 <p:sld xmlns:a="http://schemas.openxmlformats.org/drawingml/2006/main" xmlns:r="http://schemas.openxmlformats.org/officeDocument/2006/relationships" xmlns:p="http://schemas.openxmlformats.org/presentationml/2006/main">
   <p:cSld>
     <p:spTree>
@@ -23090,7 +21367,7 @@
 </p:sld>
 </file>
 
-<file path=ppt/slides/slide3.xml><?xml version="1.0" encoding="utf-8"?>
+<file path=ppt/slides/slide2.xml><?xml version="1.0" encoding="utf-8"?>
 <p:sld xmlns:a="http://schemas.openxmlformats.org/drawingml/2006/main" xmlns:r="http://schemas.openxmlformats.org/officeDocument/2006/relationships" xmlns:p="http://schemas.openxmlformats.org/presentationml/2006/main" showMasterSp="0">
   <p:cSld>
     <p:bg>
@@ -24605,7 +22882,7 @@
 </p:sld>
 </file>
 
-<file path=ppt/slides/slide4.xml><?xml version="1.0" encoding="utf-8"?>
+<file path=ppt/slides/slide3.xml><?xml version="1.0" encoding="utf-8"?>
 <p:sld xmlns:a="http://schemas.openxmlformats.org/drawingml/2006/main" xmlns:r="http://schemas.openxmlformats.org/officeDocument/2006/relationships" xmlns:p="http://schemas.openxmlformats.org/presentationml/2006/main">
   <p:cSld>
     <p:spTree>
@@ -25572,7 +23849,7 @@
 </p:sld>
 </file>
 
-<file path=ppt/slides/slide5.xml><?xml version="1.0" encoding="utf-8"?>
+<file path=ppt/slides/slide4.xml><?xml version="1.0" encoding="utf-8"?>
 <p:sld xmlns:a="http://schemas.openxmlformats.org/drawingml/2006/main" xmlns:r="http://schemas.openxmlformats.org/officeDocument/2006/relationships" xmlns:p="http://schemas.openxmlformats.org/presentationml/2006/main">
   <p:cSld>
     <p:spTree>
@@ -26584,7 +24861,7 @@
 </p:sld>
 </file>
 
-<file path=ppt/slides/slide6.xml><?xml version="1.0" encoding="utf-8"?>
+<file path=ppt/slides/slide5.xml><?xml version="1.0" encoding="utf-8"?>
 <p:sld xmlns:a="http://schemas.openxmlformats.org/drawingml/2006/main" xmlns:r="http://schemas.openxmlformats.org/officeDocument/2006/relationships" xmlns:p="http://schemas.openxmlformats.org/presentationml/2006/main" showMasterSp="0">
   <p:cSld>
     <p:bg>
@@ -27653,7 +25930,7 @@
 </p:sld>
 </file>
 
-<file path=ppt/slides/slide7.xml><?xml version="1.0" encoding="utf-8"?>
+<file path=ppt/slides/slide6.xml><?xml version="1.0" encoding="utf-8"?>
 <p:sld xmlns:a="http://schemas.openxmlformats.org/drawingml/2006/main" xmlns:r="http://schemas.openxmlformats.org/officeDocument/2006/relationships" xmlns:p="http://schemas.openxmlformats.org/presentationml/2006/main">
   <p:cSld>
     <p:spTree>
@@ -27949,7 +26226,7 @@
 </p:sld>
 </file>
 
-<file path=ppt/slides/slide8.xml><?xml version="1.0" encoding="utf-8"?>
+<file path=ppt/slides/slide7.xml><?xml version="1.0" encoding="utf-8"?>
 <p:sld xmlns:a="http://schemas.openxmlformats.org/drawingml/2006/main" xmlns:r="http://schemas.openxmlformats.org/officeDocument/2006/relationships" xmlns:p="http://schemas.openxmlformats.org/presentationml/2006/main">
   <p:cSld>
     <p:bg>
@@ -28888,7 +27165,7 @@
 </p:sld>
 </file>
 
-<file path=ppt/slides/slide9.xml><?xml version="1.0" encoding="utf-8"?>
+<file path=ppt/slides/slide8.xml><?xml version="1.0" encoding="utf-8"?>
 <p:sld xmlns:a="http://schemas.openxmlformats.org/drawingml/2006/main" xmlns:r="http://schemas.openxmlformats.org/officeDocument/2006/relationships" xmlns:p="http://schemas.openxmlformats.org/presentationml/2006/main">
   <p:cSld>
     <p:bg>
@@ -29779,6 +28056,963 @@
               </a:rPr>
               <a:t>Difficult to assess quality</a:t>
             </a:r>
+          </a:p>
+        </p:txBody>
+      </p:sp>
+    </p:spTree>
+  </p:cSld>
+  <p:clrMapOvr>
+    <a:masterClrMapping/>
+  </p:clrMapOvr>
+  <p:transition spd="med"/>
+  <p:timing>
+    <p:tnLst>
+      <p:par>
+        <p:cTn id="1" dur="indefinite" restart="never" nodeType="tmRoot">
+          <p:childTnLst>
+            <p:seq concurrent="1" nextAc="seek">
+              <p:cTn id="2" dur="indefinite" nodeType="mainSeq"/>
+              <p:prevCondLst>
+                <p:cond evt="onPrev" delay="0">
+                  <p:tgtEl>
+                    <p:sldTgt/>
+                  </p:tgtEl>
+                </p:cond>
+              </p:prevCondLst>
+              <p:nextCondLst>
+                <p:cond evt="onNext" delay="0">
+                  <p:tgtEl>
+                    <p:sldTgt/>
+                  </p:tgtEl>
+                </p:cond>
+              </p:nextCondLst>
+            </p:seq>
+          </p:childTnLst>
+        </p:cTn>
+      </p:par>
+    </p:tnLst>
+  </p:timing>
+</p:sld>
+</file>
+
+<file path=ppt/slides/slide9.xml><?xml version="1.0" encoding="utf-8"?>
+<p:sld xmlns:a="http://schemas.openxmlformats.org/drawingml/2006/main" xmlns:r="http://schemas.openxmlformats.org/officeDocument/2006/relationships" xmlns:p="http://schemas.openxmlformats.org/presentationml/2006/main">
+  <p:cSld>
+    <p:spTree>
+      <p:nvGrpSpPr>
+        <p:cNvPr id="1" name=""/>
+        <p:cNvGrpSpPr/>
+        <p:nvPr/>
+      </p:nvGrpSpPr>
+      <p:grpSpPr>
+        <a:xfrm>
+          <a:off x="0" y="0"/>
+          <a:ext cx="0" cy="0"/>
+          <a:chOff x="0" y="0"/>
+          <a:chExt cx="0" cy="0"/>
+        </a:xfrm>
+      </p:grpSpPr>
+      <p:sp>
+        <p:nvSpPr>
+          <p:cNvPr id="13313" name="Text Box 1"/>
+          <p:cNvSpPr txBox="1">
+            <a:spLocks noChangeArrowheads="1"/>
+          </p:cNvSpPr>
+          <p:nvPr/>
+        </p:nvSpPr>
+        <p:spPr bwMode="auto">
+          <a:xfrm>
+            <a:off x="1411288" y="303213"/>
+            <a:ext cx="8166100" cy="1258887"/>
+          </a:xfrm>
+          <a:prstGeom prst="rect">
+            <a:avLst/>
+          </a:prstGeom>
+          <a:noFill/>
+          <a:ln>
+            <a:noFill/>
+          </a:ln>
+          <a:effectLst/>
+          <a:extLst>
+            <a:ext uri="{909E8E84-426E-40dd-AFC4-6F175D3DCCD1}">
+              <a14:hiddenFill xmlns="" xmlns:a14="http://schemas.microsoft.com/office/drawing/2010/main">
+                <a:solidFill>
+                  <a:srgbClr val="FFFFFF"/>
+                </a:solidFill>
+              </a14:hiddenFill>
+            </a:ext>
+            <a:ext uri="{91240B29-F687-4f45-9708-019B960494DF}">
+              <a14:hiddenLine xmlns="" xmlns:a14="http://schemas.microsoft.com/office/drawing/2010/main" w="9525" cap="flat">
+                <a:solidFill>
+                  <a:srgbClr val="3465A4"/>
+                </a:solidFill>
+                <a:round/>
+                <a:headEnd/>
+                <a:tailEnd/>
+              </a14:hiddenLine>
+            </a:ext>
+            <a:ext uri="{AF507438-7753-43e0-B8FC-AC1667EBCBE1}">
+              <a14:hiddenEffects xmlns="" xmlns:a14="http://schemas.microsoft.com/office/drawing/2010/main">
+                <a:effectLst>
+                  <a:outerShdw blurRad="63500" dist="38099" dir="2700000" algn="ctr" rotWithShape="0">
+                    <a:srgbClr val="000000">
+                      <a:alpha val="74998"/>
+                    </a:srgbClr>
+                  </a:outerShdw>
+                </a:effectLst>
+              </a14:hiddenEffects>
+            </a:ext>
+          </a:extLst>
+        </p:spPr>
+        <p:txBody>
+          <a:bodyPr lIns="100800" tIns="50400" rIns="100800" bIns="50400" anchor="ctr"/>
+          <a:lstStyle>
+            <a:lvl1pPr>
+              <a:tabLst>
+                <a:tab pos="0" algn="l"/>
+                <a:tab pos="457200" algn="l"/>
+                <a:tab pos="914400" algn="l"/>
+                <a:tab pos="1371600" algn="l"/>
+                <a:tab pos="1828800" algn="l"/>
+                <a:tab pos="2286000" algn="l"/>
+                <a:tab pos="2743200" algn="l"/>
+                <a:tab pos="3200400" algn="l"/>
+                <a:tab pos="3657600" algn="l"/>
+                <a:tab pos="4114800" algn="l"/>
+                <a:tab pos="4572000" algn="l"/>
+                <a:tab pos="5029200" algn="l"/>
+                <a:tab pos="5486400" algn="l"/>
+                <a:tab pos="5943600" algn="l"/>
+                <a:tab pos="6400800" algn="l"/>
+                <a:tab pos="6858000" algn="l"/>
+                <a:tab pos="7315200" algn="l"/>
+                <a:tab pos="7772400" algn="l"/>
+                <a:tab pos="8229600" algn="l"/>
+                <a:tab pos="8686800" algn="l"/>
+                <a:tab pos="9144000" algn="l"/>
+              </a:tabLst>
+              <a:defRPr>
+                <a:solidFill>
+                  <a:srgbClr val="000000"/>
+                </a:solidFill>
+                <a:latin typeface="Arial" charset="0"/>
+                <a:ea typeface="ＭＳ Ｐゴシック" charset="0"/>
+                <a:cs typeface="ＭＳ Ｐゴシック" charset="0"/>
+              </a:defRPr>
+            </a:lvl1pPr>
+            <a:lvl2pPr>
+              <a:tabLst>
+                <a:tab pos="0" algn="l"/>
+                <a:tab pos="457200" algn="l"/>
+                <a:tab pos="914400" algn="l"/>
+                <a:tab pos="1371600" algn="l"/>
+                <a:tab pos="1828800" algn="l"/>
+                <a:tab pos="2286000" algn="l"/>
+                <a:tab pos="2743200" algn="l"/>
+                <a:tab pos="3200400" algn="l"/>
+                <a:tab pos="3657600" algn="l"/>
+                <a:tab pos="4114800" algn="l"/>
+                <a:tab pos="4572000" algn="l"/>
+                <a:tab pos="5029200" algn="l"/>
+                <a:tab pos="5486400" algn="l"/>
+                <a:tab pos="5943600" algn="l"/>
+                <a:tab pos="6400800" algn="l"/>
+                <a:tab pos="6858000" algn="l"/>
+                <a:tab pos="7315200" algn="l"/>
+                <a:tab pos="7772400" algn="l"/>
+                <a:tab pos="8229600" algn="l"/>
+                <a:tab pos="8686800" algn="l"/>
+                <a:tab pos="9144000" algn="l"/>
+              </a:tabLst>
+              <a:defRPr>
+                <a:solidFill>
+                  <a:srgbClr val="000000"/>
+                </a:solidFill>
+                <a:latin typeface="Arial" charset="0"/>
+                <a:ea typeface="ＭＳ Ｐゴシック" charset="0"/>
+                <a:cs typeface="ＭＳ Ｐゴシック" charset="0"/>
+              </a:defRPr>
+            </a:lvl2pPr>
+            <a:lvl3pPr>
+              <a:tabLst>
+                <a:tab pos="0" algn="l"/>
+                <a:tab pos="457200" algn="l"/>
+                <a:tab pos="914400" algn="l"/>
+                <a:tab pos="1371600" algn="l"/>
+                <a:tab pos="1828800" algn="l"/>
+                <a:tab pos="2286000" algn="l"/>
+                <a:tab pos="2743200" algn="l"/>
+                <a:tab pos="3200400" algn="l"/>
+                <a:tab pos="3657600" algn="l"/>
+                <a:tab pos="4114800" algn="l"/>
+                <a:tab pos="4572000" algn="l"/>
+                <a:tab pos="5029200" algn="l"/>
+                <a:tab pos="5486400" algn="l"/>
+                <a:tab pos="5943600" algn="l"/>
+                <a:tab pos="6400800" algn="l"/>
+                <a:tab pos="6858000" algn="l"/>
+                <a:tab pos="7315200" algn="l"/>
+                <a:tab pos="7772400" algn="l"/>
+                <a:tab pos="8229600" algn="l"/>
+                <a:tab pos="8686800" algn="l"/>
+                <a:tab pos="9144000" algn="l"/>
+              </a:tabLst>
+              <a:defRPr>
+                <a:solidFill>
+                  <a:srgbClr val="000000"/>
+                </a:solidFill>
+                <a:latin typeface="Arial" charset="0"/>
+                <a:ea typeface="ＭＳ Ｐゴシック" charset="0"/>
+                <a:cs typeface="ＭＳ Ｐゴシック" charset="0"/>
+              </a:defRPr>
+            </a:lvl3pPr>
+            <a:lvl4pPr>
+              <a:tabLst>
+                <a:tab pos="0" algn="l"/>
+                <a:tab pos="457200" algn="l"/>
+                <a:tab pos="914400" algn="l"/>
+                <a:tab pos="1371600" algn="l"/>
+                <a:tab pos="1828800" algn="l"/>
+                <a:tab pos="2286000" algn="l"/>
+                <a:tab pos="2743200" algn="l"/>
+                <a:tab pos="3200400" algn="l"/>
+                <a:tab pos="3657600" algn="l"/>
+                <a:tab pos="4114800" algn="l"/>
+                <a:tab pos="4572000" algn="l"/>
+                <a:tab pos="5029200" algn="l"/>
+                <a:tab pos="5486400" algn="l"/>
+                <a:tab pos="5943600" algn="l"/>
+                <a:tab pos="6400800" algn="l"/>
+                <a:tab pos="6858000" algn="l"/>
+                <a:tab pos="7315200" algn="l"/>
+                <a:tab pos="7772400" algn="l"/>
+                <a:tab pos="8229600" algn="l"/>
+                <a:tab pos="8686800" algn="l"/>
+                <a:tab pos="9144000" algn="l"/>
+              </a:tabLst>
+              <a:defRPr>
+                <a:solidFill>
+                  <a:srgbClr val="000000"/>
+                </a:solidFill>
+                <a:latin typeface="Arial" charset="0"/>
+                <a:ea typeface="ＭＳ Ｐゴシック" charset="0"/>
+                <a:cs typeface="ＭＳ Ｐゴシック" charset="0"/>
+              </a:defRPr>
+            </a:lvl4pPr>
+            <a:lvl5pPr>
+              <a:tabLst>
+                <a:tab pos="0" algn="l"/>
+                <a:tab pos="457200" algn="l"/>
+                <a:tab pos="914400" algn="l"/>
+                <a:tab pos="1371600" algn="l"/>
+                <a:tab pos="1828800" algn="l"/>
+                <a:tab pos="2286000" algn="l"/>
+                <a:tab pos="2743200" algn="l"/>
+                <a:tab pos="3200400" algn="l"/>
+                <a:tab pos="3657600" algn="l"/>
+                <a:tab pos="4114800" algn="l"/>
+                <a:tab pos="4572000" algn="l"/>
+                <a:tab pos="5029200" algn="l"/>
+                <a:tab pos="5486400" algn="l"/>
+                <a:tab pos="5943600" algn="l"/>
+                <a:tab pos="6400800" algn="l"/>
+                <a:tab pos="6858000" algn="l"/>
+                <a:tab pos="7315200" algn="l"/>
+                <a:tab pos="7772400" algn="l"/>
+                <a:tab pos="8229600" algn="l"/>
+                <a:tab pos="8686800" algn="l"/>
+                <a:tab pos="9144000" algn="l"/>
+              </a:tabLst>
+              <a:defRPr>
+                <a:solidFill>
+                  <a:srgbClr val="000000"/>
+                </a:solidFill>
+                <a:latin typeface="Arial" charset="0"/>
+                <a:ea typeface="ＭＳ Ｐゴシック" charset="0"/>
+                <a:cs typeface="ＭＳ Ｐゴシック" charset="0"/>
+              </a:defRPr>
+            </a:lvl5pPr>
+            <a:lvl6pPr marL="2514600" indent="-228600" fontAlgn="base" hangingPunct="0">
+              <a:lnSpc>
+                <a:spcPct val="93000"/>
+              </a:lnSpc>
+              <a:spcBef>
+                <a:spcPct val="0"/>
+              </a:spcBef>
+              <a:spcAft>
+                <a:spcPct val="0"/>
+              </a:spcAft>
+              <a:buClr>
+                <a:srgbClr val="000000"/>
+              </a:buClr>
+              <a:buSzPct val="100000"/>
+              <a:buFont typeface="Times New Roman" charset="0"/>
+              <a:tabLst>
+                <a:tab pos="0" algn="l"/>
+                <a:tab pos="457200" algn="l"/>
+                <a:tab pos="914400" algn="l"/>
+                <a:tab pos="1371600" algn="l"/>
+                <a:tab pos="1828800" algn="l"/>
+                <a:tab pos="2286000" algn="l"/>
+                <a:tab pos="2743200" algn="l"/>
+                <a:tab pos="3200400" algn="l"/>
+                <a:tab pos="3657600" algn="l"/>
+                <a:tab pos="4114800" algn="l"/>
+                <a:tab pos="4572000" algn="l"/>
+                <a:tab pos="5029200" algn="l"/>
+                <a:tab pos="5486400" algn="l"/>
+                <a:tab pos="5943600" algn="l"/>
+                <a:tab pos="6400800" algn="l"/>
+                <a:tab pos="6858000" algn="l"/>
+                <a:tab pos="7315200" algn="l"/>
+                <a:tab pos="7772400" algn="l"/>
+                <a:tab pos="8229600" algn="l"/>
+                <a:tab pos="8686800" algn="l"/>
+                <a:tab pos="9144000" algn="l"/>
+              </a:tabLst>
+              <a:defRPr>
+                <a:solidFill>
+                  <a:srgbClr val="000000"/>
+                </a:solidFill>
+                <a:latin typeface="Arial" charset="0"/>
+                <a:ea typeface="ＭＳ Ｐゴシック" charset="0"/>
+                <a:cs typeface="ＭＳ Ｐゴシック" charset="0"/>
+              </a:defRPr>
+            </a:lvl6pPr>
+            <a:lvl7pPr marL="2971800" indent="-228600" fontAlgn="base" hangingPunct="0">
+              <a:lnSpc>
+                <a:spcPct val="93000"/>
+              </a:lnSpc>
+              <a:spcBef>
+                <a:spcPct val="0"/>
+              </a:spcBef>
+              <a:spcAft>
+                <a:spcPct val="0"/>
+              </a:spcAft>
+              <a:buClr>
+                <a:srgbClr val="000000"/>
+              </a:buClr>
+              <a:buSzPct val="100000"/>
+              <a:buFont typeface="Times New Roman" charset="0"/>
+              <a:tabLst>
+                <a:tab pos="0" algn="l"/>
+                <a:tab pos="457200" algn="l"/>
+                <a:tab pos="914400" algn="l"/>
+                <a:tab pos="1371600" algn="l"/>
+                <a:tab pos="1828800" algn="l"/>
+                <a:tab pos="2286000" algn="l"/>
+                <a:tab pos="2743200" algn="l"/>
+                <a:tab pos="3200400" algn="l"/>
+                <a:tab pos="3657600" algn="l"/>
+                <a:tab pos="4114800" algn="l"/>
+                <a:tab pos="4572000" algn="l"/>
+                <a:tab pos="5029200" algn="l"/>
+                <a:tab pos="5486400" algn="l"/>
+                <a:tab pos="5943600" algn="l"/>
+                <a:tab pos="6400800" algn="l"/>
+                <a:tab pos="6858000" algn="l"/>
+                <a:tab pos="7315200" algn="l"/>
+                <a:tab pos="7772400" algn="l"/>
+                <a:tab pos="8229600" algn="l"/>
+                <a:tab pos="8686800" algn="l"/>
+                <a:tab pos="9144000" algn="l"/>
+              </a:tabLst>
+              <a:defRPr>
+                <a:solidFill>
+                  <a:srgbClr val="000000"/>
+                </a:solidFill>
+                <a:latin typeface="Arial" charset="0"/>
+                <a:ea typeface="ＭＳ Ｐゴシック" charset="0"/>
+                <a:cs typeface="ＭＳ Ｐゴシック" charset="0"/>
+              </a:defRPr>
+            </a:lvl7pPr>
+            <a:lvl8pPr marL="3429000" indent="-228600" fontAlgn="base" hangingPunct="0">
+              <a:lnSpc>
+                <a:spcPct val="93000"/>
+              </a:lnSpc>
+              <a:spcBef>
+                <a:spcPct val="0"/>
+              </a:spcBef>
+              <a:spcAft>
+                <a:spcPct val="0"/>
+              </a:spcAft>
+              <a:buClr>
+                <a:srgbClr val="000000"/>
+              </a:buClr>
+              <a:buSzPct val="100000"/>
+              <a:buFont typeface="Times New Roman" charset="0"/>
+              <a:tabLst>
+                <a:tab pos="0" algn="l"/>
+                <a:tab pos="457200" algn="l"/>
+                <a:tab pos="914400" algn="l"/>
+                <a:tab pos="1371600" algn="l"/>
+                <a:tab pos="1828800" algn="l"/>
+                <a:tab pos="2286000" algn="l"/>
+                <a:tab pos="2743200" algn="l"/>
+                <a:tab pos="3200400" algn="l"/>
+                <a:tab pos="3657600" algn="l"/>
+                <a:tab pos="4114800" algn="l"/>
+                <a:tab pos="4572000" algn="l"/>
+                <a:tab pos="5029200" algn="l"/>
+                <a:tab pos="5486400" algn="l"/>
+                <a:tab pos="5943600" algn="l"/>
+                <a:tab pos="6400800" algn="l"/>
+                <a:tab pos="6858000" algn="l"/>
+                <a:tab pos="7315200" algn="l"/>
+                <a:tab pos="7772400" algn="l"/>
+                <a:tab pos="8229600" algn="l"/>
+                <a:tab pos="8686800" algn="l"/>
+                <a:tab pos="9144000" algn="l"/>
+              </a:tabLst>
+              <a:defRPr>
+                <a:solidFill>
+                  <a:srgbClr val="000000"/>
+                </a:solidFill>
+                <a:latin typeface="Arial" charset="0"/>
+                <a:ea typeface="ＭＳ Ｐゴシック" charset="0"/>
+                <a:cs typeface="ＭＳ Ｐゴシック" charset="0"/>
+              </a:defRPr>
+            </a:lvl8pPr>
+            <a:lvl9pPr marL="3886200" indent="-228600" fontAlgn="base" hangingPunct="0">
+              <a:lnSpc>
+                <a:spcPct val="93000"/>
+              </a:lnSpc>
+              <a:spcBef>
+                <a:spcPct val="0"/>
+              </a:spcBef>
+              <a:spcAft>
+                <a:spcPct val="0"/>
+              </a:spcAft>
+              <a:buClr>
+                <a:srgbClr val="000000"/>
+              </a:buClr>
+              <a:buSzPct val="100000"/>
+              <a:buFont typeface="Times New Roman" charset="0"/>
+              <a:tabLst>
+                <a:tab pos="0" algn="l"/>
+                <a:tab pos="457200" algn="l"/>
+                <a:tab pos="914400" algn="l"/>
+                <a:tab pos="1371600" algn="l"/>
+                <a:tab pos="1828800" algn="l"/>
+                <a:tab pos="2286000" algn="l"/>
+                <a:tab pos="2743200" algn="l"/>
+                <a:tab pos="3200400" algn="l"/>
+                <a:tab pos="3657600" algn="l"/>
+                <a:tab pos="4114800" algn="l"/>
+                <a:tab pos="4572000" algn="l"/>
+                <a:tab pos="5029200" algn="l"/>
+                <a:tab pos="5486400" algn="l"/>
+                <a:tab pos="5943600" algn="l"/>
+                <a:tab pos="6400800" algn="l"/>
+                <a:tab pos="6858000" algn="l"/>
+                <a:tab pos="7315200" algn="l"/>
+                <a:tab pos="7772400" algn="l"/>
+                <a:tab pos="8229600" algn="l"/>
+                <a:tab pos="8686800" algn="l"/>
+                <a:tab pos="9144000" algn="l"/>
+              </a:tabLst>
+              <a:defRPr>
+                <a:solidFill>
+                  <a:srgbClr val="000000"/>
+                </a:solidFill>
+                <a:latin typeface="Arial" charset="0"/>
+                <a:ea typeface="ＭＳ Ｐゴシック" charset="0"/>
+                <a:cs typeface="ＭＳ Ｐゴシック" charset="0"/>
+              </a:defRPr>
+            </a:lvl9pPr>
+          </a:lstStyle>
+          <a:p>
+            <a:pPr algn="ctr">
+              <a:buClrTx/>
+              <a:buFontTx/>
+              <a:buNone/>
+              <a:defRPr/>
+            </a:pPr>
+            <a:r>
+              <a:rPr lang="en-US" sz="4400" smtClean="0"/>
+              <a:t>Software Carpentry to the Rescue</a:t>
+            </a:r>
+          </a:p>
+        </p:txBody>
+      </p:sp>
+      <p:sp>
+        <p:nvSpPr>
+          <p:cNvPr id="13314" name="Text Box 2"/>
+          <p:cNvSpPr txBox="1">
+            <a:spLocks noChangeArrowheads="1"/>
+          </p:cNvSpPr>
+          <p:nvPr/>
+        </p:nvSpPr>
+        <p:spPr bwMode="auto">
+          <a:xfrm>
+            <a:off x="503238" y="1878013"/>
+            <a:ext cx="9074150" cy="4702175"/>
+          </a:xfrm>
+          <a:prstGeom prst="rect">
+            <a:avLst/>
+          </a:prstGeom>
+          <a:noFill/>
+          <a:ln>
+            <a:noFill/>
+          </a:ln>
+          <a:effectLst/>
+          <a:extLst>
+            <a:ext uri="{909E8E84-426E-40dd-AFC4-6F175D3DCCD1}">
+              <a14:hiddenFill xmlns="" xmlns:a14="http://schemas.microsoft.com/office/drawing/2010/main">
+                <a:solidFill>
+                  <a:srgbClr val="FFFFFF"/>
+                </a:solidFill>
+              </a14:hiddenFill>
+            </a:ext>
+            <a:ext uri="{91240B29-F687-4f45-9708-019B960494DF}">
+              <a14:hiddenLine xmlns="" xmlns:a14="http://schemas.microsoft.com/office/drawing/2010/main" w="9525" cap="flat">
+                <a:solidFill>
+                  <a:srgbClr val="3465A4"/>
+                </a:solidFill>
+                <a:round/>
+                <a:headEnd/>
+                <a:tailEnd/>
+              </a14:hiddenLine>
+            </a:ext>
+            <a:ext uri="{AF507438-7753-43e0-B8FC-AC1667EBCBE1}">
+              <a14:hiddenEffects xmlns="" xmlns:a14="http://schemas.microsoft.com/office/drawing/2010/main">
+                <a:effectLst>
+                  <a:outerShdw blurRad="63500" dist="38099" dir="2700000" algn="ctr" rotWithShape="0">
+                    <a:srgbClr val="000000">
+                      <a:alpha val="74998"/>
+                    </a:srgbClr>
+                  </a:outerShdw>
+                </a:effectLst>
+              </a14:hiddenEffects>
+            </a:ext>
+          </a:extLst>
+        </p:spPr>
+        <p:txBody>
+          <a:bodyPr lIns="100800" tIns="50400" rIns="100800" bIns="50400"/>
+          <a:lstStyle>
+            <a:lvl1pPr marL="568325" indent="-568325">
+              <a:tabLst>
+                <a:tab pos="568325" algn="l"/>
+                <a:tab pos="1025525" algn="l"/>
+                <a:tab pos="1482725" algn="l"/>
+                <a:tab pos="1939925" algn="l"/>
+                <a:tab pos="2397125" algn="l"/>
+                <a:tab pos="2854325" algn="l"/>
+                <a:tab pos="3311525" algn="l"/>
+                <a:tab pos="3768725" algn="l"/>
+                <a:tab pos="4225925" algn="l"/>
+                <a:tab pos="4683125" algn="l"/>
+                <a:tab pos="5140325" algn="l"/>
+                <a:tab pos="5597525" algn="l"/>
+                <a:tab pos="6054725" algn="l"/>
+                <a:tab pos="6511925" algn="l"/>
+                <a:tab pos="6969125" algn="l"/>
+                <a:tab pos="7426325" algn="l"/>
+                <a:tab pos="7883525" algn="l"/>
+                <a:tab pos="8340725" algn="l"/>
+                <a:tab pos="8797925" algn="l"/>
+                <a:tab pos="9255125" algn="l"/>
+                <a:tab pos="9712325" algn="l"/>
+              </a:tabLst>
+              <a:defRPr>
+                <a:solidFill>
+                  <a:srgbClr val="000000"/>
+                </a:solidFill>
+                <a:latin typeface="Arial" charset="0"/>
+                <a:ea typeface="ＭＳ Ｐゴシック" charset="0"/>
+                <a:cs typeface="ＭＳ Ｐゴシック" charset="0"/>
+              </a:defRPr>
+            </a:lvl1pPr>
+            <a:lvl2pPr marL="968375" indent="-568325">
+              <a:tabLst>
+                <a:tab pos="568325" algn="l"/>
+                <a:tab pos="1025525" algn="l"/>
+                <a:tab pos="1482725" algn="l"/>
+                <a:tab pos="1939925" algn="l"/>
+                <a:tab pos="2397125" algn="l"/>
+                <a:tab pos="2854325" algn="l"/>
+                <a:tab pos="3311525" algn="l"/>
+                <a:tab pos="3768725" algn="l"/>
+                <a:tab pos="4225925" algn="l"/>
+                <a:tab pos="4683125" algn="l"/>
+                <a:tab pos="5140325" algn="l"/>
+                <a:tab pos="5597525" algn="l"/>
+                <a:tab pos="6054725" algn="l"/>
+                <a:tab pos="6511925" algn="l"/>
+                <a:tab pos="6969125" algn="l"/>
+                <a:tab pos="7426325" algn="l"/>
+                <a:tab pos="7883525" algn="l"/>
+                <a:tab pos="8340725" algn="l"/>
+                <a:tab pos="8797925" algn="l"/>
+                <a:tab pos="9255125" algn="l"/>
+                <a:tab pos="9712325" algn="l"/>
+              </a:tabLst>
+              <a:defRPr>
+                <a:solidFill>
+                  <a:srgbClr val="000000"/>
+                </a:solidFill>
+                <a:latin typeface="Arial" charset="0"/>
+                <a:ea typeface="ＭＳ Ｐゴシック" charset="0"/>
+                <a:cs typeface="ＭＳ Ｐゴシック" charset="0"/>
+              </a:defRPr>
+            </a:lvl2pPr>
+            <a:lvl3pPr>
+              <a:tabLst>
+                <a:tab pos="568325" algn="l"/>
+                <a:tab pos="1025525" algn="l"/>
+                <a:tab pos="1482725" algn="l"/>
+                <a:tab pos="1939925" algn="l"/>
+                <a:tab pos="2397125" algn="l"/>
+                <a:tab pos="2854325" algn="l"/>
+                <a:tab pos="3311525" algn="l"/>
+                <a:tab pos="3768725" algn="l"/>
+                <a:tab pos="4225925" algn="l"/>
+                <a:tab pos="4683125" algn="l"/>
+                <a:tab pos="5140325" algn="l"/>
+                <a:tab pos="5597525" algn="l"/>
+                <a:tab pos="6054725" algn="l"/>
+                <a:tab pos="6511925" algn="l"/>
+                <a:tab pos="6969125" algn="l"/>
+                <a:tab pos="7426325" algn="l"/>
+                <a:tab pos="7883525" algn="l"/>
+                <a:tab pos="8340725" algn="l"/>
+                <a:tab pos="8797925" algn="l"/>
+                <a:tab pos="9255125" algn="l"/>
+                <a:tab pos="9712325" algn="l"/>
+              </a:tabLst>
+              <a:defRPr>
+                <a:solidFill>
+                  <a:srgbClr val="000000"/>
+                </a:solidFill>
+                <a:latin typeface="Arial" charset="0"/>
+                <a:ea typeface="ＭＳ Ｐゴシック" charset="0"/>
+                <a:cs typeface="ＭＳ Ｐゴシック" charset="0"/>
+              </a:defRPr>
+            </a:lvl3pPr>
+            <a:lvl4pPr>
+              <a:tabLst>
+                <a:tab pos="568325" algn="l"/>
+                <a:tab pos="1025525" algn="l"/>
+                <a:tab pos="1482725" algn="l"/>
+                <a:tab pos="1939925" algn="l"/>
+                <a:tab pos="2397125" algn="l"/>
+                <a:tab pos="2854325" algn="l"/>
+                <a:tab pos="3311525" algn="l"/>
+                <a:tab pos="3768725" algn="l"/>
+                <a:tab pos="4225925" algn="l"/>
+                <a:tab pos="4683125" algn="l"/>
+                <a:tab pos="5140325" algn="l"/>
+                <a:tab pos="5597525" algn="l"/>
+                <a:tab pos="6054725" algn="l"/>
+                <a:tab pos="6511925" algn="l"/>
+                <a:tab pos="6969125" algn="l"/>
+                <a:tab pos="7426325" algn="l"/>
+                <a:tab pos="7883525" algn="l"/>
+                <a:tab pos="8340725" algn="l"/>
+                <a:tab pos="8797925" algn="l"/>
+                <a:tab pos="9255125" algn="l"/>
+                <a:tab pos="9712325" algn="l"/>
+              </a:tabLst>
+              <a:defRPr>
+                <a:solidFill>
+                  <a:srgbClr val="000000"/>
+                </a:solidFill>
+                <a:latin typeface="Arial" charset="0"/>
+                <a:ea typeface="ＭＳ Ｐゴシック" charset="0"/>
+                <a:cs typeface="ＭＳ Ｐゴシック" charset="0"/>
+              </a:defRPr>
+            </a:lvl4pPr>
+            <a:lvl5pPr>
+              <a:tabLst>
+                <a:tab pos="568325" algn="l"/>
+                <a:tab pos="1025525" algn="l"/>
+                <a:tab pos="1482725" algn="l"/>
+                <a:tab pos="1939925" algn="l"/>
+                <a:tab pos="2397125" algn="l"/>
+                <a:tab pos="2854325" algn="l"/>
+                <a:tab pos="3311525" algn="l"/>
+                <a:tab pos="3768725" algn="l"/>
+                <a:tab pos="4225925" algn="l"/>
+                <a:tab pos="4683125" algn="l"/>
+                <a:tab pos="5140325" algn="l"/>
+                <a:tab pos="5597525" algn="l"/>
+                <a:tab pos="6054725" algn="l"/>
+                <a:tab pos="6511925" algn="l"/>
+                <a:tab pos="6969125" algn="l"/>
+                <a:tab pos="7426325" algn="l"/>
+                <a:tab pos="7883525" algn="l"/>
+                <a:tab pos="8340725" algn="l"/>
+                <a:tab pos="8797925" algn="l"/>
+                <a:tab pos="9255125" algn="l"/>
+                <a:tab pos="9712325" algn="l"/>
+              </a:tabLst>
+              <a:defRPr>
+                <a:solidFill>
+                  <a:srgbClr val="000000"/>
+                </a:solidFill>
+                <a:latin typeface="Arial" charset="0"/>
+                <a:ea typeface="ＭＳ Ｐゴシック" charset="0"/>
+                <a:cs typeface="ＭＳ Ｐゴシック" charset="0"/>
+              </a:defRPr>
+            </a:lvl5pPr>
+            <a:lvl6pPr marL="2514600" indent="-228600" fontAlgn="base" hangingPunct="0">
+              <a:lnSpc>
+                <a:spcPct val="93000"/>
+              </a:lnSpc>
+              <a:spcBef>
+                <a:spcPct val="0"/>
+              </a:spcBef>
+              <a:spcAft>
+                <a:spcPct val="0"/>
+              </a:spcAft>
+              <a:buClr>
+                <a:srgbClr val="000000"/>
+              </a:buClr>
+              <a:buSzPct val="100000"/>
+              <a:buFont typeface="Times New Roman" charset="0"/>
+              <a:tabLst>
+                <a:tab pos="568325" algn="l"/>
+                <a:tab pos="1025525" algn="l"/>
+                <a:tab pos="1482725" algn="l"/>
+                <a:tab pos="1939925" algn="l"/>
+                <a:tab pos="2397125" algn="l"/>
+                <a:tab pos="2854325" algn="l"/>
+                <a:tab pos="3311525" algn="l"/>
+                <a:tab pos="3768725" algn="l"/>
+                <a:tab pos="4225925" algn="l"/>
+                <a:tab pos="4683125" algn="l"/>
+                <a:tab pos="5140325" algn="l"/>
+                <a:tab pos="5597525" algn="l"/>
+                <a:tab pos="6054725" algn="l"/>
+                <a:tab pos="6511925" algn="l"/>
+                <a:tab pos="6969125" algn="l"/>
+                <a:tab pos="7426325" algn="l"/>
+                <a:tab pos="7883525" algn="l"/>
+                <a:tab pos="8340725" algn="l"/>
+                <a:tab pos="8797925" algn="l"/>
+                <a:tab pos="9255125" algn="l"/>
+                <a:tab pos="9712325" algn="l"/>
+              </a:tabLst>
+              <a:defRPr>
+                <a:solidFill>
+                  <a:srgbClr val="000000"/>
+                </a:solidFill>
+                <a:latin typeface="Arial" charset="0"/>
+                <a:ea typeface="ＭＳ Ｐゴシック" charset="0"/>
+                <a:cs typeface="ＭＳ Ｐゴシック" charset="0"/>
+              </a:defRPr>
+            </a:lvl6pPr>
+            <a:lvl7pPr marL="2971800" indent="-228600" fontAlgn="base" hangingPunct="0">
+              <a:lnSpc>
+                <a:spcPct val="93000"/>
+              </a:lnSpc>
+              <a:spcBef>
+                <a:spcPct val="0"/>
+              </a:spcBef>
+              <a:spcAft>
+                <a:spcPct val="0"/>
+              </a:spcAft>
+              <a:buClr>
+                <a:srgbClr val="000000"/>
+              </a:buClr>
+              <a:buSzPct val="100000"/>
+              <a:buFont typeface="Times New Roman" charset="0"/>
+              <a:tabLst>
+                <a:tab pos="568325" algn="l"/>
+                <a:tab pos="1025525" algn="l"/>
+                <a:tab pos="1482725" algn="l"/>
+                <a:tab pos="1939925" algn="l"/>
+                <a:tab pos="2397125" algn="l"/>
+                <a:tab pos="2854325" algn="l"/>
+                <a:tab pos="3311525" algn="l"/>
+                <a:tab pos="3768725" algn="l"/>
+                <a:tab pos="4225925" algn="l"/>
+                <a:tab pos="4683125" algn="l"/>
+                <a:tab pos="5140325" algn="l"/>
+                <a:tab pos="5597525" algn="l"/>
+                <a:tab pos="6054725" algn="l"/>
+                <a:tab pos="6511925" algn="l"/>
+                <a:tab pos="6969125" algn="l"/>
+                <a:tab pos="7426325" algn="l"/>
+                <a:tab pos="7883525" algn="l"/>
+                <a:tab pos="8340725" algn="l"/>
+                <a:tab pos="8797925" algn="l"/>
+                <a:tab pos="9255125" algn="l"/>
+                <a:tab pos="9712325" algn="l"/>
+              </a:tabLst>
+              <a:defRPr>
+                <a:solidFill>
+                  <a:srgbClr val="000000"/>
+                </a:solidFill>
+                <a:latin typeface="Arial" charset="0"/>
+                <a:ea typeface="ＭＳ Ｐゴシック" charset="0"/>
+                <a:cs typeface="ＭＳ Ｐゴシック" charset="0"/>
+              </a:defRPr>
+            </a:lvl7pPr>
+            <a:lvl8pPr marL="3429000" indent="-228600" fontAlgn="base" hangingPunct="0">
+              <a:lnSpc>
+                <a:spcPct val="93000"/>
+              </a:lnSpc>
+              <a:spcBef>
+                <a:spcPct val="0"/>
+              </a:spcBef>
+              <a:spcAft>
+                <a:spcPct val="0"/>
+              </a:spcAft>
+              <a:buClr>
+                <a:srgbClr val="000000"/>
+              </a:buClr>
+              <a:buSzPct val="100000"/>
+              <a:buFont typeface="Times New Roman" charset="0"/>
+              <a:tabLst>
+                <a:tab pos="568325" algn="l"/>
+                <a:tab pos="1025525" algn="l"/>
+                <a:tab pos="1482725" algn="l"/>
+                <a:tab pos="1939925" algn="l"/>
+                <a:tab pos="2397125" algn="l"/>
+                <a:tab pos="2854325" algn="l"/>
+                <a:tab pos="3311525" algn="l"/>
+                <a:tab pos="3768725" algn="l"/>
+                <a:tab pos="4225925" algn="l"/>
+                <a:tab pos="4683125" algn="l"/>
+                <a:tab pos="5140325" algn="l"/>
+                <a:tab pos="5597525" algn="l"/>
+                <a:tab pos="6054725" algn="l"/>
+                <a:tab pos="6511925" algn="l"/>
+                <a:tab pos="6969125" algn="l"/>
+                <a:tab pos="7426325" algn="l"/>
+                <a:tab pos="7883525" algn="l"/>
+                <a:tab pos="8340725" algn="l"/>
+                <a:tab pos="8797925" algn="l"/>
+                <a:tab pos="9255125" algn="l"/>
+                <a:tab pos="9712325" algn="l"/>
+              </a:tabLst>
+              <a:defRPr>
+                <a:solidFill>
+                  <a:srgbClr val="000000"/>
+                </a:solidFill>
+                <a:latin typeface="Arial" charset="0"/>
+                <a:ea typeface="ＭＳ Ｐゴシック" charset="0"/>
+                <a:cs typeface="ＭＳ Ｐゴシック" charset="0"/>
+              </a:defRPr>
+            </a:lvl8pPr>
+            <a:lvl9pPr marL="3886200" indent="-228600" fontAlgn="base" hangingPunct="0">
+              <a:lnSpc>
+                <a:spcPct val="93000"/>
+              </a:lnSpc>
+              <a:spcBef>
+                <a:spcPct val="0"/>
+              </a:spcBef>
+              <a:spcAft>
+                <a:spcPct val="0"/>
+              </a:spcAft>
+              <a:buClr>
+                <a:srgbClr val="000000"/>
+              </a:buClr>
+              <a:buSzPct val="100000"/>
+              <a:buFont typeface="Times New Roman" charset="0"/>
+              <a:tabLst>
+                <a:tab pos="568325" algn="l"/>
+                <a:tab pos="1025525" algn="l"/>
+                <a:tab pos="1482725" algn="l"/>
+                <a:tab pos="1939925" algn="l"/>
+                <a:tab pos="2397125" algn="l"/>
+                <a:tab pos="2854325" algn="l"/>
+                <a:tab pos="3311525" algn="l"/>
+                <a:tab pos="3768725" algn="l"/>
+                <a:tab pos="4225925" algn="l"/>
+                <a:tab pos="4683125" algn="l"/>
+                <a:tab pos="5140325" algn="l"/>
+                <a:tab pos="5597525" algn="l"/>
+                <a:tab pos="6054725" algn="l"/>
+                <a:tab pos="6511925" algn="l"/>
+                <a:tab pos="6969125" algn="l"/>
+                <a:tab pos="7426325" algn="l"/>
+                <a:tab pos="7883525" algn="l"/>
+                <a:tab pos="8340725" algn="l"/>
+                <a:tab pos="8797925" algn="l"/>
+                <a:tab pos="9255125" algn="l"/>
+                <a:tab pos="9712325" algn="l"/>
+              </a:tabLst>
+              <a:defRPr>
+                <a:solidFill>
+                  <a:srgbClr val="000000"/>
+                </a:solidFill>
+                <a:latin typeface="Arial" charset="0"/>
+                <a:ea typeface="ＭＳ Ｐゴシック" charset="0"/>
+                <a:cs typeface="ＭＳ Ｐゴシック" charset="0"/>
+              </a:defRPr>
+            </a:lvl9pPr>
+          </a:lstStyle>
+          <a:p>
+            <a:pPr>
+              <a:spcAft>
+                <a:spcPts val="1425"/>
+              </a:spcAft>
+              <a:buFont typeface="Arial" charset="0"/>
+              <a:buChar char="•"/>
+              <a:defRPr/>
+            </a:pPr>
+            <a:r>
+              <a:rPr lang="en-US" sz="4000" smtClean="0">
+                <a:cs typeface="Arial Unicode MS" charset="0"/>
+              </a:rPr>
+              <a:t>Best practices used by the best software engineers whose business is development of quality software</a:t>
+            </a:r>
+          </a:p>
+          <a:p>
+            <a:pPr lvl="1">
+              <a:spcAft>
+                <a:spcPts val="1138"/>
+              </a:spcAft>
+              <a:buFont typeface="Arial" charset="0"/>
+              <a:buChar char="•"/>
+              <a:defRPr/>
+            </a:pPr>
+            <a:r>
+              <a:rPr lang="en-US" sz="3600" smtClean="0"/>
+              <a:t>They don’t always have formal training</a:t>
+            </a:r>
+          </a:p>
+          <a:p>
+            <a:pPr lvl="1">
+              <a:spcAft>
+                <a:spcPts val="1138"/>
+              </a:spcAft>
+              <a:buFont typeface="Arial" charset="0"/>
+              <a:buChar char="•"/>
+              <a:defRPr/>
+            </a:pPr>
+            <a:r>
+              <a:rPr lang="en-US" sz="3600" smtClean="0"/>
+              <a:t>They don’t always follow all the practices</a:t>
+            </a:r>
+          </a:p>
+          <a:p>
+            <a:pPr lvl="1">
+              <a:spcAft>
+                <a:spcPts val="1138"/>
+              </a:spcAft>
+              <a:buFont typeface="Arial" charset="0"/>
+              <a:buChar char="•"/>
+              <a:defRPr/>
+            </a:pPr>
+            <a:r>
+              <a:rPr lang="en-US" sz="3600" smtClean="0"/>
+              <a:t>Growing evidence supported by empirical studies</a:t>
+            </a:r>
+          </a:p>
+          <a:p>
+            <a:pPr marL="969963" lvl="1">
+              <a:spcAft>
+                <a:spcPts val="1138"/>
+              </a:spcAft>
+              <a:buClrTx/>
+              <a:buFontTx/>
+              <a:buNone/>
+              <a:defRPr/>
+            </a:pPr>
+            <a:endParaRPr lang="en-US" sz="3600" smtClean="0"/>
           </a:p>
         </p:txBody>
       </p:sp>

</xml_diff>